<commit_message>
Update flowchart and fix table 1
</commit_message>
<xml_diff>
--- a/results/fig1/flow_chart.pptx
+++ b/results/fig1/flow_chart.pptx
@@ -199,7 +199,7 @@
           <a:p>
             <a:fld id="{3EEE108C-EB67-DA4C-A2B8-5DDAA9AACF1E}" type="datetimeFigureOut">
               <a:rPr lang="de-CH" smtClean="0"/>
-              <a:t>01.03.23</a:t>
+              <a:t>09.03.2023</a:t>
             </a:fld>
             <a:endParaRPr lang="de-CH"/>
           </a:p>
@@ -694,7 +694,27 @@
           <a:bodyPr/>
           <a:lstStyle/>
           <a:p>
-            <a:endParaRPr lang="de-DE" dirty="0"/>
+            <a:pPr marL="0" marR="0" lvl="0" indent="0" algn="l" defTabSz="914400" rtl="0" eaLnBrk="1" fontAlgn="auto" latinLnBrk="0" hangingPunct="1">
+              <a:lnSpc>
+                <a:spcPct val="100000"/>
+              </a:lnSpc>
+              <a:spcBef>
+                <a:spcPts val="0"/>
+              </a:spcBef>
+              <a:spcAft>
+                <a:spcPts val="0"/>
+              </a:spcAft>
+              <a:buClrTx/>
+              <a:buSzTx/>
+              <a:buFontTx/>
+              <a:buNone/>
+              <a:tabLst/>
+              <a:defRPr/>
+            </a:pPr>
+            <a:endParaRPr lang="en-GB" sz="1200" dirty="0">
+              <a:latin typeface="Arial" panose="020B0604020202020204" pitchFamily="34" charset="0"/>
+              <a:cs typeface="Arial" panose="020B0604020202020204" pitchFamily="34" charset="0"/>
+            </a:endParaRPr>
           </a:p>
         </p:txBody>
       </p:sp>
@@ -2076,7 +2096,7 @@
             <a:fld id="{4B6055F8-1D02-4417-9241-55C834FD9970}" type="datetimeFigureOut">
               <a:rPr lang="it-IT" smtClean="0"/>
               <a:pPr/>
-              <a:t>01/03/23</a:t>
+              <a:t>09/03/2023</a:t>
             </a:fld>
             <a:endParaRPr lang="it-IT"/>
           </a:p>
@@ -4597,7 +4617,7 @@
               </a14:hiddenLine>
             </a:ext>
             <a:ext uri="{FAA26D3D-D897-4be2-8F04-BA451C77F1D7}">
-              <ma14:placeholderFlag xmlns:ma14="http://schemas.microsoft.com/office/mac/drawingml/2011/main" xmlns="" val="1"/>
+              <ma14:placeholderFlag xmlns="" xmlns:ma14="http://schemas.microsoft.com/office/mac/drawingml/2011/main" val="1"/>
             </a:ext>
           </a:extLst>
         </p:spPr>
@@ -4653,7 +4673,7 @@
               </a14:hiddenLine>
             </a:ext>
             <a:ext uri="{FAA26D3D-D897-4be2-8F04-BA451C77F1D7}">
-              <ma14:placeholderFlag xmlns:ma14="http://schemas.microsoft.com/office/mac/drawingml/2011/main" xmlns="" val="1"/>
+              <ma14:placeholderFlag xmlns="" xmlns:ma14="http://schemas.microsoft.com/office/mac/drawingml/2011/main" val="1"/>
             </a:ext>
           </a:extLst>
         </p:spPr>
@@ -7432,1089 +7452,1144 @@
           <a:chExt cx="0" cy="0"/>
         </a:xfrm>
       </p:grpSpPr>
-      <p:sp>
-        <p:nvSpPr>
-          <p:cNvPr id="8" name="Textfeld 7">
+      <p:grpSp>
+        <p:nvGrpSpPr>
+          <p:cNvPr id="2" name="Group 1">
             <a:extLst>
               <a:ext uri="{FF2B5EF4-FFF2-40B4-BE49-F238E27FC236}">
-                <a16:creationId xmlns:a16="http://schemas.microsoft.com/office/drawing/2014/main" id="{54000E2E-5C7D-1344-A185-C415F6A5CDC2}"/>
+                <a16:creationId xmlns:a16="http://schemas.microsoft.com/office/drawing/2014/main" id="{12975EDE-E6B5-5A41-9A12-C4768B96EECF}"/>
               </a:ext>
             </a:extLst>
           </p:cNvPr>
-          <p:cNvSpPr txBox="1"/>
+          <p:cNvGrpSpPr/>
           <p:nvPr/>
-        </p:nvSpPr>
-        <p:spPr>
-          <a:xfrm>
-            <a:off x="6446240" y="113348"/>
-            <a:ext cx="1723297" cy="492067"/>
-          </a:xfrm>
-          <a:prstGeom prst="rect">
-            <a:avLst/>
-          </a:prstGeom>
-          <a:noFill/>
-          <a:ln>
+        </p:nvGrpSpPr>
+        <p:grpSpPr>
+          <a:xfrm>
+            <a:off x="1292006" y="1360204"/>
+            <a:ext cx="10147658" cy="3840416"/>
+            <a:chOff x="1292006" y="1360204"/>
+            <a:chExt cx="10147658" cy="3840416"/>
+          </a:xfrm>
+        </p:grpSpPr>
+        <p:sp>
+          <p:nvSpPr>
+            <p:cNvPr id="8" name="Textfeld 7">
+              <a:extLst>
+                <a:ext uri="{FF2B5EF4-FFF2-40B4-BE49-F238E27FC236}">
+                  <a16:creationId xmlns:a16="http://schemas.microsoft.com/office/drawing/2014/main" id="{54000E2E-5C7D-1344-A185-C415F6A5CDC2}"/>
+                </a:ext>
+              </a:extLst>
+            </p:cNvPr>
+            <p:cNvSpPr txBox="1"/>
+            <p:nvPr/>
+          </p:nvSpPr>
+          <p:spPr>
+            <a:xfrm>
+              <a:off x="5508573" y="1360204"/>
+              <a:ext cx="1723297" cy="492067"/>
+            </a:xfrm>
+            <a:prstGeom prst="rect">
+              <a:avLst/>
+            </a:prstGeom>
+            <a:noFill/>
+            <a:ln>
+              <a:solidFill>
+                <a:schemeClr val="tx1"/>
+              </a:solidFill>
+            </a:ln>
+          </p:spPr>
+          <p:txBody>
+            <a:bodyPr wrap="square" rtlCol="0" anchor="ctr" anchorCtr="0">
+              <a:noAutofit/>
+            </a:bodyPr>
+            <a:lstStyle/>
+            <a:p>
+              <a:pPr algn="ctr"/>
+              <a:r>
+                <a:rPr lang="en-US" sz="1200" dirty="0">
+                  <a:latin typeface="Arial" panose="020B0604020202020204" pitchFamily="34" charset="0"/>
+                  <a:cs typeface="Arial" panose="020B0604020202020204" pitchFamily="34" charset="0"/>
+                </a:rPr>
+                <a:t>73,181 ICU stays</a:t>
+              </a:r>
+              <a:br>
+                <a:rPr lang="en-US" sz="1200" dirty="0">
+                  <a:latin typeface="Arial" panose="020B0604020202020204" pitchFamily="34" charset="0"/>
+                  <a:cs typeface="Arial" panose="020B0604020202020204" pitchFamily="34" charset="0"/>
+                </a:rPr>
+              </a:br>
+              <a:r>
+                <a:rPr lang="en-US" sz="1200" dirty="0">
+                  <a:latin typeface="Arial" panose="020B0604020202020204" pitchFamily="34" charset="0"/>
+                  <a:cs typeface="Arial" panose="020B0604020202020204" pitchFamily="34" charset="0"/>
+                </a:rPr>
+                <a:t>in MIMIC-IV</a:t>
+              </a:r>
+            </a:p>
+          </p:txBody>
+        </p:sp>
+        <p:sp>
+          <p:nvSpPr>
+            <p:cNvPr id="11" name="Textfeld 10">
+              <a:extLst>
+                <a:ext uri="{FF2B5EF4-FFF2-40B4-BE49-F238E27FC236}">
+                  <a16:creationId xmlns:a16="http://schemas.microsoft.com/office/drawing/2014/main" id="{F188F005-AEF6-BA48-BD4C-6F3F3DD7946E}"/>
+                </a:ext>
+              </a:extLst>
+            </p:cNvPr>
+            <p:cNvSpPr txBox="1"/>
+            <p:nvPr/>
+          </p:nvSpPr>
+          <p:spPr>
+            <a:xfrm>
+              <a:off x="7624207" y="2002454"/>
+              <a:ext cx="2736000" cy="646331"/>
+            </a:xfrm>
+            <a:prstGeom prst="rect">
+              <a:avLst/>
+            </a:prstGeom>
+            <a:noFill/>
+            <a:ln>
+              <a:solidFill>
+                <a:schemeClr val="tx1"/>
+              </a:solidFill>
+            </a:ln>
+          </p:spPr>
+          <p:txBody>
+            <a:bodyPr wrap="square" rtlCol="0" anchor="ctr" anchorCtr="0">
+              <a:spAutoFit/>
+            </a:bodyPr>
+            <a:lstStyle/>
+            <a:p>
+              <a:r>
+                <a:rPr lang="en-US" sz="1200" dirty="0">
+                  <a:latin typeface="Arial" panose="020B0604020202020204" pitchFamily="34" charset="0"/>
+                  <a:cs typeface="Arial" panose="020B0604020202020204" pitchFamily="34" charset="0"/>
+                </a:rPr>
+                <a:t>Admissions excluded:</a:t>
+              </a:r>
+            </a:p>
+            <a:p>
+              <a:pPr marL="171450" indent="-171450">
+                <a:buFont typeface="Arial" panose="020B0604020202020204" pitchFamily="34" charset="0"/>
+                <a:buChar char="•"/>
+              </a:pPr>
+              <a:r>
+                <a:rPr lang="en-US" sz="1200" dirty="0">
+                  <a:latin typeface="Arial" panose="020B0604020202020204" pitchFamily="34" charset="0"/>
+                  <a:cs typeface="Arial" panose="020B0604020202020204" pitchFamily="34" charset="0"/>
+                </a:rPr>
+                <a:t>Non-septic ICU stays (n=32,971)</a:t>
+              </a:r>
+            </a:p>
+            <a:p>
+              <a:pPr marL="171450" indent="-171450">
+                <a:buFont typeface="Arial" panose="020B0604020202020204" pitchFamily="34" charset="0"/>
+                <a:buChar char="•"/>
+              </a:pPr>
+              <a:r>
+                <a:rPr lang="en-US" sz="1200" dirty="0">
+                  <a:latin typeface="Arial" panose="020B0604020202020204" pitchFamily="34" charset="0"/>
+                  <a:cs typeface="Arial" panose="020B0604020202020204" pitchFamily="34" charset="0"/>
+                </a:rPr>
+                <a:t>LoS &lt; 24 hours (n=3,137)</a:t>
+              </a:r>
+            </a:p>
+          </p:txBody>
+        </p:sp>
+        <p:cxnSp>
+          <p:nvCxnSpPr>
+            <p:cNvPr id="13" name="Gerade Verbindung mit Pfeil 12">
+              <a:extLst>
+                <a:ext uri="{FF2B5EF4-FFF2-40B4-BE49-F238E27FC236}">
+                  <a16:creationId xmlns:a16="http://schemas.microsoft.com/office/drawing/2014/main" id="{FA7D861E-928E-9D4C-8857-46CFE561DB05}"/>
+                </a:ext>
+              </a:extLst>
+            </p:cNvPr>
+            <p:cNvCxnSpPr>
+              <a:cxnSpLocks/>
+              <a:endCxn id="11" idx="1"/>
+            </p:cNvCxnSpPr>
+            <p:nvPr/>
+          </p:nvCxnSpPr>
+          <p:spPr>
+            <a:xfrm>
+              <a:off x="6366107" y="2325620"/>
+              <a:ext cx="1258100" cy="0"/>
+            </a:xfrm>
+            <a:prstGeom prst="straightConnector1">
+              <a:avLst/>
+            </a:prstGeom>
+            <a:ln>
+              <a:tailEnd type="triangle"/>
+            </a:ln>
+          </p:spPr>
+          <p:style>
+            <a:lnRef idx="1">
+              <a:schemeClr val="dk1"/>
+            </a:lnRef>
+            <a:fillRef idx="0">
+              <a:schemeClr val="dk1"/>
+            </a:fillRef>
+            <a:effectRef idx="0">
+              <a:schemeClr val="dk1"/>
+            </a:effectRef>
+            <a:fontRef idx="minor">
+              <a:schemeClr val="tx1"/>
+            </a:fontRef>
+          </p:style>
+        </p:cxnSp>
+        <p:cxnSp>
+          <p:nvCxnSpPr>
+            <p:cNvPr id="25" name="Gerade Verbindung mit Pfeil 11">
+              <a:extLst>
+                <a:ext uri="{FF2B5EF4-FFF2-40B4-BE49-F238E27FC236}">
+                  <a16:creationId xmlns:a16="http://schemas.microsoft.com/office/drawing/2014/main" id="{42BA8543-846E-0AC6-97E0-03187A3A168F}"/>
+                </a:ext>
+              </a:extLst>
+            </p:cNvPr>
+            <p:cNvCxnSpPr>
+              <a:cxnSpLocks/>
+              <a:stCxn id="8" idx="2"/>
+              <a:endCxn id="16" idx="0"/>
+            </p:cNvCxnSpPr>
+            <p:nvPr/>
+          </p:nvCxnSpPr>
+          <p:spPr>
+            <a:xfrm>
+              <a:off x="6370222" y="1852271"/>
+              <a:ext cx="542" cy="1029879"/>
+            </a:xfrm>
+            <a:prstGeom prst="straightConnector1">
+              <a:avLst/>
+            </a:prstGeom>
+            <a:ln>
+              <a:tailEnd type="triangle"/>
+            </a:ln>
+          </p:spPr>
+          <p:style>
+            <a:lnRef idx="1">
+              <a:schemeClr val="dk1"/>
+            </a:lnRef>
+            <a:fillRef idx="0">
+              <a:schemeClr val="dk1"/>
+            </a:fillRef>
+            <a:effectRef idx="0">
+              <a:schemeClr val="dk1"/>
+            </a:effectRef>
+            <a:fontRef idx="minor">
+              <a:schemeClr val="tx1"/>
+            </a:fontRef>
+          </p:style>
+        </p:cxnSp>
+        <p:sp>
+          <p:nvSpPr>
+            <p:cNvPr id="19" name="Textfeld 7">
+              <a:extLst>
+                <a:ext uri="{FF2B5EF4-FFF2-40B4-BE49-F238E27FC236}">
+                  <a16:creationId xmlns:a16="http://schemas.microsoft.com/office/drawing/2014/main" id="{AEFE7EEA-BDA2-20BC-5D61-68CC27C8F74D}"/>
+                </a:ext>
+              </a:extLst>
+            </p:cNvPr>
+            <p:cNvSpPr txBox="1"/>
+            <p:nvPr/>
+          </p:nvSpPr>
+          <p:spPr>
+            <a:xfrm>
+              <a:off x="6588030" y="4287882"/>
+              <a:ext cx="1723297" cy="649772"/>
+            </a:xfrm>
+            <a:prstGeom prst="rect">
+              <a:avLst/>
+            </a:prstGeom>
+            <a:noFill/>
+            <a:ln>
+              <a:solidFill>
+                <a:schemeClr val="tx1"/>
+              </a:solidFill>
+            </a:ln>
+          </p:spPr>
+          <p:txBody>
+            <a:bodyPr wrap="square" rtlCol="0" anchor="ctr" anchorCtr="0">
+              <a:noAutofit/>
+            </a:bodyPr>
+            <a:lstStyle>
+              <a:defPPr>
+                <a:defRPr lang="de-DE"/>
+              </a:defPPr>
+              <a:lvl1pPr algn="ctr">
+                <a:defRPr sz="1200">
+                  <a:latin typeface="Arial" panose="020B0604020202020204" pitchFamily="34" charset="0"/>
+                  <a:cs typeface="Arial" panose="020B0604020202020204" pitchFamily="34" charset="0"/>
+                </a:defRPr>
+              </a:lvl1pPr>
+            </a:lstStyle>
+            <a:p>
+              <a:r>
+                <a:rPr lang="en-US" dirty="0"/>
+                <a:t>4,067 septic, adult, cancer ICU patients</a:t>
+              </a:r>
+              <a:br>
+                <a:rPr lang="en-US" dirty="0"/>
+              </a:br>
+              <a:r>
+                <a:rPr lang="en-US" dirty="0"/>
+                <a:t>in MIMIC-IV</a:t>
+              </a:r>
+            </a:p>
+          </p:txBody>
+        </p:sp>
+        <p:cxnSp>
+          <p:nvCxnSpPr>
+            <p:cNvPr id="15" name="Gerade Verbindung mit Pfeil 12">
+              <a:extLst>
+                <a:ext uri="{FF2B5EF4-FFF2-40B4-BE49-F238E27FC236}">
+                  <a16:creationId xmlns:a16="http://schemas.microsoft.com/office/drawing/2014/main" id="{F34C12CE-4A48-406E-0A50-22CA336BD8E8}"/>
+                </a:ext>
+              </a:extLst>
+            </p:cNvPr>
+            <p:cNvCxnSpPr>
+              <a:cxnSpLocks/>
+            </p:cNvCxnSpPr>
+            <p:nvPr/>
+          </p:nvCxnSpPr>
+          <p:spPr>
+            <a:xfrm>
+              <a:off x="8311869" y="4598982"/>
+              <a:ext cx="391795" cy="0"/>
+            </a:xfrm>
+            <a:prstGeom prst="straightConnector1">
+              <a:avLst/>
+            </a:prstGeom>
+            <a:ln>
+              <a:tailEnd type="triangle"/>
+            </a:ln>
+          </p:spPr>
+          <p:style>
+            <a:lnRef idx="1">
+              <a:schemeClr val="dk1"/>
+            </a:lnRef>
+            <a:fillRef idx="0">
+              <a:schemeClr val="dk1"/>
+            </a:fillRef>
+            <a:effectRef idx="0">
+              <a:schemeClr val="dk1"/>
+            </a:effectRef>
+            <a:fontRef idx="minor">
+              <a:schemeClr val="tx1"/>
+            </a:fontRef>
+          </p:style>
+        </p:cxnSp>
+        <p:sp>
+          <p:nvSpPr>
+            <p:cNvPr id="17" name="Textfeld 10">
+              <a:extLst>
+                <a:ext uri="{FF2B5EF4-FFF2-40B4-BE49-F238E27FC236}">
+                  <a16:creationId xmlns:a16="http://schemas.microsoft.com/office/drawing/2014/main" id="{E59E9680-9E9F-174A-4EBF-C509867CC912}"/>
+                </a:ext>
+              </a:extLst>
+            </p:cNvPr>
+            <p:cNvSpPr txBox="1"/>
+            <p:nvPr/>
+          </p:nvSpPr>
+          <p:spPr>
+            <a:xfrm>
+              <a:off x="8703663" y="4490599"/>
+              <a:ext cx="2736001" cy="276999"/>
+            </a:xfrm>
+            <a:prstGeom prst="rect">
+              <a:avLst/>
+            </a:prstGeom>
             <a:solidFill>
+              <a:schemeClr val="bg1">
+                <a:lumMod val="85000"/>
+              </a:schemeClr>
+            </a:solidFill>
+            <a:ln>
+              <a:solidFill>
+                <a:schemeClr val="tx1"/>
+              </a:solidFill>
+            </a:ln>
+          </p:spPr>
+          <p:txBody>
+            <a:bodyPr wrap="square" rtlCol="0" anchor="ctr" anchorCtr="0">
+              <a:spAutoFit/>
+            </a:bodyPr>
+            <a:lstStyle/>
+            <a:p>
+              <a:pPr marL="0" marR="0" lvl="0" indent="0" algn="l" defTabSz="914400" rtl="0" eaLnBrk="1" fontAlgn="auto" latinLnBrk="0" hangingPunct="1">
+                <a:lnSpc>
+                  <a:spcPct val="100000"/>
+                </a:lnSpc>
+                <a:spcBef>
+                  <a:spcPts val="0"/>
+                </a:spcBef>
+                <a:spcAft>
+                  <a:spcPts val="0"/>
+                </a:spcAft>
+                <a:buClrTx/>
+                <a:buSzTx/>
+                <a:buFontTx/>
+                <a:buNone/>
+                <a:tabLst/>
+                <a:defRPr/>
+              </a:pPr>
+              <a:r>
+                <a:rPr lang="en-US" sz="1200" dirty="0">
+                  <a:latin typeface="Arial" panose="020B0604020202020204" pitchFamily="34" charset="0"/>
+                  <a:cs typeface="Arial" panose="020B0604020202020204" pitchFamily="34" charset="0"/>
+                </a:rPr>
+                <a:t>Q2: Different Cancer Patients</a:t>
+              </a:r>
+            </a:p>
+          </p:txBody>
+        </p:sp>
+        <p:sp>
+          <p:nvSpPr>
+            <p:cNvPr id="20" name="Textfeld 10">
+              <a:extLst>
+                <a:ext uri="{FF2B5EF4-FFF2-40B4-BE49-F238E27FC236}">
+                  <a16:creationId xmlns:a16="http://schemas.microsoft.com/office/drawing/2014/main" id="{4C4CD834-F96B-6FE9-1216-2A095314CD7B}"/>
+                </a:ext>
+              </a:extLst>
+            </p:cNvPr>
+            <p:cNvSpPr txBox="1"/>
+            <p:nvPr/>
+          </p:nvSpPr>
+          <p:spPr>
+            <a:xfrm>
+              <a:off x="1292006" y="4490599"/>
+              <a:ext cx="2736001" cy="276999"/>
+            </a:xfrm>
+            <a:prstGeom prst="rect">
+              <a:avLst/>
+            </a:prstGeom>
+            <a:solidFill>
+              <a:schemeClr val="bg1">
+                <a:lumMod val="85000"/>
+              </a:schemeClr>
+            </a:solidFill>
+            <a:ln>
+              <a:solidFill>
+                <a:schemeClr val="tx1"/>
+              </a:solidFill>
+            </a:ln>
+          </p:spPr>
+          <p:txBody>
+            <a:bodyPr wrap="square" rtlCol="0" anchor="ctr" anchorCtr="0">
+              <a:spAutoFit/>
+            </a:bodyPr>
+            <a:lstStyle/>
+            <a:p>
+              <a:r>
+                <a:rPr lang="en-US" sz="1200" dirty="0">
+                  <a:latin typeface="Arial" panose="020B0604020202020204" pitchFamily="34" charset="0"/>
+                  <a:cs typeface="Arial" panose="020B0604020202020204" pitchFamily="34" charset="0"/>
+                </a:rPr>
+                <a:t>Q1: Cancer vs. Non-Cancer Patients</a:t>
+              </a:r>
+            </a:p>
+          </p:txBody>
+        </p:sp>
+        <p:sp>
+          <p:nvSpPr>
+            <p:cNvPr id="16" name="Textfeld 7">
+              <a:extLst>
+                <a:ext uri="{FF2B5EF4-FFF2-40B4-BE49-F238E27FC236}">
+                  <a16:creationId xmlns:a16="http://schemas.microsoft.com/office/drawing/2014/main" id="{19CBBCD9-103F-877B-E0AD-FB8B2DB5AB8E}"/>
+                </a:ext>
+              </a:extLst>
+            </p:cNvPr>
+            <p:cNvSpPr txBox="1"/>
+            <p:nvPr/>
+          </p:nvSpPr>
+          <p:spPr>
+            <a:xfrm>
+              <a:off x="5509115" y="2882150"/>
+              <a:ext cx="1723297" cy="492067"/>
+            </a:xfrm>
+            <a:prstGeom prst="rect">
+              <a:avLst/>
+            </a:prstGeom>
+            <a:noFill/>
+            <a:ln>
+              <a:solidFill>
+                <a:schemeClr val="tx1"/>
+              </a:solidFill>
+            </a:ln>
+          </p:spPr>
+          <p:txBody>
+            <a:bodyPr wrap="square" rtlCol="0" anchor="ctr" anchorCtr="0">
+              <a:noAutofit/>
+            </a:bodyPr>
+            <a:lstStyle/>
+            <a:p>
+              <a:pPr algn="ctr"/>
+              <a:r>
+                <a:rPr lang="en-US" sz="1200" dirty="0">
+                  <a:latin typeface="Arial" panose="020B0604020202020204" pitchFamily="34" charset="0"/>
+                  <a:cs typeface="Arial" panose="020B0604020202020204" pitchFamily="34" charset="0"/>
+                </a:rPr>
+                <a:t>29,834 ICU septic stays in MIMIC-IV</a:t>
+              </a:r>
+            </a:p>
+          </p:txBody>
+        </p:sp>
+        <p:sp>
+          <p:nvSpPr>
+            <p:cNvPr id="32" name="Textfeld 10">
+              <a:extLst>
+                <a:ext uri="{FF2B5EF4-FFF2-40B4-BE49-F238E27FC236}">
+                  <a16:creationId xmlns:a16="http://schemas.microsoft.com/office/drawing/2014/main" id="{3E697BD2-CAC6-821B-B9CF-59083AE152CC}"/>
+                </a:ext>
+              </a:extLst>
+            </p:cNvPr>
+            <p:cNvSpPr txBox="1"/>
+            <p:nvPr/>
+          </p:nvSpPr>
+          <p:spPr>
+            <a:xfrm>
+              <a:off x="8703664" y="3652623"/>
+              <a:ext cx="2736000" cy="646331"/>
+            </a:xfrm>
+            <a:prstGeom prst="rect">
+              <a:avLst/>
+            </a:prstGeom>
+            <a:noFill/>
+            <a:ln>
+              <a:solidFill>
+                <a:schemeClr val="tx1"/>
+              </a:solidFill>
+            </a:ln>
+          </p:spPr>
+          <p:txBody>
+            <a:bodyPr wrap="square" rtlCol="0" anchor="ctr" anchorCtr="0">
+              <a:spAutoFit/>
+            </a:bodyPr>
+            <a:lstStyle/>
+            <a:p>
+              <a:r>
+                <a:rPr lang="en-US" sz="1200" dirty="0">
+                  <a:latin typeface="Arial" panose="020B0604020202020204" pitchFamily="34" charset="0"/>
+                  <a:cs typeface="Arial" panose="020B0604020202020204" pitchFamily="34" charset="0"/>
+                </a:rPr>
+                <a:t>Admissions excluded:</a:t>
+              </a:r>
+            </a:p>
+            <a:p>
+              <a:pPr marL="171450" indent="-171450">
+                <a:buFont typeface="Arial" panose="020B0604020202020204" pitchFamily="34" charset="0"/>
+                <a:buChar char="•"/>
+              </a:pPr>
+              <a:r>
+                <a:rPr lang="en-US" sz="1200" dirty="0">
+                  <a:latin typeface="Arial" panose="020B0604020202020204" pitchFamily="34" charset="0"/>
+                  <a:cs typeface="Arial" panose="020B0604020202020204" pitchFamily="34" charset="0"/>
+                </a:rPr>
+                <a:t>Non-cancer stays (n=24,950)</a:t>
+              </a:r>
+            </a:p>
+            <a:p>
+              <a:pPr marL="171450" indent="-171450">
+                <a:buFont typeface="Arial" panose="020B0604020202020204" pitchFamily="34" charset="0"/>
+                <a:buChar char="•"/>
+              </a:pPr>
+              <a:r>
+                <a:rPr lang="en-US" sz="1200" dirty="0">
+                  <a:latin typeface="Arial" panose="020B0604020202020204" pitchFamily="34" charset="0"/>
+                  <a:cs typeface="Arial" panose="020B0604020202020204" pitchFamily="34" charset="0"/>
+                </a:rPr>
+                <a:t>Recurrent stays (n=817)</a:t>
+              </a:r>
+            </a:p>
+          </p:txBody>
+        </p:sp>
+        <p:sp>
+          <p:nvSpPr>
+            <p:cNvPr id="41" name="Textfeld 7">
+              <a:extLst>
+                <a:ext uri="{FF2B5EF4-FFF2-40B4-BE49-F238E27FC236}">
+                  <a16:creationId xmlns:a16="http://schemas.microsoft.com/office/drawing/2014/main" id="{7A973194-C3C7-4AC9-E195-B05B1C73840B}"/>
+                </a:ext>
+              </a:extLst>
+            </p:cNvPr>
+            <p:cNvSpPr txBox="1"/>
+            <p:nvPr/>
+          </p:nvSpPr>
+          <p:spPr>
+            <a:xfrm>
+              <a:off x="4428396" y="4287882"/>
+              <a:ext cx="1723297" cy="649772"/>
+            </a:xfrm>
+            <a:prstGeom prst="rect">
+              <a:avLst/>
+            </a:prstGeom>
+            <a:noFill/>
+            <a:ln>
+              <a:solidFill>
+                <a:schemeClr val="tx1"/>
+              </a:solidFill>
+            </a:ln>
+          </p:spPr>
+          <p:txBody>
+            <a:bodyPr wrap="square" rtlCol="0" anchor="ctr" anchorCtr="0">
+              <a:noAutofit/>
+            </a:bodyPr>
+            <a:lstStyle>
+              <a:defPPr>
+                <a:defRPr lang="de-DE"/>
+              </a:defPPr>
+              <a:lvl1pPr algn="ctr">
+                <a:defRPr sz="1200">
+                  <a:latin typeface="Arial" panose="020B0604020202020204" pitchFamily="34" charset="0"/>
+                  <a:cs typeface="Arial" panose="020B0604020202020204" pitchFamily="34" charset="0"/>
+                </a:defRPr>
+              </a:lvl1pPr>
+            </a:lstStyle>
+            <a:p>
+              <a:pPr marL="0" marR="0" lvl="0" indent="0" defTabSz="914400" rtl="0" eaLnBrk="1" fontAlgn="auto" latinLnBrk="0" hangingPunct="1">
+                <a:lnSpc>
+                  <a:spcPct val="100000"/>
+                </a:lnSpc>
+                <a:spcBef>
+                  <a:spcPts val="0"/>
+                </a:spcBef>
+                <a:spcAft>
+                  <a:spcPts val="0"/>
+                </a:spcAft>
+                <a:buClrTx/>
+                <a:buSzTx/>
+                <a:buFontTx/>
+                <a:buNone/>
+                <a:tabLst/>
+                <a:defRPr/>
+              </a:pPr>
+              <a:r>
+                <a:rPr lang="en-US" dirty="0"/>
+                <a:t>23,619 septic, adult ICU patients</a:t>
+              </a:r>
+              <a:br>
+                <a:rPr lang="en-US" dirty="0"/>
+              </a:br>
+              <a:r>
+                <a:rPr lang="en-US" dirty="0"/>
+                <a:t>in MIMIC-IV</a:t>
+              </a:r>
+            </a:p>
+          </p:txBody>
+        </p:sp>
+        <p:sp>
+          <p:nvSpPr>
+            <p:cNvPr id="45" name="Textfeld 10">
+              <a:extLst>
+                <a:ext uri="{FF2B5EF4-FFF2-40B4-BE49-F238E27FC236}">
+                  <a16:creationId xmlns:a16="http://schemas.microsoft.com/office/drawing/2014/main" id="{0D52EC6D-29BF-F573-9EF2-949924D2A59F}"/>
+                </a:ext>
+              </a:extLst>
+            </p:cNvPr>
+            <p:cNvSpPr txBox="1"/>
+            <p:nvPr/>
+          </p:nvSpPr>
+          <p:spPr>
+            <a:xfrm>
+              <a:off x="1292007" y="3771058"/>
+              <a:ext cx="2736000" cy="461665"/>
+            </a:xfrm>
+            <a:prstGeom prst="rect">
+              <a:avLst/>
+            </a:prstGeom>
+            <a:noFill/>
+            <a:ln>
+              <a:solidFill>
+                <a:schemeClr val="tx1"/>
+              </a:solidFill>
+            </a:ln>
+          </p:spPr>
+          <p:txBody>
+            <a:bodyPr wrap="square" rtlCol="0" anchor="ctr" anchorCtr="0">
+              <a:spAutoFit/>
+            </a:bodyPr>
+            <a:lstStyle/>
+            <a:p>
+              <a:r>
+                <a:rPr lang="en-US" sz="1200" dirty="0">
+                  <a:latin typeface="Arial" panose="020B0604020202020204" pitchFamily="34" charset="0"/>
+                  <a:cs typeface="Arial" panose="020B0604020202020204" pitchFamily="34" charset="0"/>
+                </a:rPr>
+                <a:t>Admissions excluded:</a:t>
+              </a:r>
+            </a:p>
+            <a:p>
+              <a:pPr marL="171450" indent="-171450">
+                <a:buFont typeface="Arial" panose="020B0604020202020204" pitchFamily="34" charset="0"/>
+                <a:buChar char="•"/>
+              </a:pPr>
+              <a:r>
+                <a:rPr lang="en-US" sz="1200" dirty="0">
+                  <a:latin typeface="Arial" panose="020B0604020202020204" pitchFamily="34" charset="0"/>
+                  <a:cs typeface="Arial" panose="020B0604020202020204" pitchFamily="34" charset="0"/>
+                </a:rPr>
+                <a:t>Recurrent stays (n=6,215)</a:t>
+              </a:r>
+            </a:p>
+          </p:txBody>
+        </p:sp>
+        <p:sp>
+          <p:nvSpPr>
+            <p:cNvPr id="60" name="TextBox 59">
+              <a:extLst>
+                <a:ext uri="{FF2B5EF4-FFF2-40B4-BE49-F238E27FC236}">
+                  <a16:creationId xmlns:a16="http://schemas.microsoft.com/office/drawing/2014/main" id="{F676E26C-ACD9-E555-A283-77C1880D7BA2}"/>
+                </a:ext>
+              </a:extLst>
+            </p:cNvPr>
+            <p:cNvSpPr txBox="1"/>
+            <p:nvPr/>
+          </p:nvSpPr>
+          <p:spPr>
+            <a:xfrm>
+              <a:off x="5040639" y="1827709"/>
+              <a:ext cx="2736000" cy="261610"/>
+            </a:xfrm>
+            <a:prstGeom prst="rect">
+              <a:avLst/>
+            </a:prstGeom>
+            <a:noFill/>
+          </p:spPr>
+          <p:txBody>
+            <a:bodyPr wrap="square" rtlCol="0">
+              <a:spAutoFit/>
+            </a:bodyPr>
+            <a:lstStyle/>
+            <a:p>
+              <a:pPr algn="ctr"/>
+              <a:r>
+                <a:rPr lang="en-GB" sz="1100" dirty="0">
+                  <a:latin typeface="Arial" panose="020B0604020202020204" pitchFamily="34" charset="0"/>
+                  <a:cs typeface="Arial" panose="020B0604020202020204" pitchFamily="34" charset="0"/>
+                </a:rPr>
+                <a:t>Male: 55.8%   White: 68.2%</a:t>
+              </a:r>
+            </a:p>
+          </p:txBody>
+        </p:sp>
+        <p:sp>
+          <p:nvSpPr>
+            <p:cNvPr id="61" name="TextBox 60">
+              <a:extLst>
+                <a:ext uri="{FF2B5EF4-FFF2-40B4-BE49-F238E27FC236}">
+                  <a16:creationId xmlns:a16="http://schemas.microsoft.com/office/drawing/2014/main" id="{02DD7EC9-E13C-8C89-A400-B123BA772A64}"/>
+                </a:ext>
+              </a:extLst>
+            </p:cNvPr>
+            <p:cNvSpPr txBox="1"/>
+            <p:nvPr/>
+          </p:nvSpPr>
+          <p:spPr>
+            <a:xfrm>
+              <a:off x="6120096" y="4939010"/>
+              <a:ext cx="2736000" cy="261610"/>
+            </a:xfrm>
+            <a:prstGeom prst="rect">
+              <a:avLst/>
+            </a:prstGeom>
+            <a:noFill/>
+          </p:spPr>
+          <p:txBody>
+            <a:bodyPr wrap="square" rtlCol="0">
+              <a:spAutoFit/>
+            </a:bodyPr>
+            <a:lstStyle/>
+            <a:p>
+              <a:pPr algn="ctr"/>
+              <a:r>
+                <a:rPr lang="en-GB" sz="1100" dirty="0">
+                  <a:latin typeface="Arial" panose="020B0604020202020204" pitchFamily="34" charset="0"/>
+                  <a:cs typeface="Arial" panose="020B0604020202020204" pitchFamily="34" charset="0"/>
+                </a:rPr>
+                <a:t>Male: 60.5%   White: 71.1%</a:t>
+              </a:r>
+            </a:p>
+          </p:txBody>
+        </p:sp>
+        <p:sp>
+          <p:nvSpPr>
+            <p:cNvPr id="62" name="TextBox 61">
+              <a:extLst>
+                <a:ext uri="{FF2B5EF4-FFF2-40B4-BE49-F238E27FC236}">
+                  <a16:creationId xmlns:a16="http://schemas.microsoft.com/office/drawing/2014/main" id="{4319D216-9028-E923-7F81-8EF6E9BB73C8}"/>
+                </a:ext>
+              </a:extLst>
+            </p:cNvPr>
+            <p:cNvSpPr txBox="1"/>
+            <p:nvPr/>
+          </p:nvSpPr>
+          <p:spPr>
+            <a:xfrm>
+              <a:off x="4119814" y="4915004"/>
+              <a:ext cx="2332583" cy="261610"/>
+            </a:xfrm>
+            <a:prstGeom prst="rect">
+              <a:avLst/>
+            </a:prstGeom>
+            <a:noFill/>
+          </p:spPr>
+          <p:txBody>
+            <a:bodyPr wrap="square" rtlCol="0">
+              <a:spAutoFit/>
+            </a:bodyPr>
+            <a:lstStyle/>
+            <a:p>
+              <a:pPr algn="ctr"/>
+              <a:r>
+                <a:rPr lang="en-GB" sz="1100" dirty="0">
+                  <a:latin typeface="Arial" panose="020B0604020202020204" pitchFamily="34" charset="0"/>
+                  <a:cs typeface="Arial" panose="020B0604020202020204" pitchFamily="34" charset="0"/>
+                </a:rPr>
+                <a:t>Male: 58.0%   White: 67.9%</a:t>
+              </a:r>
+            </a:p>
+          </p:txBody>
+        </p:sp>
+        <p:cxnSp>
+          <p:nvCxnSpPr>
+            <p:cNvPr id="7" name="Gerade Verbindung mit Pfeil 12">
+              <a:extLst>
+                <a:ext uri="{FF2B5EF4-FFF2-40B4-BE49-F238E27FC236}">
+                  <a16:creationId xmlns:a16="http://schemas.microsoft.com/office/drawing/2014/main" id="{96480360-F176-B925-738B-15A033B06231}"/>
+                </a:ext>
+              </a:extLst>
+            </p:cNvPr>
+            <p:cNvCxnSpPr>
+              <a:cxnSpLocks/>
+            </p:cNvCxnSpPr>
+            <p:nvPr/>
+          </p:nvCxnSpPr>
+          <p:spPr>
+            <a:xfrm flipH="1">
+              <a:off x="4026106" y="4629098"/>
+              <a:ext cx="392400" cy="0"/>
+            </a:xfrm>
+            <a:prstGeom prst="straightConnector1">
+              <a:avLst/>
+            </a:prstGeom>
+            <a:ln>
+              <a:tailEnd type="triangle"/>
+            </a:ln>
+          </p:spPr>
+          <p:style>
+            <a:lnRef idx="1">
+              <a:schemeClr val="dk1"/>
+            </a:lnRef>
+            <a:fillRef idx="0">
+              <a:schemeClr val="dk1"/>
+            </a:fillRef>
+            <a:effectRef idx="0">
+              <a:schemeClr val="dk1"/>
+            </a:effectRef>
+            <a:fontRef idx="minor">
               <a:schemeClr val="tx1"/>
+            </a:fontRef>
+          </p:style>
+        </p:cxnSp>
+        <p:cxnSp>
+          <p:nvCxnSpPr>
+            <p:cNvPr id="9" name="Straight Arrow Connector 8">
+              <a:extLst>
+                <a:ext uri="{FF2B5EF4-FFF2-40B4-BE49-F238E27FC236}">
+                  <a16:creationId xmlns:a16="http://schemas.microsoft.com/office/drawing/2014/main" id="{FC0E08A9-30B1-297F-08FA-744E6C23BD86}"/>
+                </a:ext>
+              </a:extLst>
+            </p:cNvPr>
+            <p:cNvCxnSpPr>
+              <a:cxnSpLocks/>
+            </p:cNvCxnSpPr>
+            <p:nvPr/>
+          </p:nvCxnSpPr>
+          <p:spPr bwMode="auto">
+            <a:xfrm flipH="1">
+              <a:off x="5290764" y="3731892"/>
+              <a:ext cx="542" cy="540000"/>
+            </a:xfrm>
+            <a:prstGeom prst="straightConnector1">
+              <a:avLst/>
+            </a:prstGeom>
+            <a:solidFill>
+              <a:schemeClr val="accent1"/>
             </a:solidFill>
-          </a:ln>
-        </p:spPr>
-        <p:txBody>
-          <a:bodyPr wrap="square" rtlCol="0" anchor="ctr" anchorCtr="0">
-            <a:noAutofit/>
-          </a:bodyPr>
-          <a:lstStyle/>
-          <a:p>
-            <a:pPr algn="ctr"/>
-            <a:r>
-              <a:rPr lang="en-US" sz="1200" dirty="0">
-                <a:latin typeface="Arial" panose="020B0604020202020204" pitchFamily="34" charset="0"/>
-                <a:cs typeface="Arial" panose="020B0604020202020204" pitchFamily="34" charset="0"/>
-              </a:rPr>
-              <a:t>73,181 ICU stays</a:t>
-            </a:r>
-            <a:br>
-              <a:rPr lang="en-US" sz="1200" dirty="0">
-                <a:latin typeface="Arial" panose="020B0604020202020204" pitchFamily="34" charset="0"/>
-                <a:cs typeface="Arial" panose="020B0604020202020204" pitchFamily="34" charset="0"/>
-              </a:rPr>
-            </a:br>
-            <a:r>
-              <a:rPr lang="en-US" sz="1200" dirty="0">
-                <a:latin typeface="Arial" panose="020B0604020202020204" pitchFamily="34" charset="0"/>
-                <a:cs typeface="Arial" panose="020B0604020202020204" pitchFamily="34" charset="0"/>
-              </a:rPr>
-              <a:t>in MIMIC-IV</a:t>
-            </a:r>
-          </a:p>
-        </p:txBody>
-      </p:sp>
-      <p:sp>
-        <p:nvSpPr>
-          <p:cNvPr id="11" name="Textfeld 10">
-            <a:extLst>
-              <a:ext uri="{FF2B5EF4-FFF2-40B4-BE49-F238E27FC236}">
-                <a16:creationId xmlns:a16="http://schemas.microsoft.com/office/drawing/2014/main" id="{F188F005-AEF6-BA48-BD4C-6F3F3DD7946E}"/>
-              </a:ext>
-            </a:extLst>
-          </p:cNvPr>
-          <p:cNvSpPr txBox="1"/>
-          <p:nvPr/>
-        </p:nvSpPr>
-        <p:spPr>
-          <a:xfrm>
-            <a:off x="8561874" y="755598"/>
-            <a:ext cx="2736000" cy="646331"/>
-          </a:xfrm>
-          <a:prstGeom prst="rect">
-            <a:avLst/>
-          </a:prstGeom>
-          <a:noFill/>
-          <a:ln>
+            <a:ln w="9525" cap="flat" cmpd="sng" algn="ctr">
+              <a:solidFill>
+                <a:schemeClr val="tx1"/>
+              </a:solidFill>
+              <a:prstDash val="solid"/>
+              <a:round/>
+              <a:headEnd type="none" w="med" len="med"/>
+              <a:tailEnd type="triangle"/>
+            </a:ln>
+            <a:effectLst/>
+          </p:spPr>
+        </p:cxnSp>
+        <p:cxnSp>
+          <p:nvCxnSpPr>
+            <p:cNvPr id="10" name="Straight Arrow Connector 9">
+              <a:extLst>
+                <a:ext uri="{FF2B5EF4-FFF2-40B4-BE49-F238E27FC236}">
+                  <a16:creationId xmlns:a16="http://schemas.microsoft.com/office/drawing/2014/main" id="{E7216D33-F855-70C6-7C18-2AEDF4531D65}"/>
+                </a:ext>
+              </a:extLst>
+            </p:cNvPr>
+            <p:cNvCxnSpPr>
+              <a:cxnSpLocks/>
+            </p:cNvCxnSpPr>
+            <p:nvPr/>
+          </p:nvCxnSpPr>
+          <p:spPr bwMode="auto">
+            <a:xfrm flipH="1">
+              <a:off x="4026106" y="3980190"/>
+              <a:ext cx="1260000" cy="0"/>
+            </a:xfrm>
+            <a:prstGeom prst="straightConnector1">
+              <a:avLst/>
+            </a:prstGeom>
             <a:solidFill>
+              <a:schemeClr val="accent1"/>
+            </a:solidFill>
+            <a:ln w="9525" cap="flat" cmpd="sng" algn="ctr">
+              <a:solidFill>
+                <a:schemeClr val="tx1"/>
+              </a:solidFill>
+              <a:prstDash val="solid"/>
+              <a:round/>
+              <a:headEnd type="none" w="med" len="med"/>
+              <a:tailEnd type="triangle"/>
+            </a:ln>
+            <a:effectLst/>
+          </p:spPr>
+        </p:cxnSp>
+        <p:cxnSp>
+          <p:nvCxnSpPr>
+            <p:cNvPr id="12" name="Gerade Verbindung mit Pfeil 12">
+              <a:extLst>
+                <a:ext uri="{FF2B5EF4-FFF2-40B4-BE49-F238E27FC236}">
+                  <a16:creationId xmlns:a16="http://schemas.microsoft.com/office/drawing/2014/main" id="{2FCFC923-CD76-F12E-B1BC-7835DF0E017C}"/>
+                </a:ext>
+              </a:extLst>
+            </p:cNvPr>
+            <p:cNvCxnSpPr>
+              <a:cxnSpLocks/>
+            </p:cNvCxnSpPr>
+            <p:nvPr/>
+          </p:nvCxnSpPr>
+          <p:spPr>
+            <a:xfrm>
+              <a:off x="7445564" y="3980190"/>
+              <a:ext cx="1258100" cy="0"/>
+            </a:xfrm>
+            <a:prstGeom prst="straightConnector1">
+              <a:avLst/>
+            </a:prstGeom>
+            <a:ln>
+              <a:tailEnd type="triangle"/>
+            </a:ln>
+          </p:spPr>
+          <p:style>
+            <a:lnRef idx="1">
+              <a:schemeClr val="dk1"/>
+            </a:lnRef>
+            <a:fillRef idx="0">
+              <a:schemeClr val="dk1"/>
+            </a:fillRef>
+            <a:effectRef idx="0">
+              <a:schemeClr val="dk1"/>
+            </a:effectRef>
+            <a:fontRef idx="minor">
               <a:schemeClr val="tx1"/>
+            </a:fontRef>
+          </p:style>
+        </p:cxnSp>
+        <p:cxnSp>
+          <p:nvCxnSpPr>
+            <p:cNvPr id="14" name="Straight Connector 13">
+              <a:extLst>
+                <a:ext uri="{FF2B5EF4-FFF2-40B4-BE49-F238E27FC236}">
+                  <a16:creationId xmlns:a16="http://schemas.microsoft.com/office/drawing/2014/main" id="{8EAC40F6-EDD4-4FA2-FCC3-28E927BA1110}"/>
+                </a:ext>
+              </a:extLst>
+            </p:cNvPr>
+            <p:cNvCxnSpPr/>
+            <p:nvPr/>
+          </p:nvCxnSpPr>
+          <p:spPr bwMode="auto">
+            <a:xfrm flipH="1">
+              <a:off x="6366107" y="3371772"/>
+              <a:ext cx="4657" cy="359581"/>
+            </a:xfrm>
+            <a:prstGeom prst="line">
+              <a:avLst/>
+            </a:prstGeom>
+            <a:solidFill>
+              <a:schemeClr val="accent1"/>
             </a:solidFill>
-          </a:ln>
-        </p:spPr>
-        <p:txBody>
-          <a:bodyPr wrap="square" rtlCol="0" anchor="ctr" anchorCtr="0">
-            <a:spAutoFit/>
-          </a:bodyPr>
-          <a:lstStyle/>
-          <a:p>
-            <a:r>
-              <a:rPr lang="en-US" sz="1200" dirty="0">
-                <a:latin typeface="Arial" panose="020B0604020202020204" pitchFamily="34" charset="0"/>
-                <a:cs typeface="Arial" panose="020B0604020202020204" pitchFamily="34" charset="0"/>
-              </a:rPr>
-              <a:t>Admissions excluded:</a:t>
-            </a:r>
-          </a:p>
-          <a:p>
-            <a:pPr marL="171450" indent="-171450">
-              <a:buFont typeface="Arial" panose="020B0604020202020204" pitchFamily="34" charset="0"/>
-              <a:buChar char="•"/>
-            </a:pPr>
-            <a:r>
-              <a:rPr lang="en-US" sz="1200" dirty="0">
-                <a:latin typeface="Arial" panose="020B0604020202020204" pitchFamily="34" charset="0"/>
-                <a:cs typeface="Arial" panose="020B0604020202020204" pitchFamily="34" charset="0"/>
-              </a:rPr>
-              <a:t>Non-septic ICU stays (n=32,971)</a:t>
-            </a:r>
-          </a:p>
-          <a:p>
-            <a:pPr marL="171450" indent="-171450">
-              <a:buFont typeface="Arial" panose="020B0604020202020204" pitchFamily="34" charset="0"/>
-              <a:buChar char="•"/>
-            </a:pPr>
-            <a:r>
-              <a:rPr lang="en-US" sz="1200" dirty="0">
-                <a:latin typeface="Arial" panose="020B0604020202020204" pitchFamily="34" charset="0"/>
-                <a:cs typeface="Arial" panose="020B0604020202020204" pitchFamily="34" charset="0"/>
-              </a:rPr>
-              <a:t>LoS &lt; 24 hours (n=3,137)</a:t>
-            </a:r>
-          </a:p>
-        </p:txBody>
-      </p:sp>
-      <p:cxnSp>
-        <p:nvCxnSpPr>
-          <p:cNvPr id="13" name="Gerade Verbindung mit Pfeil 12">
-            <a:extLst>
-              <a:ext uri="{FF2B5EF4-FFF2-40B4-BE49-F238E27FC236}">
-                <a16:creationId xmlns:a16="http://schemas.microsoft.com/office/drawing/2014/main" id="{FA7D861E-928E-9D4C-8857-46CFE561DB05}"/>
-              </a:ext>
-            </a:extLst>
-          </p:cNvPr>
-          <p:cNvCxnSpPr>
-            <a:cxnSpLocks/>
-            <a:endCxn id="11" idx="1"/>
-          </p:cNvCxnSpPr>
-          <p:nvPr/>
-        </p:nvCxnSpPr>
-        <p:spPr>
-          <a:xfrm>
-            <a:off x="7303774" y="1078764"/>
-            <a:ext cx="1258100" cy="0"/>
-          </a:xfrm>
-          <a:prstGeom prst="straightConnector1">
-            <a:avLst/>
-          </a:prstGeom>
-          <a:ln>
-            <a:tailEnd type="triangle"/>
-          </a:ln>
-        </p:spPr>
-        <p:style>
-          <a:lnRef idx="1">
-            <a:schemeClr val="dk1"/>
-          </a:lnRef>
-          <a:fillRef idx="0">
-            <a:schemeClr val="dk1"/>
-          </a:fillRef>
-          <a:effectRef idx="0">
-            <a:schemeClr val="dk1"/>
-          </a:effectRef>
-          <a:fontRef idx="minor">
-            <a:schemeClr val="tx1"/>
-          </a:fontRef>
-        </p:style>
-      </p:cxnSp>
-      <p:cxnSp>
-        <p:nvCxnSpPr>
-          <p:cNvPr id="25" name="Gerade Verbindung mit Pfeil 11">
-            <a:extLst>
-              <a:ext uri="{FF2B5EF4-FFF2-40B4-BE49-F238E27FC236}">
-                <a16:creationId xmlns:a16="http://schemas.microsoft.com/office/drawing/2014/main" id="{42BA8543-846E-0AC6-97E0-03187A3A168F}"/>
-              </a:ext>
-            </a:extLst>
-          </p:cNvPr>
-          <p:cNvCxnSpPr>
-            <a:cxnSpLocks/>
-            <a:stCxn id="8" idx="2"/>
-            <a:endCxn id="16" idx="0"/>
-          </p:cNvCxnSpPr>
-          <p:nvPr/>
-        </p:nvCxnSpPr>
-        <p:spPr>
-          <a:xfrm>
-            <a:off x="7307889" y="605415"/>
-            <a:ext cx="542" cy="1029879"/>
-          </a:xfrm>
-          <a:prstGeom prst="straightConnector1">
-            <a:avLst/>
-          </a:prstGeom>
-          <a:ln>
-            <a:tailEnd type="triangle"/>
-          </a:ln>
-        </p:spPr>
-        <p:style>
-          <a:lnRef idx="1">
-            <a:schemeClr val="dk1"/>
-          </a:lnRef>
-          <a:fillRef idx="0">
-            <a:schemeClr val="dk1"/>
-          </a:fillRef>
-          <a:effectRef idx="0">
-            <a:schemeClr val="dk1"/>
-          </a:effectRef>
-          <a:fontRef idx="minor">
-            <a:schemeClr val="tx1"/>
-          </a:fontRef>
-        </p:style>
-      </p:cxnSp>
-      <p:sp>
-        <p:nvSpPr>
-          <p:cNvPr id="19" name="Textfeld 7">
-            <a:extLst>
-              <a:ext uri="{FF2B5EF4-FFF2-40B4-BE49-F238E27FC236}">
-                <a16:creationId xmlns:a16="http://schemas.microsoft.com/office/drawing/2014/main" id="{AEFE7EEA-BDA2-20BC-5D61-68CC27C8F74D}"/>
-              </a:ext>
-            </a:extLst>
-          </p:cNvPr>
-          <p:cNvSpPr txBox="1"/>
-          <p:nvPr/>
-        </p:nvSpPr>
-        <p:spPr>
-          <a:xfrm>
-            <a:off x="7525697" y="3041026"/>
-            <a:ext cx="1723297" cy="649772"/>
-          </a:xfrm>
-          <a:prstGeom prst="rect">
-            <a:avLst/>
-          </a:prstGeom>
-          <a:noFill/>
-          <a:ln>
+            <a:ln w="9525" cap="flat" cmpd="sng" algn="ctr">
+              <a:solidFill>
+                <a:schemeClr val="tx1"/>
+              </a:solidFill>
+              <a:prstDash val="solid"/>
+              <a:round/>
+              <a:headEnd type="none" w="med" len="med"/>
+              <a:tailEnd type="none" w="med" len="med"/>
+            </a:ln>
+            <a:effectLst/>
+          </p:spPr>
+        </p:cxnSp>
+        <p:cxnSp>
+          <p:nvCxnSpPr>
+            <p:cNvPr id="21" name="Straight Connector 20">
+              <a:extLst>
+                <a:ext uri="{FF2B5EF4-FFF2-40B4-BE49-F238E27FC236}">
+                  <a16:creationId xmlns:a16="http://schemas.microsoft.com/office/drawing/2014/main" id="{7D7A2F8A-329C-CD04-833E-9A6903438BCC}"/>
+                </a:ext>
+              </a:extLst>
+            </p:cNvPr>
+            <p:cNvCxnSpPr/>
+            <p:nvPr/>
+          </p:nvCxnSpPr>
+          <p:spPr bwMode="auto">
+            <a:xfrm>
+              <a:off x="6366107" y="3731353"/>
+              <a:ext cx="1080000" cy="0"/>
+            </a:xfrm>
+            <a:prstGeom prst="line">
+              <a:avLst/>
+            </a:prstGeom>
             <a:solidFill>
-              <a:schemeClr val="tx1"/>
+              <a:schemeClr val="accent1"/>
             </a:solidFill>
-          </a:ln>
-        </p:spPr>
-        <p:txBody>
-          <a:bodyPr wrap="square" rtlCol="0" anchor="ctr" anchorCtr="0">
-            <a:noAutofit/>
-          </a:bodyPr>
-          <a:lstStyle>
-            <a:defPPr>
-              <a:defRPr lang="de-DE"/>
-            </a:defPPr>
-            <a:lvl1pPr algn="ctr">
-              <a:defRPr sz="1200">
-                <a:latin typeface="Arial" panose="020B0604020202020204" pitchFamily="34" charset="0"/>
-                <a:cs typeface="Arial" panose="020B0604020202020204" pitchFamily="34" charset="0"/>
-              </a:defRPr>
-            </a:lvl1pPr>
-          </a:lstStyle>
-          <a:p>
-            <a:r>
-              <a:rPr lang="en-US" dirty="0"/>
-              <a:t>23,619 septic, adult ICU patients</a:t>
-            </a:r>
-            <a:br>
-              <a:rPr lang="en-US" dirty="0"/>
-            </a:br>
-            <a:r>
-              <a:rPr lang="en-US" dirty="0"/>
-              <a:t>in MIMIC-IV</a:t>
-            </a:r>
-          </a:p>
-        </p:txBody>
-      </p:sp>
-      <p:cxnSp>
-        <p:nvCxnSpPr>
-          <p:cNvPr id="15" name="Gerade Verbindung mit Pfeil 12">
-            <a:extLst>
-              <a:ext uri="{FF2B5EF4-FFF2-40B4-BE49-F238E27FC236}">
-                <a16:creationId xmlns:a16="http://schemas.microsoft.com/office/drawing/2014/main" id="{F34C12CE-4A48-406E-0A50-22CA336BD8E8}"/>
-              </a:ext>
-            </a:extLst>
-          </p:cNvPr>
-          <p:cNvCxnSpPr>
-            <a:cxnSpLocks/>
-          </p:cNvCxnSpPr>
-          <p:nvPr/>
-        </p:nvCxnSpPr>
-        <p:spPr>
-          <a:xfrm>
-            <a:off x="9249536" y="3352126"/>
-            <a:ext cx="391795" cy="0"/>
-          </a:xfrm>
-          <a:prstGeom prst="straightConnector1">
-            <a:avLst/>
-          </a:prstGeom>
-          <a:ln>
-            <a:tailEnd type="triangle"/>
-          </a:ln>
-        </p:spPr>
-        <p:style>
-          <a:lnRef idx="1">
-            <a:schemeClr val="dk1"/>
-          </a:lnRef>
-          <a:fillRef idx="0">
-            <a:schemeClr val="dk1"/>
-          </a:fillRef>
-          <a:effectRef idx="0">
-            <a:schemeClr val="dk1"/>
-          </a:effectRef>
-          <a:fontRef idx="minor">
-            <a:schemeClr val="tx1"/>
-          </a:fontRef>
-        </p:style>
-      </p:cxnSp>
-      <p:sp>
-        <p:nvSpPr>
-          <p:cNvPr id="17" name="Textfeld 10">
-            <a:extLst>
-              <a:ext uri="{FF2B5EF4-FFF2-40B4-BE49-F238E27FC236}">
-                <a16:creationId xmlns:a16="http://schemas.microsoft.com/office/drawing/2014/main" id="{E59E9680-9E9F-174A-4EBF-C509867CC912}"/>
-              </a:ext>
-            </a:extLst>
-          </p:cNvPr>
-          <p:cNvSpPr txBox="1"/>
-          <p:nvPr/>
-        </p:nvSpPr>
-        <p:spPr>
-          <a:xfrm>
-            <a:off x="9641330" y="3243743"/>
-            <a:ext cx="2736001" cy="276999"/>
-          </a:xfrm>
-          <a:prstGeom prst="rect">
-            <a:avLst/>
-          </a:prstGeom>
-          <a:solidFill>
-            <a:schemeClr val="bg1">
-              <a:lumMod val="85000"/>
-            </a:schemeClr>
-          </a:solidFill>
-          <a:ln>
+            <a:ln w="9525" cap="flat" cmpd="sng" algn="ctr">
+              <a:solidFill>
+                <a:schemeClr val="tx1"/>
+              </a:solidFill>
+              <a:prstDash val="solid"/>
+              <a:round/>
+              <a:headEnd type="none" w="med" len="med"/>
+              <a:tailEnd type="none" w="med" len="med"/>
+            </a:ln>
+            <a:effectLst/>
+          </p:spPr>
+        </p:cxnSp>
+        <p:cxnSp>
+          <p:nvCxnSpPr>
+            <p:cNvPr id="22" name="Straight Arrow Connector 21">
+              <a:extLst>
+                <a:ext uri="{FF2B5EF4-FFF2-40B4-BE49-F238E27FC236}">
+                  <a16:creationId xmlns:a16="http://schemas.microsoft.com/office/drawing/2014/main" id="{3567FBB4-11D0-29FC-9D73-DA41C79AC2A0}"/>
+                </a:ext>
+              </a:extLst>
+            </p:cNvPr>
+            <p:cNvCxnSpPr>
+              <a:cxnSpLocks/>
+            </p:cNvCxnSpPr>
+            <p:nvPr/>
+          </p:nvCxnSpPr>
+          <p:spPr bwMode="auto">
+            <a:xfrm flipH="1">
+              <a:off x="7445023" y="3733360"/>
+              <a:ext cx="542" cy="540000"/>
+            </a:xfrm>
+            <a:prstGeom prst="straightConnector1">
+              <a:avLst/>
+            </a:prstGeom>
             <a:solidFill>
-              <a:schemeClr val="tx1"/>
+              <a:schemeClr val="accent1"/>
             </a:solidFill>
-          </a:ln>
-        </p:spPr>
-        <p:txBody>
-          <a:bodyPr wrap="square" rtlCol="0" anchor="ctr" anchorCtr="0">
-            <a:spAutoFit/>
-          </a:bodyPr>
-          <a:lstStyle/>
-          <a:p>
-            <a:r>
-              <a:rPr lang="en-US" sz="1200" dirty="0">
-                <a:latin typeface="Arial" panose="020B0604020202020204" pitchFamily="34" charset="0"/>
-                <a:cs typeface="Arial" panose="020B0604020202020204" pitchFamily="34" charset="0"/>
-              </a:rPr>
-              <a:t>Q1: Cancer vs. Non-Cancer Patients</a:t>
-            </a:r>
-          </a:p>
-        </p:txBody>
-      </p:sp>
-      <p:sp>
-        <p:nvSpPr>
-          <p:cNvPr id="20" name="Textfeld 10">
-            <a:extLst>
-              <a:ext uri="{FF2B5EF4-FFF2-40B4-BE49-F238E27FC236}">
-                <a16:creationId xmlns:a16="http://schemas.microsoft.com/office/drawing/2014/main" id="{4C4CD834-F96B-6FE9-1216-2A095314CD7B}"/>
-              </a:ext>
-            </a:extLst>
-          </p:cNvPr>
-          <p:cNvSpPr txBox="1"/>
-          <p:nvPr/>
-        </p:nvSpPr>
-        <p:spPr>
-          <a:xfrm>
-            <a:off x="2229673" y="3243743"/>
-            <a:ext cx="2736001" cy="276999"/>
-          </a:xfrm>
-          <a:prstGeom prst="rect">
-            <a:avLst/>
-          </a:prstGeom>
-          <a:solidFill>
-            <a:schemeClr val="bg1">
-              <a:lumMod val="85000"/>
-            </a:schemeClr>
-          </a:solidFill>
-          <a:ln>
+            <a:ln w="9525" cap="flat" cmpd="sng" algn="ctr">
+              <a:solidFill>
+                <a:schemeClr val="tx1"/>
+              </a:solidFill>
+              <a:prstDash val="solid"/>
+              <a:round/>
+              <a:headEnd type="none" w="med" len="med"/>
+              <a:tailEnd type="triangle"/>
+            </a:ln>
+            <a:effectLst/>
+          </p:spPr>
+        </p:cxnSp>
+        <p:cxnSp>
+          <p:nvCxnSpPr>
+            <p:cNvPr id="24" name="Straight Connector 23">
+              <a:extLst>
+                <a:ext uri="{FF2B5EF4-FFF2-40B4-BE49-F238E27FC236}">
+                  <a16:creationId xmlns:a16="http://schemas.microsoft.com/office/drawing/2014/main" id="{77C9E145-BD2D-B87E-CA60-ABE3C82E9975}"/>
+                </a:ext>
+              </a:extLst>
+            </p:cNvPr>
+            <p:cNvCxnSpPr/>
+            <p:nvPr/>
+          </p:nvCxnSpPr>
+          <p:spPr bwMode="auto">
+            <a:xfrm>
+              <a:off x="5286106" y="3731353"/>
+              <a:ext cx="1080000" cy="0"/>
+            </a:xfrm>
+            <a:prstGeom prst="line">
+              <a:avLst/>
+            </a:prstGeom>
             <a:solidFill>
-              <a:schemeClr val="tx1"/>
+              <a:schemeClr val="accent1"/>
             </a:solidFill>
-          </a:ln>
-        </p:spPr>
-        <p:txBody>
-          <a:bodyPr wrap="square" rtlCol="0" anchor="ctr" anchorCtr="0">
-            <a:spAutoFit/>
-          </a:bodyPr>
-          <a:lstStyle/>
-          <a:p>
-            <a:r>
-              <a:rPr lang="en-US" sz="1200" dirty="0">
-                <a:latin typeface="Arial" panose="020B0604020202020204" pitchFamily="34" charset="0"/>
-                <a:cs typeface="Arial" panose="020B0604020202020204" pitchFamily="34" charset="0"/>
-              </a:rPr>
-              <a:t>Q2: Different Cancer Patients</a:t>
-            </a:r>
-          </a:p>
-        </p:txBody>
-      </p:sp>
-      <p:sp>
-        <p:nvSpPr>
-          <p:cNvPr id="16" name="Textfeld 7">
-            <a:extLst>
-              <a:ext uri="{FF2B5EF4-FFF2-40B4-BE49-F238E27FC236}">
-                <a16:creationId xmlns:a16="http://schemas.microsoft.com/office/drawing/2014/main" id="{19CBBCD9-103F-877B-E0AD-FB8B2DB5AB8E}"/>
-              </a:ext>
-            </a:extLst>
-          </p:cNvPr>
-          <p:cNvSpPr txBox="1"/>
-          <p:nvPr/>
-        </p:nvSpPr>
-        <p:spPr>
-          <a:xfrm>
-            <a:off x="6446782" y="1635294"/>
-            <a:ext cx="1723297" cy="492067"/>
-          </a:xfrm>
-          <a:prstGeom prst="rect">
-            <a:avLst/>
-          </a:prstGeom>
-          <a:noFill/>
-          <a:ln>
-            <a:solidFill>
-              <a:schemeClr val="tx1"/>
-            </a:solidFill>
-          </a:ln>
-        </p:spPr>
-        <p:txBody>
-          <a:bodyPr wrap="square" rtlCol="0" anchor="ctr" anchorCtr="0">
-            <a:noAutofit/>
-          </a:bodyPr>
-          <a:lstStyle/>
-          <a:p>
-            <a:pPr algn="ctr"/>
-            <a:r>
-              <a:rPr lang="en-US" sz="1200" dirty="0">
-                <a:latin typeface="Arial" panose="020B0604020202020204" pitchFamily="34" charset="0"/>
-                <a:cs typeface="Arial" panose="020B0604020202020204" pitchFamily="34" charset="0"/>
-              </a:rPr>
-              <a:t>29,834 ICU septic stays in MIMIC-IV</a:t>
-            </a:r>
-          </a:p>
-        </p:txBody>
-      </p:sp>
-      <p:sp>
-        <p:nvSpPr>
-          <p:cNvPr id="32" name="Textfeld 10">
-            <a:extLst>
-              <a:ext uri="{FF2B5EF4-FFF2-40B4-BE49-F238E27FC236}">
-                <a16:creationId xmlns:a16="http://schemas.microsoft.com/office/drawing/2014/main" id="{3E697BD2-CAC6-821B-B9CF-59083AE152CC}"/>
-              </a:ext>
-            </a:extLst>
-          </p:cNvPr>
-          <p:cNvSpPr txBox="1"/>
-          <p:nvPr/>
-        </p:nvSpPr>
-        <p:spPr>
-          <a:xfrm>
-            <a:off x="9641331" y="2498100"/>
-            <a:ext cx="2736000" cy="461665"/>
-          </a:xfrm>
-          <a:prstGeom prst="rect">
-            <a:avLst/>
-          </a:prstGeom>
-          <a:noFill/>
-          <a:ln>
-            <a:solidFill>
-              <a:schemeClr val="tx1"/>
-            </a:solidFill>
-          </a:ln>
-        </p:spPr>
-        <p:txBody>
-          <a:bodyPr wrap="square" rtlCol="0" anchor="ctr" anchorCtr="0">
-            <a:spAutoFit/>
-          </a:bodyPr>
-          <a:lstStyle/>
-          <a:p>
-            <a:r>
-              <a:rPr lang="en-US" sz="1200" dirty="0">
-                <a:latin typeface="Arial" panose="020B0604020202020204" pitchFamily="34" charset="0"/>
-                <a:cs typeface="Arial" panose="020B0604020202020204" pitchFamily="34" charset="0"/>
-              </a:rPr>
-              <a:t>Admissions excluded:</a:t>
-            </a:r>
-          </a:p>
-          <a:p>
-            <a:pPr marL="171450" indent="-171450">
-              <a:buFont typeface="Arial" panose="020B0604020202020204" pitchFamily="34" charset="0"/>
-              <a:buChar char="•"/>
-            </a:pPr>
-            <a:r>
-              <a:rPr lang="en-US" sz="1200" dirty="0">
-                <a:latin typeface="Arial" panose="020B0604020202020204" pitchFamily="34" charset="0"/>
-                <a:cs typeface="Arial" panose="020B0604020202020204" pitchFamily="34" charset="0"/>
-              </a:rPr>
-              <a:t>Recurrent stays (n=6,215)</a:t>
-            </a:r>
-          </a:p>
-        </p:txBody>
-      </p:sp>
-      <p:sp>
-        <p:nvSpPr>
-          <p:cNvPr id="41" name="Textfeld 7">
-            <a:extLst>
-              <a:ext uri="{FF2B5EF4-FFF2-40B4-BE49-F238E27FC236}">
-                <a16:creationId xmlns:a16="http://schemas.microsoft.com/office/drawing/2014/main" id="{7A973194-C3C7-4AC9-E195-B05B1C73840B}"/>
-              </a:ext>
-            </a:extLst>
-          </p:cNvPr>
-          <p:cNvSpPr txBox="1"/>
-          <p:nvPr/>
-        </p:nvSpPr>
-        <p:spPr>
-          <a:xfrm>
-            <a:off x="5366063" y="3041026"/>
-            <a:ext cx="1723297" cy="649772"/>
-          </a:xfrm>
-          <a:prstGeom prst="rect">
-            <a:avLst/>
-          </a:prstGeom>
-          <a:noFill/>
-          <a:ln>
-            <a:solidFill>
-              <a:schemeClr val="tx1"/>
-            </a:solidFill>
-          </a:ln>
-        </p:spPr>
-        <p:txBody>
-          <a:bodyPr wrap="square" rtlCol="0" anchor="ctr" anchorCtr="0">
-            <a:noAutofit/>
-          </a:bodyPr>
-          <a:lstStyle>
-            <a:defPPr>
-              <a:defRPr lang="de-DE"/>
-            </a:defPPr>
-            <a:lvl1pPr algn="ctr">
-              <a:defRPr sz="1200">
-                <a:latin typeface="Arial" panose="020B0604020202020204" pitchFamily="34" charset="0"/>
-                <a:cs typeface="Arial" panose="020B0604020202020204" pitchFamily="34" charset="0"/>
-              </a:defRPr>
-            </a:lvl1pPr>
-          </a:lstStyle>
-          <a:p>
-            <a:r>
-              <a:rPr lang="en-US" dirty="0"/>
-              <a:t>4,067 septic, adult, cancer ICU patients</a:t>
-            </a:r>
-            <a:br>
-              <a:rPr lang="en-US" dirty="0"/>
-            </a:br>
-            <a:r>
-              <a:rPr lang="en-US" dirty="0"/>
-              <a:t>in MIMIC-IV</a:t>
-            </a:r>
-          </a:p>
-        </p:txBody>
-      </p:sp>
-      <p:sp>
-        <p:nvSpPr>
-          <p:cNvPr id="45" name="Textfeld 10">
-            <a:extLst>
-              <a:ext uri="{FF2B5EF4-FFF2-40B4-BE49-F238E27FC236}">
-                <a16:creationId xmlns:a16="http://schemas.microsoft.com/office/drawing/2014/main" id="{0D52EC6D-29BF-F573-9EF2-949924D2A59F}"/>
-              </a:ext>
-            </a:extLst>
-          </p:cNvPr>
-          <p:cNvSpPr txBox="1"/>
-          <p:nvPr/>
-        </p:nvSpPr>
-        <p:spPr>
-          <a:xfrm>
-            <a:off x="2229674" y="2431870"/>
-            <a:ext cx="2736000" cy="646331"/>
-          </a:xfrm>
-          <a:prstGeom prst="rect">
-            <a:avLst/>
-          </a:prstGeom>
-          <a:noFill/>
-          <a:ln>
-            <a:solidFill>
-              <a:schemeClr val="tx1"/>
-            </a:solidFill>
-          </a:ln>
-        </p:spPr>
-        <p:txBody>
-          <a:bodyPr wrap="square" rtlCol="0" anchor="ctr" anchorCtr="0">
-            <a:spAutoFit/>
-          </a:bodyPr>
-          <a:lstStyle/>
-          <a:p>
-            <a:r>
-              <a:rPr lang="en-US" sz="1200" dirty="0">
-                <a:latin typeface="Arial" panose="020B0604020202020204" pitchFamily="34" charset="0"/>
-                <a:cs typeface="Arial" panose="020B0604020202020204" pitchFamily="34" charset="0"/>
-              </a:rPr>
-              <a:t>Admissions excluded:</a:t>
-            </a:r>
-          </a:p>
-          <a:p>
-            <a:pPr marL="171450" indent="-171450">
-              <a:buFont typeface="Arial" panose="020B0604020202020204" pitchFamily="34" charset="0"/>
-              <a:buChar char="•"/>
-            </a:pPr>
-            <a:r>
-              <a:rPr lang="en-US" sz="1200" dirty="0">
-                <a:latin typeface="Arial" panose="020B0604020202020204" pitchFamily="34" charset="0"/>
-                <a:cs typeface="Arial" panose="020B0604020202020204" pitchFamily="34" charset="0"/>
-              </a:rPr>
-              <a:t>Non-cancer stays (n=24,950)</a:t>
-            </a:r>
-          </a:p>
-          <a:p>
-            <a:pPr marL="171450" indent="-171450">
-              <a:buFont typeface="Arial" panose="020B0604020202020204" pitchFamily="34" charset="0"/>
-              <a:buChar char="•"/>
-            </a:pPr>
-            <a:r>
-              <a:rPr lang="en-US" sz="1200" dirty="0">
-                <a:latin typeface="Arial" panose="020B0604020202020204" pitchFamily="34" charset="0"/>
-                <a:cs typeface="Arial" panose="020B0604020202020204" pitchFamily="34" charset="0"/>
-              </a:rPr>
-              <a:t>Recurrent stays (n=817)</a:t>
-            </a:r>
-          </a:p>
-        </p:txBody>
-      </p:sp>
-      <p:sp>
-        <p:nvSpPr>
-          <p:cNvPr id="60" name="TextBox 59">
-            <a:extLst>
-              <a:ext uri="{FF2B5EF4-FFF2-40B4-BE49-F238E27FC236}">
-                <a16:creationId xmlns:a16="http://schemas.microsoft.com/office/drawing/2014/main" id="{F676E26C-ACD9-E555-A283-77C1880D7BA2}"/>
-              </a:ext>
-            </a:extLst>
-          </p:cNvPr>
-          <p:cNvSpPr txBox="1"/>
-          <p:nvPr/>
-        </p:nvSpPr>
-        <p:spPr>
-          <a:xfrm>
-            <a:off x="5978306" y="580853"/>
-            <a:ext cx="2736000" cy="261610"/>
-          </a:xfrm>
-          <a:prstGeom prst="rect">
-            <a:avLst/>
-          </a:prstGeom>
-          <a:noFill/>
-        </p:spPr>
-        <p:txBody>
-          <a:bodyPr wrap="square" rtlCol="0">
-            <a:spAutoFit/>
-          </a:bodyPr>
-          <a:lstStyle/>
-          <a:p>
-            <a:pPr algn="ctr"/>
-            <a:r>
-              <a:rPr lang="en-GB" sz="1100" dirty="0">
-                <a:latin typeface="Arial" panose="020B0604020202020204" pitchFamily="34" charset="0"/>
-                <a:cs typeface="Arial" panose="020B0604020202020204" pitchFamily="34" charset="0"/>
-              </a:rPr>
-              <a:t>Male: 55.8%   White: 68.2%</a:t>
-            </a:r>
-          </a:p>
-        </p:txBody>
-      </p:sp>
-      <p:sp>
-        <p:nvSpPr>
-          <p:cNvPr id="61" name="TextBox 60">
-            <a:extLst>
-              <a:ext uri="{FF2B5EF4-FFF2-40B4-BE49-F238E27FC236}">
-                <a16:creationId xmlns:a16="http://schemas.microsoft.com/office/drawing/2014/main" id="{02DD7EC9-E13C-8C89-A400-B123BA772A64}"/>
-              </a:ext>
-            </a:extLst>
-          </p:cNvPr>
-          <p:cNvSpPr txBox="1"/>
-          <p:nvPr/>
-        </p:nvSpPr>
-        <p:spPr>
-          <a:xfrm>
-            <a:off x="7057763" y="3692154"/>
-            <a:ext cx="2736000" cy="261610"/>
-          </a:xfrm>
-          <a:prstGeom prst="rect">
-            <a:avLst/>
-          </a:prstGeom>
-          <a:noFill/>
-        </p:spPr>
-        <p:txBody>
-          <a:bodyPr wrap="square" rtlCol="0">
-            <a:spAutoFit/>
-          </a:bodyPr>
-          <a:lstStyle/>
-          <a:p>
-            <a:pPr algn="ctr"/>
-            <a:r>
-              <a:rPr lang="en-GB" sz="1100" dirty="0">
-                <a:latin typeface="Arial" panose="020B0604020202020204" pitchFamily="34" charset="0"/>
-                <a:cs typeface="Arial" panose="020B0604020202020204" pitchFamily="34" charset="0"/>
-              </a:rPr>
-              <a:t>Male: 58.0%   White: 67.9%</a:t>
-            </a:r>
-          </a:p>
-        </p:txBody>
-      </p:sp>
-      <p:sp>
-        <p:nvSpPr>
-          <p:cNvPr id="62" name="TextBox 61">
-            <a:extLst>
-              <a:ext uri="{FF2B5EF4-FFF2-40B4-BE49-F238E27FC236}">
-                <a16:creationId xmlns:a16="http://schemas.microsoft.com/office/drawing/2014/main" id="{4319D216-9028-E923-7F81-8EF6E9BB73C8}"/>
-              </a:ext>
-            </a:extLst>
-          </p:cNvPr>
-          <p:cNvSpPr txBox="1"/>
-          <p:nvPr/>
-        </p:nvSpPr>
-        <p:spPr>
-          <a:xfrm>
-            <a:off x="5057481" y="3668148"/>
-            <a:ext cx="2332583" cy="261610"/>
-          </a:xfrm>
-          <a:prstGeom prst="rect">
-            <a:avLst/>
-          </a:prstGeom>
-          <a:noFill/>
-        </p:spPr>
-        <p:txBody>
-          <a:bodyPr wrap="square" rtlCol="0">
-            <a:spAutoFit/>
-          </a:bodyPr>
-          <a:lstStyle/>
-          <a:p>
-            <a:pPr algn="ctr"/>
-            <a:r>
-              <a:rPr lang="en-GB" sz="1100" dirty="0">
-                <a:latin typeface="Arial" panose="020B0604020202020204" pitchFamily="34" charset="0"/>
-                <a:cs typeface="Arial" panose="020B0604020202020204" pitchFamily="34" charset="0"/>
-              </a:rPr>
-              <a:t>Male: 60.5%   White: 71.1%</a:t>
-            </a:r>
-          </a:p>
-        </p:txBody>
-      </p:sp>
-      <p:cxnSp>
-        <p:nvCxnSpPr>
-          <p:cNvPr id="7" name="Gerade Verbindung mit Pfeil 12">
-            <a:extLst>
-              <a:ext uri="{FF2B5EF4-FFF2-40B4-BE49-F238E27FC236}">
-                <a16:creationId xmlns:a16="http://schemas.microsoft.com/office/drawing/2014/main" id="{96480360-F176-B925-738B-15A033B06231}"/>
-              </a:ext>
-            </a:extLst>
-          </p:cNvPr>
-          <p:cNvCxnSpPr>
-            <a:cxnSpLocks/>
-          </p:cNvCxnSpPr>
-          <p:nvPr/>
-        </p:nvCxnSpPr>
-        <p:spPr>
-          <a:xfrm flipH="1">
-            <a:off x="4963773" y="3382242"/>
-            <a:ext cx="392400" cy="0"/>
-          </a:xfrm>
-          <a:prstGeom prst="straightConnector1">
-            <a:avLst/>
-          </a:prstGeom>
-          <a:ln>
-            <a:tailEnd type="triangle"/>
-          </a:ln>
-        </p:spPr>
-        <p:style>
-          <a:lnRef idx="1">
-            <a:schemeClr val="dk1"/>
-          </a:lnRef>
-          <a:fillRef idx="0">
-            <a:schemeClr val="dk1"/>
-          </a:fillRef>
-          <a:effectRef idx="0">
-            <a:schemeClr val="dk1"/>
-          </a:effectRef>
-          <a:fontRef idx="minor">
-            <a:schemeClr val="tx1"/>
-          </a:fontRef>
-        </p:style>
-      </p:cxnSp>
-      <p:cxnSp>
-        <p:nvCxnSpPr>
-          <p:cNvPr id="9" name="Straight Arrow Connector 8">
-            <a:extLst>
-              <a:ext uri="{FF2B5EF4-FFF2-40B4-BE49-F238E27FC236}">
-                <a16:creationId xmlns:a16="http://schemas.microsoft.com/office/drawing/2014/main" id="{FC0E08A9-30B1-297F-08FA-744E6C23BD86}"/>
-              </a:ext>
-            </a:extLst>
-          </p:cNvPr>
-          <p:cNvCxnSpPr>
-            <a:cxnSpLocks/>
-          </p:cNvCxnSpPr>
-          <p:nvPr/>
-        </p:nvCxnSpPr>
-        <p:spPr bwMode="auto">
-          <a:xfrm flipH="1">
-            <a:off x="6228431" y="2485036"/>
-            <a:ext cx="542" cy="540000"/>
-          </a:xfrm>
-          <a:prstGeom prst="straightConnector1">
-            <a:avLst/>
-          </a:prstGeom>
-          <a:solidFill>
-            <a:schemeClr val="accent1"/>
-          </a:solidFill>
-          <a:ln w="9525" cap="flat" cmpd="sng" algn="ctr">
-            <a:solidFill>
-              <a:schemeClr val="tx1"/>
-            </a:solidFill>
-            <a:prstDash val="solid"/>
-            <a:round/>
-            <a:headEnd type="none" w="med" len="med"/>
-            <a:tailEnd type="triangle"/>
-          </a:ln>
-          <a:effectLst/>
-        </p:spPr>
-      </p:cxnSp>
-      <p:cxnSp>
-        <p:nvCxnSpPr>
-          <p:cNvPr id="10" name="Straight Arrow Connector 9">
-            <a:extLst>
-              <a:ext uri="{FF2B5EF4-FFF2-40B4-BE49-F238E27FC236}">
-                <a16:creationId xmlns:a16="http://schemas.microsoft.com/office/drawing/2014/main" id="{E7216D33-F855-70C6-7C18-2AEDF4531D65}"/>
-              </a:ext>
-            </a:extLst>
-          </p:cNvPr>
-          <p:cNvCxnSpPr>
-            <a:cxnSpLocks/>
-          </p:cNvCxnSpPr>
-          <p:nvPr/>
-        </p:nvCxnSpPr>
-        <p:spPr bwMode="auto">
-          <a:xfrm flipH="1">
-            <a:off x="4963773" y="2733334"/>
-            <a:ext cx="1260000" cy="0"/>
-          </a:xfrm>
-          <a:prstGeom prst="straightConnector1">
-            <a:avLst/>
-          </a:prstGeom>
-          <a:solidFill>
-            <a:schemeClr val="accent1"/>
-          </a:solidFill>
-          <a:ln w="9525" cap="flat" cmpd="sng" algn="ctr">
-            <a:solidFill>
-              <a:schemeClr val="tx1"/>
-            </a:solidFill>
-            <a:prstDash val="solid"/>
-            <a:round/>
-            <a:headEnd type="none" w="med" len="med"/>
-            <a:tailEnd type="triangle"/>
-          </a:ln>
-          <a:effectLst/>
-        </p:spPr>
-      </p:cxnSp>
-      <p:cxnSp>
-        <p:nvCxnSpPr>
-          <p:cNvPr id="12" name="Gerade Verbindung mit Pfeil 12">
-            <a:extLst>
-              <a:ext uri="{FF2B5EF4-FFF2-40B4-BE49-F238E27FC236}">
-                <a16:creationId xmlns:a16="http://schemas.microsoft.com/office/drawing/2014/main" id="{2FCFC923-CD76-F12E-B1BC-7835DF0E017C}"/>
-              </a:ext>
-            </a:extLst>
-          </p:cNvPr>
-          <p:cNvCxnSpPr>
-            <a:cxnSpLocks/>
-          </p:cNvCxnSpPr>
-          <p:nvPr/>
-        </p:nvCxnSpPr>
-        <p:spPr>
-          <a:xfrm>
-            <a:off x="8383231" y="2733334"/>
-            <a:ext cx="1258100" cy="0"/>
-          </a:xfrm>
-          <a:prstGeom prst="straightConnector1">
-            <a:avLst/>
-          </a:prstGeom>
-          <a:ln>
-            <a:tailEnd type="triangle"/>
-          </a:ln>
-        </p:spPr>
-        <p:style>
-          <a:lnRef idx="1">
-            <a:schemeClr val="dk1"/>
-          </a:lnRef>
-          <a:fillRef idx="0">
-            <a:schemeClr val="dk1"/>
-          </a:fillRef>
-          <a:effectRef idx="0">
-            <a:schemeClr val="dk1"/>
-          </a:effectRef>
-          <a:fontRef idx="minor">
-            <a:schemeClr val="tx1"/>
-          </a:fontRef>
-        </p:style>
-      </p:cxnSp>
-      <p:cxnSp>
-        <p:nvCxnSpPr>
-          <p:cNvPr id="14" name="Straight Connector 13">
-            <a:extLst>
-              <a:ext uri="{FF2B5EF4-FFF2-40B4-BE49-F238E27FC236}">
-                <a16:creationId xmlns:a16="http://schemas.microsoft.com/office/drawing/2014/main" id="{8EAC40F6-EDD4-4FA2-FCC3-28E927BA1110}"/>
-              </a:ext>
-            </a:extLst>
-          </p:cNvPr>
-          <p:cNvCxnSpPr/>
-          <p:nvPr/>
-        </p:nvCxnSpPr>
-        <p:spPr bwMode="auto">
-          <a:xfrm flipH="1">
-            <a:off x="7303774" y="2124916"/>
-            <a:ext cx="4657" cy="359581"/>
-          </a:xfrm>
-          <a:prstGeom prst="line">
-            <a:avLst/>
-          </a:prstGeom>
-          <a:solidFill>
-            <a:schemeClr val="accent1"/>
-          </a:solidFill>
-          <a:ln w="9525" cap="flat" cmpd="sng" algn="ctr">
-            <a:solidFill>
-              <a:schemeClr val="tx1"/>
-            </a:solidFill>
-            <a:prstDash val="solid"/>
-            <a:round/>
-            <a:headEnd type="none" w="med" len="med"/>
-            <a:tailEnd type="none" w="med" len="med"/>
-          </a:ln>
-          <a:effectLst/>
-        </p:spPr>
-      </p:cxnSp>
-      <p:cxnSp>
-        <p:nvCxnSpPr>
-          <p:cNvPr id="21" name="Straight Connector 20">
-            <a:extLst>
-              <a:ext uri="{FF2B5EF4-FFF2-40B4-BE49-F238E27FC236}">
-                <a16:creationId xmlns:a16="http://schemas.microsoft.com/office/drawing/2014/main" id="{7D7A2F8A-329C-CD04-833E-9A6903438BCC}"/>
-              </a:ext>
-            </a:extLst>
-          </p:cNvPr>
-          <p:cNvCxnSpPr/>
-          <p:nvPr/>
-        </p:nvCxnSpPr>
-        <p:spPr bwMode="auto">
-          <a:xfrm>
-            <a:off x="7303774" y="2484497"/>
-            <a:ext cx="1080000" cy="0"/>
-          </a:xfrm>
-          <a:prstGeom prst="line">
-            <a:avLst/>
-          </a:prstGeom>
-          <a:solidFill>
-            <a:schemeClr val="accent1"/>
-          </a:solidFill>
-          <a:ln w="9525" cap="flat" cmpd="sng" algn="ctr">
-            <a:solidFill>
-              <a:schemeClr val="tx1"/>
-            </a:solidFill>
-            <a:prstDash val="solid"/>
-            <a:round/>
-            <a:headEnd type="none" w="med" len="med"/>
-            <a:tailEnd type="none" w="med" len="med"/>
-          </a:ln>
-          <a:effectLst/>
-        </p:spPr>
-      </p:cxnSp>
-      <p:cxnSp>
-        <p:nvCxnSpPr>
-          <p:cNvPr id="22" name="Straight Arrow Connector 21">
-            <a:extLst>
-              <a:ext uri="{FF2B5EF4-FFF2-40B4-BE49-F238E27FC236}">
-                <a16:creationId xmlns:a16="http://schemas.microsoft.com/office/drawing/2014/main" id="{3567FBB4-11D0-29FC-9D73-DA41C79AC2A0}"/>
-              </a:ext>
-            </a:extLst>
-          </p:cNvPr>
-          <p:cNvCxnSpPr>
-            <a:cxnSpLocks/>
-          </p:cNvCxnSpPr>
-          <p:nvPr/>
-        </p:nvCxnSpPr>
-        <p:spPr bwMode="auto">
-          <a:xfrm flipH="1">
-            <a:off x="8382690" y="2486504"/>
-            <a:ext cx="542" cy="540000"/>
-          </a:xfrm>
-          <a:prstGeom prst="straightConnector1">
-            <a:avLst/>
-          </a:prstGeom>
-          <a:solidFill>
-            <a:schemeClr val="accent1"/>
-          </a:solidFill>
-          <a:ln w="9525" cap="flat" cmpd="sng" algn="ctr">
-            <a:solidFill>
-              <a:schemeClr val="tx1"/>
-            </a:solidFill>
-            <a:prstDash val="solid"/>
-            <a:round/>
-            <a:headEnd type="none" w="med" len="med"/>
-            <a:tailEnd type="triangle"/>
-          </a:ln>
-          <a:effectLst/>
-        </p:spPr>
-      </p:cxnSp>
-      <p:cxnSp>
-        <p:nvCxnSpPr>
-          <p:cNvPr id="24" name="Straight Connector 23">
-            <a:extLst>
-              <a:ext uri="{FF2B5EF4-FFF2-40B4-BE49-F238E27FC236}">
-                <a16:creationId xmlns:a16="http://schemas.microsoft.com/office/drawing/2014/main" id="{77C9E145-BD2D-B87E-CA60-ABE3C82E9975}"/>
-              </a:ext>
-            </a:extLst>
-          </p:cNvPr>
-          <p:cNvCxnSpPr/>
-          <p:nvPr/>
-        </p:nvCxnSpPr>
-        <p:spPr bwMode="auto">
-          <a:xfrm>
-            <a:off x="6223773" y="2484497"/>
-            <a:ext cx="1080000" cy="0"/>
-          </a:xfrm>
-          <a:prstGeom prst="line">
-            <a:avLst/>
-          </a:prstGeom>
-          <a:solidFill>
-            <a:schemeClr val="accent1"/>
-          </a:solidFill>
-          <a:ln w="9525" cap="flat" cmpd="sng" algn="ctr">
-            <a:solidFill>
-              <a:schemeClr val="tx1"/>
-            </a:solidFill>
-            <a:prstDash val="solid"/>
-            <a:round/>
-            <a:headEnd type="none" w="med" len="med"/>
-            <a:tailEnd type="none" w="med" len="med"/>
-          </a:ln>
-          <a:effectLst/>
-        </p:spPr>
-      </p:cxnSp>
-      <p:sp>
-        <p:nvSpPr>
-          <p:cNvPr id="26" name="TextBox 25">
-            <a:extLst>
-              <a:ext uri="{FF2B5EF4-FFF2-40B4-BE49-F238E27FC236}">
-                <a16:creationId xmlns:a16="http://schemas.microsoft.com/office/drawing/2014/main" id="{1A88DA5D-01B9-AAF1-EDE6-4652818DE368}"/>
-              </a:ext>
-            </a:extLst>
-          </p:cNvPr>
-          <p:cNvSpPr txBox="1"/>
-          <p:nvPr/>
-        </p:nvSpPr>
-        <p:spPr>
-          <a:xfrm>
-            <a:off x="6170587" y="2105270"/>
-            <a:ext cx="2332583" cy="261610"/>
-          </a:xfrm>
-          <a:prstGeom prst="rect">
-            <a:avLst/>
-          </a:prstGeom>
-          <a:noFill/>
-        </p:spPr>
-        <p:txBody>
-          <a:bodyPr wrap="square" rtlCol="0">
-            <a:spAutoFit/>
-          </a:bodyPr>
-          <a:lstStyle/>
-          <a:p>
-            <a:pPr algn="ctr"/>
-            <a:r>
-              <a:rPr lang="en-GB" sz="1100" dirty="0">
-                <a:latin typeface="Arial" panose="020B0604020202020204" pitchFamily="34" charset="0"/>
-                <a:cs typeface="Arial" panose="020B0604020202020204" pitchFamily="34" charset="0"/>
-              </a:rPr>
-              <a:t>Male: 58.1%  White: 68.3%</a:t>
-            </a:r>
-          </a:p>
-        </p:txBody>
-      </p:sp>
+            <a:ln w="9525" cap="flat" cmpd="sng" algn="ctr">
+              <a:solidFill>
+                <a:schemeClr val="tx1"/>
+              </a:solidFill>
+              <a:prstDash val="solid"/>
+              <a:round/>
+              <a:headEnd type="none" w="med" len="med"/>
+              <a:tailEnd type="none" w="med" len="med"/>
+            </a:ln>
+            <a:effectLst/>
+          </p:spPr>
+        </p:cxnSp>
+        <p:sp>
+          <p:nvSpPr>
+            <p:cNvPr id="26" name="TextBox 25">
+              <a:extLst>
+                <a:ext uri="{FF2B5EF4-FFF2-40B4-BE49-F238E27FC236}">
+                  <a16:creationId xmlns:a16="http://schemas.microsoft.com/office/drawing/2014/main" id="{1A88DA5D-01B9-AAF1-EDE6-4652818DE368}"/>
+                </a:ext>
+              </a:extLst>
+            </p:cNvPr>
+            <p:cNvSpPr txBox="1"/>
+            <p:nvPr/>
+          </p:nvSpPr>
+          <p:spPr>
+            <a:xfrm>
+              <a:off x="5232920" y="3352126"/>
+              <a:ext cx="2332583" cy="261610"/>
+            </a:xfrm>
+            <a:prstGeom prst="rect">
+              <a:avLst/>
+            </a:prstGeom>
+            <a:noFill/>
+          </p:spPr>
+          <p:txBody>
+            <a:bodyPr wrap="square" rtlCol="0">
+              <a:spAutoFit/>
+            </a:bodyPr>
+            <a:lstStyle/>
+            <a:p>
+              <a:pPr algn="ctr"/>
+              <a:r>
+                <a:rPr lang="en-GB" sz="1100" dirty="0">
+                  <a:latin typeface="Arial" panose="020B0604020202020204" pitchFamily="34" charset="0"/>
+                  <a:cs typeface="Arial" panose="020B0604020202020204" pitchFamily="34" charset="0"/>
+                </a:rPr>
+                <a:t>Male: 58.1%  White: 68.3%</a:t>
+              </a:r>
+            </a:p>
+          </p:txBody>
+        </p:sp>
+      </p:grpSp>
     </p:spTree>
     <p:extLst>
       <p:ext uri="{BB962C8B-B14F-4D97-AF65-F5344CB8AC3E}">
@@ -8545,1104 +8620,1146 @@
           <a:chExt cx="0" cy="0"/>
         </a:xfrm>
       </p:grpSpPr>
-      <p:sp>
-        <p:nvSpPr>
-          <p:cNvPr id="63" name="Textfeld 7">
+      <p:grpSp>
+        <p:nvGrpSpPr>
+          <p:cNvPr id="2" name="Group 1">
             <a:extLst>
               <a:ext uri="{FF2B5EF4-FFF2-40B4-BE49-F238E27FC236}">
-                <a16:creationId xmlns:a16="http://schemas.microsoft.com/office/drawing/2014/main" id="{F842C1C4-D381-C0D6-6D5B-A9C2DA2C8A70}"/>
+                <a16:creationId xmlns:a16="http://schemas.microsoft.com/office/drawing/2014/main" id="{89A03D1F-B6EE-6E39-DCBD-7B4E293AF426}"/>
               </a:ext>
             </a:extLst>
           </p:cNvPr>
-          <p:cNvSpPr txBox="1"/>
+          <p:cNvGrpSpPr/>
           <p:nvPr/>
-        </p:nvSpPr>
-        <p:spPr>
-          <a:xfrm>
-            <a:off x="4656188" y="390748"/>
-            <a:ext cx="1723297" cy="492067"/>
-          </a:xfrm>
-          <a:prstGeom prst="rect">
-            <a:avLst/>
-          </a:prstGeom>
-          <a:noFill/>
-          <a:ln>
+        </p:nvGrpSpPr>
+        <p:grpSpPr>
+          <a:xfrm>
+            <a:off x="1338362" y="1480622"/>
+            <a:ext cx="9995491" cy="3841505"/>
+            <a:chOff x="1338362" y="1480622"/>
+            <a:chExt cx="9995491" cy="3841505"/>
+          </a:xfrm>
+        </p:grpSpPr>
+        <p:sp>
+          <p:nvSpPr>
+            <p:cNvPr id="63" name="Textfeld 7">
+              <a:extLst>
+                <a:ext uri="{FF2B5EF4-FFF2-40B4-BE49-F238E27FC236}">
+                  <a16:creationId xmlns:a16="http://schemas.microsoft.com/office/drawing/2014/main" id="{F842C1C4-D381-C0D6-6D5B-A9C2DA2C8A70}"/>
+                </a:ext>
+              </a:extLst>
+            </p:cNvPr>
+            <p:cNvSpPr txBox="1"/>
+            <p:nvPr/>
+          </p:nvSpPr>
+          <p:spPr>
+            <a:xfrm>
+              <a:off x="5479419" y="1480622"/>
+              <a:ext cx="1723297" cy="492067"/>
+            </a:xfrm>
+            <a:prstGeom prst="rect">
+              <a:avLst/>
+            </a:prstGeom>
+            <a:noFill/>
+            <a:ln>
+              <a:solidFill>
+                <a:schemeClr val="tx1"/>
+              </a:solidFill>
+            </a:ln>
+          </p:spPr>
+          <p:txBody>
+            <a:bodyPr wrap="square" rtlCol="0" anchor="ctr" anchorCtr="0">
+              <a:noAutofit/>
+            </a:bodyPr>
+            <a:lstStyle/>
+            <a:p>
+              <a:pPr algn="ctr"/>
+              <a:r>
+                <a:rPr lang="en-US" sz="1200" dirty="0">
+                  <a:latin typeface="Arial" panose="020B0604020202020204" pitchFamily="34" charset="0"/>
+                  <a:cs typeface="Arial" panose="020B0604020202020204" pitchFamily="34" charset="0"/>
+                </a:rPr>
+                <a:t>200,859 ICU stays</a:t>
+              </a:r>
+              <a:br>
+                <a:rPr lang="en-US" sz="1200" dirty="0">
+                  <a:latin typeface="Arial" panose="020B0604020202020204" pitchFamily="34" charset="0"/>
+                  <a:cs typeface="Arial" panose="020B0604020202020204" pitchFamily="34" charset="0"/>
+                </a:rPr>
+              </a:br>
+              <a:r>
+                <a:rPr lang="en-US" sz="1200" dirty="0">
+                  <a:latin typeface="Arial" panose="020B0604020202020204" pitchFamily="34" charset="0"/>
+                  <a:cs typeface="Arial" panose="020B0604020202020204" pitchFamily="34" charset="0"/>
+                </a:rPr>
+                <a:t>in eICU-CRD</a:t>
+              </a:r>
+            </a:p>
+          </p:txBody>
+        </p:sp>
+        <p:sp>
+          <p:nvSpPr>
+            <p:cNvPr id="64" name="Textfeld 10">
+              <a:extLst>
+                <a:ext uri="{FF2B5EF4-FFF2-40B4-BE49-F238E27FC236}">
+                  <a16:creationId xmlns:a16="http://schemas.microsoft.com/office/drawing/2014/main" id="{FD30DBF9-ECDA-6D60-7329-5A5A5EC7BC11}"/>
+                </a:ext>
+              </a:extLst>
+            </p:cNvPr>
+            <p:cNvSpPr txBox="1"/>
+            <p:nvPr/>
+          </p:nvSpPr>
+          <p:spPr>
+            <a:xfrm>
+              <a:off x="7595053" y="2030539"/>
+              <a:ext cx="2736000" cy="830997"/>
+            </a:xfrm>
+            <a:prstGeom prst="rect">
+              <a:avLst/>
+            </a:prstGeom>
+            <a:noFill/>
+            <a:ln>
+              <a:solidFill>
+                <a:schemeClr val="tx1"/>
+              </a:solidFill>
+            </a:ln>
+          </p:spPr>
+          <p:txBody>
+            <a:bodyPr wrap="square" rtlCol="0" anchor="ctr" anchorCtr="0">
+              <a:spAutoFit/>
+            </a:bodyPr>
+            <a:lstStyle/>
+            <a:p>
+              <a:r>
+                <a:rPr lang="en-US" sz="1200" dirty="0">
+                  <a:latin typeface="Arial" panose="020B0604020202020204" pitchFamily="34" charset="0"/>
+                  <a:cs typeface="Arial" panose="020B0604020202020204" pitchFamily="34" charset="0"/>
+                </a:rPr>
+                <a:t>Admissions excluded:</a:t>
+              </a:r>
+            </a:p>
+            <a:p>
+              <a:pPr marL="171450" indent="-171450">
+                <a:buFont typeface="Arial" panose="020B0604020202020204" pitchFamily="34" charset="0"/>
+                <a:buChar char="•"/>
+              </a:pPr>
+              <a:r>
+                <a:rPr lang="en-US" sz="1200" dirty="0">
+                  <a:latin typeface="Arial" panose="020B0604020202020204" pitchFamily="34" charset="0"/>
+                  <a:cs typeface="Arial" panose="020B0604020202020204" pitchFamily="34" charset="0"/>
+                </a:rPr>
+                <a:t>Non-septic ICU stays (n=152,079)</a:t>
+              </a:r>
+            </a:p>
+            <a:p>
+              <a:pPr marL="171450" indent="-171450">
+                <a:buFont typeface="Arial" panose="020B0604020202020204" pitchFamily="34" charset="0"/>
+                <a:buChar char="•"/>
+              </a:pPr>
+              <a:r>
+                <a:rPr lang="en-US" sz="1200" dirty="0">
+                  <a:latin typeface="Arial" panose="020B0604020202020204" pitchFamily="34" charset="0"/>
+                  <a:cs typeface="Arial" panose="020B0604020202020204" pitchFamily="34" charset="0"/>
+                </a:rPr>
+                <a:t>LoS &lt; 24 hours (n=2,467)</a:t>
+              </a:r>
+            </a:p>
+            <a:p>
+              <a:pPr marL="171450" indent="-171450">
+                <a:buFont typeface="Arial" panose="020B0604020202020204" pitchFamily="34" charset="0"/>
+                <a:buChar char="•"/>
+              </a:pPr>
+              <a:r>
+                <a:rPr lang="en-US" sz="1200" dirty="0">
+                  <a:latin typeface="Arial" panose="020B0604020202020204" pitchFamily="34" charset="0"/>
+                  <a:cs typeface="Arial" panose="020B0604020202020204" pitchFamily="34" charset="0"/>
+                </a:rPr>
+                <a:t>Age &lt; 18 (n=20)</a:t>
+              </a:r>
+            </a:p>
+          </p:txBody>
+        </p:sp>
+        <p:cxnSp>
+          <p:nvCxnSpPr>
+            <p:cNvPr id="65" name="Gerade Verbindung mit Pfeil 12">
+              <a:extLst>
+                <a:ext uri="{FF2B5EF4-FFF2-40B4-BE49-F238E27FC236}">
+                  <a16:creationId xmlns:a16="http://schemas.microsoft.com/office/drawing/2014/main" id="{5405368C-D870-ACB8-7654-856C800511D0}"/>
+                </a:ext>
+              </a:extLst>
+            </p:cNvPr>
+            <p:cNvCxnSpPr>
+              <a:cxnSpLocks/>
+              <a:endCxn id="64" idx="1"/>
+            </p:cNvCxnSpPr>
+            <p:nvPr/>
+          </p:nvCxnSpPr>
+          <p:spPr>
+            <a:xfrm>
+              <a:off x="6336953" y="2446038"/>
+              <a:ext cx="1258100" cy="0"/>
+            </a:xfrm>
+            <a:prstGeom prst="straightConnector1">
+              <a:avLst/>
+            </a:prstGeom>
+            <a:ln>
+              <a:tailEnd type="triangle"/>
+            </a:ln>
+          </p:spPr>
+          <p:style>
+            <a:lnRef idx="1">
+              <a:schemeClr val="dk1"/>
+            </a:lnRef>
+            <a:fillRef idx="0">
+              <a:schemeClr val="dk1"/>
+            </a:fillRef>
+            <a:effectRef idx="0">
+              <a:schemeClr val="dk1"/>
+            </a:effectRef>
+            <a:fontRef idx="minor">
+              <a:schemeClr val="tx1"/>
+            </a:fontRef>
+          </p:style>
+        </p:cxnSp>
+        <p:cxnSp>
+          <p:nvCxnSpPr>
+            <p:cNvPr id="66" name="Gerade Verbindung mit Pfeil 11">
+              <a:extLst>
+                <a:ext uri="{FF2B5EF4-FFF2-40B4-BE49-F238E27FC236}">
+                  <a16:creationId xmlns:a16="http://schemas.microsoft.com/office/drawing/2014/main" id="{779AAE41-520E-F999-07CE-B6F2E6C65E97}"/>
+                </a:ext>
+              </a:extLst>
+            </p:cNvPr>
+            <p:cNvCxnSpPr>
+              <a:cxnSpLocks/>
+              <a:stCxn id="63" idx="2"/>
+              <a:endCxn id="74" idx="0"/>
+            </p:cNvCxnSpPr>
+            <p:nvPr/>
+          </p:nvCxnSpPr>
+          <p:spPr>
+            <a:xfrm>
+              <a:off x="6341068" y="1972689"/>
+              <a:ext cx="542" cy="1029879"/>
+            </a:xfrm>
+            <a:prstGeom prst="straightConnector1">
+              <a:avLst/>
+            </a:prstGeom>
+            <a:ln>
+              <a:tailEnd type="triangle"/>
+            </a:ln>
+          </p:spPr>
+          <p:style>
+            <a:lnRef idx="1">
+              <a:schemeClr val="dk1"/>
+            </a:lnRef>
+            <a:fillRef idx="0">
+              <a:schemeClr val="dk1"/>
+            </a:fillRef>
+            <a:effectRef idx="0">
+              <a:schemeClr val="dk1"/>
+            </a:effectRef>
+            <a:fontRef idx="minor">
+              <a:schemeClr val="tx1"/>
+            </a:fontRef>
+          </p:style>
+        </p:cxnSp>
+        <p:sp>
+          <p:nvSpPr>
+            <p:cNvPr id="67" name="Textfeld 7">
+              <a:extLst>
+                <a:ext uri="{FF2B5EF4-FFF2-40B4-BE49-F238E27FC236}">
+                  <a16:creationId xmlns:a16="http://schemas.microsoft.com/office/drawing/2014/main" id="{9C81AA3C-95EC-A11B-5DBB-E3014D96FE56}"/>
+                </a:ext>
+              </a:extLst>
+            </p:cNvPr>
+            <p:cNvSpPr txBox="1"/>
+            <p:nvPr/>
+          </p:nvSpPr>
+          <p:spPr>
+            <a:xfrm>
+              <a:off x="6554220" y="4410745"/>
+              <a:ext cx="1723297" cy="649772"/>
+            </a:xfrm>
+            <a:prstGeom prst="rect">
+              <a:avLst/>
+            </a:prstGeom>
+            <a:noFill/>
+            <a:ln>
+              <a:solidFill>
+                <a:schemeClr val="tx1"/>
+              </a:solidFill>
+            </a:ln>
+          </p:spPr>
+          <p:txBody>
+            <a:bodyPr wrap="square" rtlCol="0" anchor="ctr" anchorCtr="0">
+              <a:noAutofit/>
+            </a:bodyPr>
+            <a:lstStyle>
+              <a:defPPr>
+                <a:defRPr lang="de-DE"/>
+              </a:defPPr>
+              <a:lvl1pPr algn="ctr">
+                <a:defRPr sz="1200">
+                  <a:latin typeface="Arial" panose="020B0604020202020204" pitchFamily="34" charset="0"/>
+                  <a:cs typeface="Arial" panose="020B0604020202020204" pitchFamily="34" charset="0"/>
+                </a:defRPr>
+              </a:lvl1pPr>
+            </a:lstStyle>
+            <a:p>
+              <a:pPr marL="0" marR="0" lvl="0" indent="0" defTabSz="914400" rtl="0" eaLnBrk="1" fontAlgn="auto" latinLnBrk="0" hangingPunct="1">
+                <a:lnSpc>
+                  <a:spcPct val="100000"/>
+                </a:lnSpc>
+                <a:spcBef>
+                  <a:spcPts val="0"/>
+                </a:spcBef>
+                <a:spcAft>
+                  <a:spcPts val="0"/>
+                </a:spcAft>
+                <a:buClrTx/>
+                <a:buSzTx/>
+                <a:buFontTx/>
+                <a:buNone/>
+                <a:tabLst/>
+                <a:defRPr/>
+              </a:pPr>
+              <a:r>
+                <a:rPr lang="en-US" dirty="0"/>
+                <a:t>2,699 septic, adult, cancer ICU patients</a:t>
+              </a:r>
+              <a:br>
+                <a:rPr lang="en-US" dirty="0"/>
+              </a:br>
+              <a:r>
+                <a:rPr lang="en-US" dirty="0"/>
+                <a:t>in eICU-CRD</a:t>
+              </a:r>
+            </a:p>
+          </p:txBody>
+        </p:sp>
+        <p:cxnSp>
+          <p:nvCxnSpPr>
+            <p:cNvPr id="70" name="Gerade Verbindung mit Pfeil 12">
+              <a:extLst>
+                <a:ext uri="{FF2B5EF4-FFF2-40B4-BE49-F238E27FC236}">
+                  <a16:creationId xmlns:a16="http://schemas.microsoft.com/office/drawing/2014/main" id="{512EE106-FD5F-AE1D-7E64-54C3630E5567}"/>
+                </a:ext>
+              </a:extLst>
+            </p:cNvPr>
+            <p:cNvCxnSpPr>
+              <a:cxnSpLocks/>
+            </p:cNvCxnSpPr>
+            <p:nvPr/>
+          </p:nvCxnSpPr>
+          <p:spPr>
+            <a:xfrm>
+              <a:off x="8278059" y="4721845"/>
+              <a:ext cx="391795" cy="0"/>
+            </a:xfrm>
+            <a:prstGeom prst="straightConnector1">
+              <a:avLst/>
+            </a:prstGeom>
+            <a:ln>
+              <a:tailEnd type="triangle"/>
+            </a:ln>
+          </p:spPr>
+          <p:style>
+            <a:lnRef idx="1">
+              <a:schemeClr val="dk1"/>
+            </a:lnRef>
+            <a:fillRef idx="0">
+              <a:schemeClr val="dk1"/>
+            </a:fillRef>
+            <a:effectRef idx="0">
+              <a:schemeClr val="dk1"/>
+            </a:effectRef>
+            <a:fontRef idx="minor">
+              <a:schemeClr val="tx1"/>
+            </a:fontRef>
+          </p:style>
+        </p:cxnSp>
+        <p:sp>
+          <p:nvSpPr>
+            <p:cNvPr id="71" name="Textfeld 10">
+              <a:extLst>
+                <a:ext uri="{FF2B5EF4-FFF2-40B4-BE49-F238E27FC236}">
+                  <a16:creationId xmlns:a16="http://schemas.microsoft.com/office/drawing/2014/main" id="{BC7BEE25-B563-E7D4-295D-0D91E75FECC4}"/>
+                </a:ext>
+              </a:extLst>
+            </p:cNvPr>
+            <p:cNvSpPr txBox="1"/>
+            <p:nvPr/>
+          </p:nvSpPr>
+          <p:spPr>
+            <a:xfrm>
+              <a:off x="8669853" y="4613462"/>
+              <a:ext cx="2664000" cy="276999"/>
+            </a:xfrm>
+            <a:prstGeom prst="rect">
+              <a:avLst/>
+            </a:prstGeom>
             <a:solidFill>
+              <a:schemeClr val="bg1">
+                <a:lumMod val="85000"/>
+              </a:schemeClr>
+            </a:solidFill>
+            <a:ln>
+              <a:solidFill>
+                <a:schemeClr val="tx1"/>
+              </a:solidFill>
+            </a:ln>
+          </p:spPr>
+          <p:txBody>
+            <a:bodyPr wrap="square" rtlCol="0" anchor="ctr" anchorCtr="0">
+              <a:spAutoFit/>
+            </a:bodyPr>
+            <a:lstStyle/>
+            <a:p>
+              <a:r>
+                <a:rPr lang="en-US" sz="1200" dirty="0">
+                  <a:latin typeface="Arial" panose="020B0604020202020204" pitchFamily="34" charset="0"/>
+                  <a:cs typeface="Arial" panose="020B0604020202020204" pitchFamily="34" charset="0"/>
+                </a:rPr>
+                <a:t>Q2: Different Cancer Patients</a:t>
+              </a:r>
+            </a:p>
+          </p:txBody>
+        </p:sp>
+        <p:cxnSp>
+          <p:nvCxnSpPr>
+            <p:cNvPr id="72" name="Gerade Verbindung mit Pfeil 12">
+              <a:extLst>
+                <a:ext uri="{FF2B5EF4-FFF2-40B4-BE49-F238E27FC236}">
+                  <a16:creationId xmlns:a16="http://schemas.microsoft.com/office/drawing/2014/main" id="{3A790D12-EB46-AC86-8CC3-8AA1CB11CBA2}"/>
+                </a:ext>
+              </a:extLst>
+            </p:cNvPr>
+            <p:cNvCxnSpPr>
+              <a:cxnSpLocks/>
+            </p:cNvCxnSpPr>
+            <p:nvPr/>
+          </p:nvCxnSpPr>
+          <p:spPr>
+            <a:xfrm flipH="1">
+              <a:off x="4002904" y="4758022"/>
+              <a:ext cx="392400" cy="0"/>
+            </a:xfrm>
+            <a:prstGeom prst="straightConnector1">
+              <a:avLst/>
+            </a:prstGeom>
+            <a:ln>
+              <a:tailEnd type="triangle"/>
+            </a:ln>
+          </p:spPr>
+          <p:style>
+            <a:lnRef idx="1">
+              <a:schemeClr val="dk1"/>
+            </a:lnRef>
+            <a:fillRef idx="0">
+              <a:schemeClr val="dk1"/>
+            </a:fillRef>
+            <a:effectRef idx="0">
+              <a:schemeClr val="dk1"/>
+            </a:effectRef>
+            <a:fontRef idx="minor">
               <a:schemeClr val="tx1"/>
+            </a:fontRef>
+          </p:style>
+        </p:cxnSp>
+        <p:sp>
+          <p:nvSpPr>
+            <p:cNvPr id="73" name="Textfeld 10">
+              <a:extLst>
+                <a:ext uri="{FF2B5EF4-FFF2-40B4-BE49-F238E27FC236}">
+                  <a16:creationId xmlns:a16="http://schemas.microsoft.com/office/drawing/2014/main" id="{BD3C0D72-1E1E-F9E4-F9C4-7C6B26BFF127}"/>
+                </a:ext>
+              </a:extLst>
+            </p:cNvPr>
+            <p:cNvSpPr txBox="1"/>
+            <p:nvPr/>
+          </p:nvSpPr>
+          <p:spPr>
+            <a:xfrm>
+              <a:off x="1338362" y="4613462"/>
+              <a:ext cx="2664000" cy="276999"/>
+            </a:xfrm>
+            <a:prstGeom prst="rect">
+              <a:avLst/>
+            </a:prstGeom>
+            <a:solidFill>
+              <a:schemeClr val="bg1">
+                <a:lumMod val="85000"/>
+              </a:schemeClr>
             </a:solidFill>
-          </a:ln>
-        </p:spPr>
-        <p:txBody>
-          <a:bodyPr wrap="square" rtlCol="0" anchor="ctr" anchorCtr="0">
-            <a:noAutofit/>
-          </a:bodyPr>
-          <a:lstStyle/>
-          <a:p>
-            <a:pPr algn="ctr"/>
-            <a:r>
-              <a:rPr lang="en-US" sz="1200" dirty="0">
+            <a:ln>
+              <a:solidFill>
+                <a:schemeClr val="tx1"/>
+              </a:solidFill>
+            </a:ln>
+          </p:spPr>
+          <p:txBody>
+            <a:bodyPr wrap="square" rtlCol="0" anchor="ctr" anchorCtr="0">
+              <a:spAutoFit/>
+            </a:bodyPr>
+            <a:lstStyle/>
+            <a:p>
+              <a:r>
+                <a:rPr lang="en-US" sz="1200" dirty="0">
+                  <a:latin typeface="Arial" panose="020B0604020202020204" pitchFamily="34" charset="0"/>
+                  <a:cs typeface="Arial" panose="020B0604020202020204" pitchFamily="34" charset="0"/>
+                </a:rPr>
+                <a:t>Q1: Cancer vs. Non-Cancer Patients</a:t>
+              </a:r>
+            </a:p>
+          </p:txBody>
+        </p:sp>
+        <p:sp>
+          <p:nvSpPr>
+            <p:cNvPr id="74" name="Textfeld 7">
+              <a:extLst>
+                <a:ext uri="{FF2B5EF4-FFF2-40B4-BE49-F238E27FC236}">
+                  <a16:creationId xmlns:a16="http://schemas.microsoft.com/office/drawing/2014/main" id="{38AE17A8-1C2C-8FD4-E6E2-29D437D6BEF7}"/>
+                </a:ext>
+              </a:extLst>
+            </p:cNvPr>
+            <p:cNvSpPr txBox="1"/>
+            <p:nvPr/>
+          </p:nvSpPr>
+          <p:spPr>
+            <a:xfrm>
+              <a:off x="5479961" y="3002568"/>
+              <a:ext cx="1723297" cy="492067"/>
+            </a:xfrm>
+            <a:prstGeom prst="rect">
+              <a:avLst/>
+            </a:prstGeom>
+            <a:noFill/>
+            <a:ln>
+              <a:solidFill>
+                <a:schemeClr val="tx1"/>
+              </a:solidFill>
+            </a:ln>
+          </p:spPr>
+          <p:txBody>
+            <a:bodyPr wrap="square" rtlCol="0" anchor="ctr" anchorCtr="0">
+              <a:noAutofit/>
+            </a:bodyPr>
+            <a:lstStyle/>
+            <a:p>
+              <a:pPr algn="ctr"/>
+              <a:r>
+                <a:rPr lang="en-US" sz="1200" dirty="0">
+                  <a:latin typeface="Arial" panose="020B0604020202020204" pitchFamily="34" charset="0"/>
+                  <a:cs typeface="Arial" panose="020B0604020202020204" pitchFamily="34" charset="0"/>
+                </a:rPr>
+                <a:t>46,293 ICU septic stays in eICU-CRD</a:t>
+              </a:r>
+            </a:p>
+          </p:txBody>
+        </p:sp>
+        <p:sp>
+          <p:nvSpPr>
+            <p:cNvPr id="75" name="Textfeld 10">
+              <a:extLst>
+                <a:ext uri="{FF2B5EF4-FFF2-40B4-BE49-F238E27FC236}">
+                  <a16:creationId xmlns:a16="http://schemas.microsoft.com/office/drawing/2014/main" id="{258EDA06-6330-1B52-BC70-8AEAC35ACBC2}"/>
+                </a:ext>
+              </a:extLst>
+            </p:cNvPr>
+            <p:cNvSpPr txBox="1"/>
+            <p:nvPr/>
+          </p:nvSpPr>
+          <p:spPr>
+            <a:xfrm>
+              <a:off x="8669852" y="3781465"/>
+              <a:ext cx="2650025" cy="646331"/>
+            </a:xfrm>
+            <a:prstGeom prst="rect">
+              <a:avLst/>
+            </a:prstGeom>
+            <a:noFill/>
+            <a:ln>
+              <a:solidFill>
+                <a:schemeClr val="tx1"/>
+              </a:solidFill>
+            </a:ln>
+          </p:spPr>
+          <p:txBody>
+            <a:bodyPr wrap="square" rtlCol="0" anchor="ctr" anchorCtr="0">
+              <a:spAutoFit/>
+            </a:bodyPr>
+            <a:lstStyle/>
+            <a:p>
+              <a:r>
+                <a:rPr lang="en-US" sz="1200" dirty="0">
+                  <a:latin typeface="Arial" panose="020B0604020202020204" pitchFamily="34" charset="0"/>
+                  <a:cs typeface="Arial" panose="020B0604020202020204" pitchFamily="34" charset="0"/>
+                </a:rPr>
+                <a:t>Admissions excluded:</a:t>
+              </a:r>
+            </a:p>
+            <a:p>
+              <a:pPr marL="171450" indent="-171450">
+                <a:buFont typeface="Arial" panose="020B0604020202020204" pitchFamily="34" charset="0"/>
+                <a:buChar char="•"/>
+              </a:pPr>
+              <a:r>
+                <a:rPr lang="en-US" sz="1200" dirty="0">
+                  <a:latin typeface="Arial" panose="020B0604020202020204" pitchFamily="34" charset="0"/>
+                  <a:cs typeface="Arial" panose="020B0604020202020204" pitchFamily="34" charset="0"/>
+                </a:rPr>
+                <a:t>Non-cancer stays (n=43,360)</a:t>
+              </a:r>
+            </a:p>
+            <a:p>
+              <a:pPr marL="171450" indent="-171450">
+                <a:buFont typeface="Arial" panose="020B0604020202020204" pitchFamily="34" charset="0"/>
+                <a:buChar char="•"/>
+              </a:pPr>
+              <a:r>
+                <a:rPr lang="en-US" sz="1200" dirty="0">
+                  <a:latin typeface="Arial" panose="020B0604020202020204" pitchFamily="34" charset="0"/>
+                  <a:cs typeface="Arial" panose="020B0604020202020204" pitchFamily="34" charset="0"/>
+                </a:rPr>
+                <a:t>Recurrent stays (n=234)</a:t>
+              </a:r>
+            </a:p>
+          </p:txBody>
+        </p:sp>
+        <p:cxnSp>
+          <p:nvCxnSpPr>
+            <p:cNvPr id="76" name="Straight Arrow Connector 75">
+              <a:extLst>
+                <a:ext uri="{FF2B5EF4-FFF2-40B4-BE49-F238E27FC236}">
+                  <a16:creationId xmlns:a16="http://schemas.microsoft.com/office/drawing/2014/main" id="{8ADF50A7-DD6E-60A6-6FEE-86C316FA96D9}"/>
+                </a:ext>
+              </a:extLst>
+            </p:cNvPr>
+            <p:cNvCxnSpPr>
+              <a:cxnSpLocks/>
+            </p:cNvCxnSpPr>
+            <p:nvPr/>
+          </p:nvCxnSpPr>
+          <p:spPr bwMode="auto">
+            <a:xfrm flipH="1">
+              <a:off x="5261610" y="3854755"/>
+              <a:ext cx="542" cy="540000"/>
+            </a:xfrm>
+            <a:prstGeom prst="straightConnector1">
+              <a:avLst/>
+            </a:prstGeom>
+            <a:solidFill>
+              <a:schemeClr val="accent1"/>
+            </a:solidFill>
+            <a:ln w="9525" cap="flat" cmpd="sng" algn="ctr">
+              <a:solidFill>
+                <a:schemeClr val="tx1"/>
+              </a:solidFill>
+              <a:prstDash val="solid"/>
+              <a:round/>
+              <a:headEnd type="none" w="med" len="med"/>
+              <a:tailEnd type="triangle"/>
+            </a:ln>
+            <a:effectLst/>
+          </p:spPr>
+        </p:cxnSp>
+        <p:sp>
+          <p:nvSpPr>
+            <p:cNvPr id="78" name="Textfeld 7">
+              <a:extLst>
+                <a:ext uri="{FF2B5EF4-FFF2-40B4-BE49-F238E27FC236}">
+                  <a16:creationId xmlns:a16="http://schemas.microsoft.com/office/drawing/2014/main" id="{1A888FFA-FB3D-8F88-6805-5698C957E190}"/>
+                </a:ext>
+              </a:extLst>
+            </p:cNvPr>
+            <p:cNvSpPr txBox="1"/>
+            <p:nvPr/>
+          </p:nvSpPr>
+          <p:spPr>
+            <a:xfrm>
+              <a:off x="4395304" y="4410745"/>
+              <a:ext cx="1723297" cy="649772"/>
+            </a:xfrm>
+            <a:prstGeom prst="rect">
+              <a:avLst/>
+            </a:prstGeom>
+            <a:noFill/>
+            <a:ln>
+              <a:solidFill>
+                <a:schemeClr val="tx1"/>
+              </a:solidFill>
+            </a:ln>
+          </p:spPr>
+          <p:txBody>
+            <a:bodyPr wrap="square" rtlCol="0" anchor="ctr" anchorCtr="0">
+              <a:noAutofit/>
+            </a:bodyPr>
+            <a:lstStyle>
+              <a:defPPr>
+                <a:defRPr lang="de-DE"/>
+              </a:defPPr>
+              <a:lvl1pPr algn="ctr">
+                <a:defRPr sz="1200">
+                  <a:latin typeface="Arial" panose="020B0604020202020204" pitchFamily="34" charset="0"/>
+                  <a:cs typeface="Arial" panose="020B0604020202020204" pitchFamily="34" charset="0"/>
+                </a:defRPr>
+              </a:lvl1pPr>
+            </a:lstStyle>
+            <a:p>
+              <a:r>
+                <a:rPr lang="en-US" dirty="0"/>
+                <a:t>42,275 septic, adult ICU patients</a:t>
+              </a:r>
+              <a:br>
+                <a:rPr lang="en-US" dirty="0"/>
+              </a:br>
+              <a:r>
+                <a:rPr lang="en-US" dirty="0"/>
+                <a:t>in eICU-CRD</a:t>
+              </a:r>
+            </a:p>
+          </p:txBody>
+        </p:sp>
+        <p:sp>
+          <p:nvSpPr>
+            <p:cNvPr id="80" name="Textfeld 10">
+              <a:extLst>
+                <a:ext uri="{FF2B5EF4-FFF2-40B4-BE49-F238E27FC236}">
+                  <a16:creationId xmlns:a16="http://schemas.microsoft.com/office/drawing/2014/main" id="{424F9864-2871-62EE-7283-A836BA7F0840}"/>
+                </a:ext>
+              </a:extLst>
+            </p:cNvPr>
+            <p:cNvSpPr txBox="1"/>
+            <p:nvPr/>
+          </p:nvSpPr>
+          <p:spPr>
+            <a:xfrm>
+              <a:off x="1338362" y="3893922"/>
+              <a:ext cx="2621323" cy="461665"/>
+            </a:xfrm>
+            <a:prstGeom prst="rect">
+              <a:avLst/>
+            </a:prstGeom>
+            <a:noFill/>
+            <a:ln>
+              <a:solidFill>
+                <a:schemeClr val="tx1"/>
+              </a:solidFill>
+            </a:ln>
+          </p:spPr>
+          <p:txBody>
+            <a:bodyPr wrap="square" rtlCol="0" anchor="ctr" anchorCtr="0">
+              <a:spAutoFit/>
+            </a:bodyPr>
+            <a:lstStyle/>
+            <a:p>
+              <a:r>
+                <a:rPr lang="en-US" sz="1200" dirty="0">
+                  <a:latin typeface="Arial" panose="020B0604020202020204" pitchFamily="34" charset="0"/>
+                  <a:cs typeface="Arial" panose="020B0604020202020204" pitchFamily="34" charset="0"/>
+                </a:rPr>
+                <a:t>Admissions excluded:</a:t>
+              </a:r>
+            </a:p>
+            <a:p>
+              <a:pPr marL="171450" indent="-171450">
+                <a:buFont typeface="Arial" panose="020B0604020202020204" pitchFamily="34" charset="0"/>
+                <a:buChar char="•"/>
+              </a:pPr>
+              <a:r>
+                <a:rPr lang="en-US" sz="1200" dirty="0">
+                  <a:latin typeface="Arial" panose="020B0604020202020204" pitchFamily="34" charset="0"/>
+                  <a:cs typeface="Arial" panose="020B0604020202020204" pitchFamily="34" charset="0"/>
+                </a:rPr>
+                <a:t>Recurrent stays (n=4,018)</a:t>
+              </a:r>
+            </a:p>
+          </p:txBody>
+        </p:sp>
+        <p:cxnSp>
+          <p:nvCxnSpPr>
+            <p:cNvPr id="82" name="Straight Arrow Connector 81">
+              <a:extLst>
+                <a:ext uri="{FF2B5EF4-FFF2-40B4-BE49-F238E27FC236}">
+                  <a16:creationId xmlns:a16="http://schemas.microsoft.com/office/drawing/2014/main" id="{E3A3D7CE-132F-C4FC-CECF-CD4F0BB22B63}"/>
+                </a:ext>
+              </a:extLst>
+            </p:cNvPr>
+            <p:cNvCxnSpPr>
+              <a:cxnSpLocks/>
+            </p:cNvCxnSpPr>
+            <p:nvPr/>
+          </p:nvCxnSpPr>
+          <p:spPr bwMode="auto">
+            <a:xfrm flipH="1">
+              <a:off x="3996952" y="4103053"/>
+              <a:ext cx="1260000" cy="0"/>
+            </a:xfrm>
+            <a:prstGeom prst="straightConnector1">
+              <a:avLst/>
+            </a:prstGeom>
+            <a:solidFill>
+              <a:schemeClr val="accent1"/>
+            </a:solidFill>
+            <a:ln w="9525" cap="flat" cmpd="sng" algn="ctr">
+              <a:solidFill>
+                <a:schemeClr val="tx1"/>
+              </a:solidFill>
+              <a:prstDash val="solid"/>
+              <a:round/>
+              <a:headEnd type="none" w="med" len="med"/>
+              <a:tailEnd type="triangle"/>
+            </a:ln>
+            <a:effectLst/>
+          </p:spPr>
+        </p:cxnSp>
+        <p:cxnSp>
+          <p:nvCxnSpPr>
+            <p:cNvPr id="83" name="Gerade Verbindung mit Pfeil 12">
+              <a:extLst>
+                <a:ext uri="{FF2B5EF4-FFF2-40B4-BE49-F238E27FC236}">
+                  <a16:creationId xmlns:a16="http://schemas.microsoft.com/office/drawing/2014/main" id="{BC667545-23EB-4839-D6F0-11C3B7CECBD7}"/>
+                </a:ext>
+              </a:extLst>
+            </p:cNvPr>
+            <p:cNvCxnSpPr>
+              <a:cxnSpLocks/>
+            </p:cNvCxnSpPr>
+            <p:nvPr/>
+          </p:nvCxnSpPr>
+          <p:spPr>
+            <a:xfrm>
+              <a:off x="7416410" y="4103053"/>
+              <a:ext cx="1258100" cy="0"/>
+            </a:xfrm>
+            <a:prstGeom prst="straightConnector1">
+              <a:avLst/>
+            </a:prstGeom>
+            <a:ln>
+              <a:tailEnd type="triangle"/>
+            </a:ln>
+          </p:spPr>
+          <p:style>
+            <a:lnRef idx="1">
+              <a:schemeClr val="dk1"/>
+            </a:lnRef>
+            <a:fillRef idx="0">
+              <a:schemeClr val="dk1"/>
+            </a:fillRef>
+            <a:effectRef idx="0">
+              <a:schemeClr val="dk1"/>
+            </a:effectRef>
+            <a:fontRef idx="minor">
+              <a:schemeClr val="tx1"/>
+            </a:fontRef>
+          </p:style>
+        </p:cxnSp>
+        <p:sp>
+          <p:nvSpPr>
+            <p:cNvPr id="84" name="TextBox 83">
+              <a:extLst>
+                <a:ext uri="{FF2B5EF4-FFF2-40B4-BE49-F238E27FC236}">
+                  <a16:creationId xmlns:a16="http://schemas.microsoft.com/office/drawing/2014/main" id="{691C427F-6112-8C93-43E8-B4A76518B425}"/>
+                </a:ext>
+              </a:extLst>
+            </p:cNvPr>
+            <p:cNvSpPr txBox="1"/>
+            <p:nvPr/>
+          </p:nvSpPr>
+          <p:spPr>
+            <a:xfrm>
+              <a:off x="5011485" y="1948127"/>
+              <a:ext cx="2736000" cy="261610"/>
+            </a:xfrm>
+            <a:prstGeom prst="rect">
+              <a:avLst/>
+            </a:prstGeom>
+            <a:noFill/>
+          </p:spPr>
+          <p:txBody>
+            <a:bodyPr wrap="square" rtlCol="0">
+              <a:spAutoFit/>
+            </a:bodyPr>
+            <a:lstStyle/>
+            <a:p>
+              <a:pPr algn="ctr"/>
+              <a:r>
+                <a:rPr lang="en-GB" sz="1100" dirty="0">
+                  <a:latin typeface="Arial" panose="020B0604020202020204" pitchFamily="34" charset="0"/>
+                  <a:cs typeface="Arial" panose="020B0604020202020204" pitchFamily="34" charset="0"/>
+                </a:rPr>
+                <a:t>Male: 52.3%   White: 76.8%</a:t>
+              </a:r>
+            </a:p>
+          </p:txBody>
+        </p:sp>
+        <p:sp>
+          <p:nvSpPr>
+            <p:cNvPr id="85" name="TextBox 84">
+              <a:extLst>
+                <a:ext uri="{FF2B5EF4-FFF2-40B4-BE49-F238E27FC236}">
+                  <a16:creationId xmlns:a16="http://schemas.microsoft.com/office/drawing/2014/main" id="{80F2F787-FF5F-CA9B-5E2A-8F1D57828C6C}"/>
+                </a:ext>
+              </a:extLst>
+            </p:cNvPr>
+            <p:cNvSpPr txBox="1"/>
+            <p:nvPr/>
+          </p:nvSpPr>
+          <p:spPr>
+            <a:xfrm>
+              <a:off x="6223262" y="5060517"/>
+              <a:ext cx="2385211" cy="261610"/>
+            </a:xfrm>
+            <a:prstGeom prst="rect">
+              <a:avLst/>
+            </a:prstGeom>
+            <a:noFill/>
+          </p:spPr>
+          <p:txBody>
+            <a:bodyPr wrap="square" rtlCol="0">
+              <a:spAutoFit/>
+            </a:bodyPr>
+            <a:lstStyle/>
+            <a:p>
+              <a:pPr algn="ctr"/>
+              <a:r>
+                <a:rPr lang="en-GB" sz="1100" dirty="0">
+                  <a:latin typeface="Arial" panose="020B0604020202020204" pitchFamily="34" charset="0"/>
+                  <a:cs typeface="Arial" panose="020B0604020202020204" pitchFamily="34" charset="0"/>
+                </a:rPr>
+                <a:t>Male: 56.3%   White: 77.5%</a:t>
+              </a:r>
+            </a:p>
+          </p:txBody>
+        </p:sp>
+        <p:sp>
+          <p:nvSpPr>
+            <p:cNvPr id="86" name="TextBox 85">
+              <a:extLst>
+                <a:ext uri="{FF2B5EF4-FFF2-40B4-BE49-F238E27FC236}">
+                  <a16:creationId xmlns:a16="http://schemas.microsoft.com/office/drawing/2014/main" id="{0775F2D5-60E4-D696-8803-F2399D3CE78A}"/>
+                </a:ext>
+              </a:extLst>
+            </p:cNvPr>
+            <p:cNvSpPr txBox="1"/>
+            <p:nvPr/>
+          </p:nvSpPr>
+          <p:spPr>
+            <a:xfrm>
+              <a:off x="4107513" y="5060517"/>
+              <a:ext cx="2360247" cy="261610"/>
+            </a:xfrm>
+            <a:prstGeom prst="rect">
+              <a:avLst/>
+            </a:prstGeom>
+            <a:noFill/>
+          </p:spPr>
+          <p:txBody>
+            <a:bodyPr wrap="square" rtlCol="0">
+              <a:spAutoFit/>
+            </a:bodyPr>
+            <a:lstStyle/>
+            <a:p>
+              <a:pPr algn="ctr"/>
+              <a:r>
+                <a:rPr lang="en-GB" sz="1100">
+                  <a:latin typeface="Arial" panose="020B0604020202020204" pitchFamily="34" charset="0"/>
+                  <a:cs typeface="Arial" panose="020B0604020202020204" pitchFamily="34" charset="0"/>
+                </a:rPr>
+                <a:t>Male: 52.1%   White: 77.0%</a:t>
+              </a:r>
+              <a:endParaRPr lang="en-GB" sz="1100" dirty="0">
                 <a:latin typeface="Arial" panose="020B0604020202020204" pitchFamily="34" charset="0"/>
                 <a:cs typeface="Arial" panose="020B0604020202020204" pitchFamily="34" charset="0"/>
-              </a:rPr>
-              <a:t>200,859 ICU stays</a:t>
-            </a:r>
-            <a:br>
-              <a:rPr lang="en-US" sz="1200" dirty="0">
-                <a:latin typeface="Arial" panose="020B0604020202020204" pitchFamily="34" charset="0"/>
-                <a:cs typeface="Arial" panose="020B0604020202020204" pitchFamily="34" charset="0"/>
-              </a:rPr>
-            </a:br>
-            <a:r>
-              <a:rPr lang="en-US" sz="1200" dirty="0">
-                <a:latin typeface="Arial" panose="020B0604020202020204" pitchFamily="34" charset="0"/>
-                <a:cs typeface="Arial" panose="020B0604020202020204" pitchFamily="34" charset="0"/>
-              </a:rPr>
-              <a:t>in eICU-CRD</a:t>
-            </a:r>
-          </a:p>
-        </p:txBody>
-      </p:sp>
-      <p:sp>
-        <p:nvSpPr>
-          <p:cNvPr id="64" name="Textfeld 10">
-            <a:extLst>
-              <a:ext uri="{FF2B5EF4-FFF2-40B4-BE49-F238E27FC236}">
-                <a16:creationId xmlns:a16="http://schemas.microsoft.com/office/drawing/2014/main" id="{FD30DBF9-ECDA-6D60-7329-5A5A5EC7BC11}"/>
-              </a:ext>
-            </a:extLst>
-          </p:cNvPr>
-          <p:cNvSpPr txBox="1"/>
-          <p:nvPr/>
-        </p:nvSpPr>
-        <p:spPr>
-          <a:xfrm>
-            <a:off x="6771822" y="940665"/>
-            <a:ext cx="2736000" cy="830997"/>
-          </a:xfrm>
-          <a:prstGeom prst="rect">
-            <a:avLst/>
-          </a:prstGeom>
-          <a:noFill/>
-          <a:ln>
+              </a:endParaRPr>
+            </a:p>
+          </p:txBody>
+        </p:sp>
+        <p:cxnSp>
+          <p:nvCxnSpPr>
+            <p:cNvPr id="5" name="Straight Connector 4">
+              <a:extLst>
+                <a:ext uri="{FF2B5EF4-FFF2-40B4-BE49-F238E27FC236}">
+                  <a16:creationId xmlns:a16="http://schemas.microsoft.com/office/drawing/2014/main" id="{7B0994F4-F9F1-B352-74DD-BF110259071F}"/>
+                </a:ext>
+              </a:extLst>
+            </p:cNvPr>
+            <p:cNvCxnSpPr>
+              <a:stCxn id="74" idx="2"/>
+            </p:cNvCxnSpPr>
+            <p:nvPr/>
+          </p:nvCxnSpPr>
+          <p:spPr bwMode="auto">
+            <a:xfrm flipH="1">
+              <a:off x="6336953" y="3494635"/>
+              <a:ext cx="4657" cy="359581"/>
+            </a:xfrm>
+            <a:prstGeom prst="line">
+              <a:avLst/>
+            </a:prstGeom>
             <a:solidFill>
-              <a:schemeClr val="tx1"/>
+              <a:schemeClr val="accent1"/>
             </a:solidFill>
-          </a:ln>
-        </p:spPr>
-        <p:txBody>
-          <a:bodyPr wrap="square" rtlCol="0" anchor="ctr" anchorCtr="0">
-            <a:spAutoFit/>
-          </a:bodyPr>
-          <a:lstStyle/>
-          <a:p>
-            <a:r>
-              <a:rPr lang="en-US" sz="1200" dirty="0">
-                <a:latin typeface="Arial" panose="020B0604020202020204" pitchFamily="34" charset="0"/>
-                <a:cs typeface="Arial" panose="020B0604020202020204" pitchFamily="34" charset="0"/>
-              </a:rPr>
-              <a:t>Admissions excluded:</a:t>
-            </a:r>
-          </a:p>
-          <a:p>
-            <a:pPr marL="171450" indent="-171450">
-              <a:buFont typeface="Arial" panose="020B0604020202020204" pitchFamily="34" charset="0"/>
-              <a:buChar char="•"/>
-            </a:pPr>
-            <a:r>
-              <a:rPr lang="en-US" sz="1200" dirty="0">
-                <a:latin typeface="Arial" panose="020B0604020202020204" pitchFamily="34" charset="0"/>
-                <a:cs typeface="Arial" panose="020B0604020202020204" pitchFamily="34" charset="0"/>
-              </a:rPr>
-              <a:t>Non-septic ICU stays (n=152,079)</a:t>
-            </a:r>
-          </a:p>
-          <a:p>
-            <a:pPr marL="171450" indent="-171450">
-              <a:buFont typeface="Arial" panose="020B0604020202020204" pitchFamily="34" charset="0"/>
-              <a:buChar char="•"/>
-            </a:pPr>
-            <a:r>
-              <a:rPr lang="en-US" sz="1200" dirty="0">
-                <a:latin typeface="Arial" panose="020B0604020202020204" pitchFamily="34" charset="0"/>
-                <a:cs typeface="Arial" panose="020B0604020202020204" pitchFamily="34" charset="0"/>
-              </a:rPr>
-              <a:t>LoS &lt; 24 hours (n=2,467)</a:t>
-            </a:r>
-          </a:p>
-          <a:p>
-            <a:pPr marL="171450" indent="-171450">
-              <a:buFont typeface="Arial" panose="020B0604020202020204" pitchFamily="34" charset="0"/>
-              <a:buChar char="•"/>
-            </a:pPr>
-            <a:r>
-              <a:rPr lang="en-US" sz="1200" dirty="0">
-                <a:latin typeface="Arial" panose="020B0604020202020204" pitchFamily="34" charset="0"/>
-                <a:cs typeface="Arial" panose="020B0604020202020204" pitchFamily="34" charset="0"/>
-              </a:rPr>
-              <a:t>Age &lt; 18 (n=20)</a:t>
-            </a:r>
-          </a:p>
-        </p:txBody>
-      </p:sp>
-      <p:cxnSp>
-        <p:nvCxnSpPr>
-          <p:cNvPr id="65" name="Gerade Verbindung mit Pfeil 12">
-            <a:extLst>
-              <a:ext uri="{FF2B5EF4-FFF2-40B4-BE49-F238E27FC236}">
-                <a16:creationId xmlns:a16="http://schemas.microsoft.com/office/drawing/2014/main" id="{5405368C-D870-ACB8-7654-856C800511D0}"/>
-              </a:ext>
-            </a:extLst>
-          </p:cNvPr>
-          <p:cNvCxnSpPr>
-            <a:cxnSpLocks/>
-            <a:endCxn id="64" idx="1"/>
-          </p:cNvCxnSpPr>
-          <p:nvPr/>
-        </p:nvCxnSpPr>
-        <p:spPr>
-          <a:xfrm>
-            <a:off x="5513722" y="1356164"/>
-            <a:ext cx="1258100" cy="0"/>
-          </a:xfrm>
-          <a:prstGeom prst="straightConnector1">
-            <a:avLst/>
-          </a:prstGeom>
-          <a:ln>
-            <a:tailEnd type="triangle"/>
-          </a:ln>
-        </p:spPr>
-        <p:style>
-          <a:lnRef idx="1">
-            <a:schemeClr val="dk1"/>
-          </a:lnRef>
-          <a:fillRef idx="0">
-            <a:schemeClr val="dk1"/>
-          </a:fillRef>
-          <a:effectRef idx="0">
-            <a:schemeClr val="dk1"/>
-          </a:effectRef>
-          <a:fontRef idx="minor">
-            <a:schemeClr val="tx1"/>
-          </a:fontRef>
-        </p:style>
-      </p:cxnSp>
-      <p:cxnSp>
-        <p:nvCxnSpPr>
-          <p:cNvPr id="66" name="Gerade Verbindung mit Pfeil 11">
-            <a:extLst>
-              <a:ext uri="{FF2B5EF4-FFF2-40B4-BE49-F238E27FC236}">
-                <a16:creationId xmlns:a16="http://schemas.microsoft.com/office/drawing/2014/main" id="{779AAE41-520E-F999-07CE-B6F2E6C65E97}"/>
-              </a:ext>
-            </a:extLst>
-          </p:cNvPr>
-          <p:cNvCxnSpPr>
-            <a:cxnSpLocks/>
-            <a:stCxn id="63" idx="2"/>
-            <a:endCxn id="74" idx="0"/>
-          </p:cNvCxnSpPr>
-          <p:nvPr/>
-        </p:nvCxnSpPr>
-        <p:spPr>
-          <a:xfrm>
-            <a:off x="5517837" y="882815"/>
-            <a:ext cx="542" cy="1029879"/>
-          </a:xfrm>
-          <a:prstGeom prst="straightConnector1">
-            <a:avLst/>
-          </a:prstGeom>
-          <a:ln>
-            <a:tailEnd type="triangle"/>
-          </a:ln>
-        </p:spPr>
-        <p:style>
-          <a:lnRef idx="1">
-            <a:schemeClr val="dk1"/>
-          </a:lnRef>
-          <a:fillRef idx="0">
-            <a:schemeClr val="dk1"/>
-          </a:fillRef>
-          <a:effectRef idx="0">
-            <a:schemeClr val="dk1"/>
-          </a:effectRef>
-          <a:fontRef idx="minor">
-            <a:schemeClr val="tx1"/>
-          </a:fontRef>
-        </p:style>
-      </p:cxnSp>
-      <p:sp>
-        <p:nvSpPr>
-          <p:cNvPr id="67" name="Textfeld 7">
-            <a:extLst>
-              <a:ext uri="{FF2B5EF4-FFF2-40B4-BE49-F238E27FC236}">
-                <a16:creationId xmlns:a16="http://schemas.microsoft.com/office/drawing/2014/main" id="{9C81AA3C-95EC-A11B-5DBB-E3014D96FE56}"/>
-              </a:ext>
-            </a:extLst>
-          </p:cNvPr>
-          <p:cNvSpPr txBox="1"/>
-          <p:nvPr/>
-        </p:nvSpPr>
-        <p:spPr>
-          <a:xfrm>
-            <a:off x="5730989" y="3320871"/>
-            <a:ext cx="1723297" cy="649772"/>
-          </a:xfrm>
-          <a:prstGeom prst="rect">
-            <a:avLst/>
-          </a:prstGeom>
-          <a:noFill/>
-          <a:ln>
+            <a:ln w="9525" cap="flat" cmpd="sng" algn="ctr">
+              <a:solidFill>
+                <a:schemeClr val="tx1"/>
+              </a:solidFill>
+              <a:prstDash val="solid"/>
+              <a:round/>
+              <a:headEnd type="none" w="med" len="med"/>
+              <a:tailEnd type="none" w="med" len="med"/>
+            </a:ln>
+            <a:effectLst/>
+          </p:spPr>
+        </p:cxnSp>
+        <p:cxnSp>
+          <p:nvCxnSpPr>
+            <p:cNvPr id="12" name="Straight Connector 11">
+              <a:extLst>
+                <a:ext uri="{FF2B5EF4-FFF2-40B4-BE49-F238E27FC236}">
+                  <a16:creationId xmlns:a16="http://schemas.microsoft.com/office/drawing/2014/main" id="{E6EF2D60-D10B-CE00-78B6-44F315FC1BFB}"/>
+                </a:ext>
+              </a:extLst>
+            </p:cNvPr>
+            <p:cNvCxnSpPr/>
+            <p:nvPr/>
+          </p:nvCxnSpPr>
+          <p:spPr bwMode="auto">
+            <a:xfrm>
+              <a:off x="5256953" y="3854216"/>
+              <a:ext cx="1080000" cy="0"/>
+            </a:xfrm>
+            <a:prstGeom prst="line">
+              <a:avLst/>
+            </a:prstGeom>
             <a:solidFill>
-              <a:schemeClr val="tx1"/>
+              <a:schemeClr val="accent1"/>
             </a:solidFill>
-          </a:ln>
-        </p:spPr>
-        <p:txBody>
-          <a:bodyPr wrap="square" rtlCol="0" anchor="ctr" anchorCtr="0">
-            <a:noAutofit/>
-          </a:bodyPr>
-          <a:lstStyle>
-            <a:defPPr>
-              <a:defRPr lang="de-DE"/>
-            </a:defPPr>
-            <a:lvl1pPr algn="ctr">
-              <a:defRPr sz="1200">
-                <a:latin typeface="Arial" panose="020B0604020202020204" pitchFamily="34" charset="0"/>
-                <a:cs typeface="Arial" panose="020B0604020202020204" pitchFamily="34" charset="0"/>
-              </a:defRPr>
-            </a:lvl1pPr>
-          </a:lstStyle>
-          <a:p>
-            <a:r>
-              <a:rPr lang="en-US" dirty="0"/>
-              <a:t>42,275 septic, adult ICU patients</a:t>
-            </a:r>
-            <a:br>
-              <a:rPr lang="en-US" dirty="0"/>
-            </a:br>
-            <a:r>
-              <a:rPr lang="en-US" dirty="0"/>
-              <a:t>in eICU-CRD</a:t>
-            </a:r>
-          </a:p>
-        </p:txBody>
-      </p:sp>
-      <p:cxnSp>
-        <p:nvCxnSpPr>
-          <p:cNvPr id="70" name="Gerade Verbindung mit Pfeil 12">
-            <a:extLst>
-              <a:ext uri="{FF2B5EF4-FFF2-40B4-BE49-F238E27FC236}">
-                <a16:creationId xmlns:a16="http://schemas.microsoft.com/office/drawing/2014/main" id="{512EE106-FD5F-AE1D-7E64-54C3630E5567}"/>
-              </a:ext>
-            </a:extLst>
-          </p:cNvPr>
-          <p:cNvCxnSpPr>
-            <a:cxnSpLocks/>
-          </p:cNvCxnSpPr>
-          <p:nvPr/>
-        </p:nvCxnSpPr>
-        <p:spPr>
-          <a:xfrm>
-            <a:off x="7454828" y="3631971"/>
-            <a:ext cx="391795" cy="0"/>
-          </a:xfrm>
-          <a:prstGeom prst="straightConnector1">
-            <a:avLst/>
-          </a:prstGeom>
-          <a:ln>
-            <a:tailEnd type="triangle"/>
-          </a:ln>
-        </p:spPr>
-        <p:style>
-          <a:lnRef idx="1">
-            <a:schemeClr val="dk1"/>
-          </a:lnRef>
-          <a:fillRef idx="0">
-            <a:schemeClr val="dk1"/>
-          </a:fillRef>
-          <a:effectRef idx="0">
-            <a:schemeClr val="dk1"/>
-          </a:effectRef>
-          <a:fontRef idx="minor">
-            <a:schemeClr val="tx1"/>
-          </a:fontRef>
-        </p:style>
-      </p:cxnSp>
-      <p:sp>
-        <p:nvSpPr>
-          <p:cNvPr id="71" name="Textfeld 10">
-            <a:extLst>
-              <a:ext uri="{FF2B5EF4-FFF2-40B4-BE49-F238E27FC236}">
-                <a16:creationId xmlns:a16="http://schemas.microsoft.com/office/drawing/2014/main" id="{BC7BEE25-B563-E7D4-295D-0D91E75FECC4}"/>
-              </a:ext>
-            </a:extLst>
-          </p:cNvPr>
-          <p:cNvSpPr txBox="1"/>
-          <p:nvPr/>
-        </p:nvSpPr>
-        <p:spPr>
-          <a:xfrm>
-            <a:off x="7846622" y="3523588"/>
-            <a:ext cx="2664000" cy="276999"/>
-          </a:xfrm>
-          <a:prstGeom prst="rect">
-            <a:avLst/>
-          </a:prstGeom>
-          <a:solidFill>
-            <a:schemeClr val="bg1">
-              <a:lumMod val="85000"/>
-            </a:schemeClr>
-          </a:solidFill>
-          <a:ln>
+            <a:ln w="9525" cap="flat" cmpd="sng" algn="ctr">
+              <a:solidFill>
+                <a:schemeClr val="tx1"/>
+              </a:solidFill>
+              <a:prstDash val="solid"/>
+              <a:round/>
+              <a:headEnd type="none" w="med" len="med"/>
+              <a:tailEnd type="none" w="med" len="med"/>
+            </a:ln>
+            <a:effectLst/>
+          </p:spPr>
+        </p:cxnSp>
+        <p:cxnSp>
+          <p:nvCxnSpPr>
+            <p:cNvPr id="14" name="Straight Connector 13">
+              <a:extLst>
+                <a:ext uri="{FF2B5EF4-FFF2-40B4-BE49-F238E27FC236}">
+                  <a16:creationId xmlns:a16="http://schemas.microsoft.com/office/drawing/2014/main" id="{7615786F-1BD3-A57E-8484-0C1E11092A1C}"/>
+                </a:ext>
+              </a:extLst>
+            </p:cNvPr>
+            <p:cNvCxnSpPr/>
+            <p:nvPr/>
+          </p:nvCxnSpPr>
+          <p:spPr bwMode="auto">
+            <a:xfrm>
+              <a:off x="6336953" y="3854216"/>
+              <a:ext cx="1080000" cy="0"/>
+            </a:xfrm>
+            <a:prstGeom prst="line">
+              <a:avLst/>
+            </a:prstGeom>
             <a:solidFill>
-              <a:schemeClr val="tx1"/>
+              <a:schemeClr val="accent1"/>
             </a:solidFill>
-          </a:ln>
-        </p:spPr>
-        <p:txBody>
-          <a:bodyPr wrap="square" rtlCol="0" anchor="ctr" anchorCtr="0">
-            <a:spAutoFit/>
-          </a:bodyPr>
-          <a:lstStyle/>
-          <a:p>
-            <a:r>
-              <a:rPr lang="en-US" sz="1200" dirty="0">
-                <a:latin typeface="Arial" panose="020B0604020202020204" pitchFamily="34" charset="0"/>
-                <a:cs typeface="Arial" panose="020B0604020202020204" pitchFamily="34" charset="0"/>
-              </a:rPr>
-              <a:t>Q1: Cancer vs. Non-Cancer Patients</a:t>
-            </a:r>
-          </a:p>
-        </p:txBody>
-      </p:sp>
-      <p:cxnSp>
-        <p:nvCxnSpPr>
-          <p:cNvPr id="72" name="Gerade Verbindung mit Pfeil 12">
-            <a:extLst>
-              <a:ext uri="{FF2B5EF4-FFF2-40B4-BE49-F238E27FC236}">
-                <a16:creationId xmlns:a16="http://schemas.microsoft.com/office/drawing/2014/main" id="{3A790D12-EB46-AC86-8CC3-8AA1CB11CBA2}"/>
-              </a:ext>
-            </a:extLst>
-          </p:cNvPr>
-          <p:cNvCxnSpPr>
-            <a:cxnSpLocks/>
-          </p:cNvCxnSpPr>
-          <p:nvPr/>
-        </p:nvCxnSpPr>
-        <p:spPr>
-          <a:xfrm flipH="1">
-            <a:off x="3179673" y="3668148"/>
-            <a:ext cx="392400" cy="0"/>
-          </a:xfrm>
-          <a:prstGeom prst="straightConnector1">
-            <a:avLst/>
-          </a:prstGeom>
-          <a:ln>
-            <a:tailEnd type="triangle"/>
-          </a:ln>
-        </p:spPr>
-        <p:style>
-          <a:lnRef idx="1">
-            <a:schemeClr val="dk1"/>
-          </a:lnRef>
-          <a:fillRef idx="0">
-            <a:schemeClr val="dk1"/>
-          </a:fillRef>
-          <a:effectRef idx="0">
-            <a:schemeClr val="dk1"/>
-          </a:effectRef>
-          <a:fontRef idx="minor">
-            <a:schemeClr val="tx1"/>
-          </a:fontRef>
-        </p:style>
-      </p:cxnSp>
-      <p:sp>
-        <p:nvSpPr>
-          <p:cNvPr id="73" name="Textfeld 10">
-            <a:extLst>
-              <a:ext uri="{FF2B5EF4-FFF2-40B4-BE49-F238E27FC236}">
-                <a16:creationId xmlns:a16="http://schemas.microsoft.com/office/drawing/2014/main" id="{BD3C0D72-1E1E-F9E4-F9C4-7C6B26BFF127}"/>
-              </a:ext>
-            </a:extLst>
-          </p:cNvPr>
-          <p:cNvSpPr txBox="1"/>
-          <p:nvPr/>
-        </p:nvSpPr>
-        <p:spPr>
-          <a:xfrm>
-            <a:off x="515131" y="3523588"/>
-            <a:ext cx="2664000" cy="276999"/>
-          </a:xfrm>
-          <a:prstGeom prst="rect">
-            <a:avLst/>
-          </a:prstGeom>
-          <a:solidFill>
-            <a:schemeClr val="bg1">
-              <a:lumMod val="85000"/>
-            </a:schemeClr>
-          </a:solidFill>
-          <a:ln>
+            <a:ln w="9525" cap="flat" cmpd="sng" algn="ctr">
+              <a:solidFill>
+                <a:schemeClr val="tx1"/>
+              </a:solidFill>
+              <a:prstDash val="solid"/>
+              <a:round/>
+              <a:headEnd type="none" w="med" len="med"/>
+              <a:tailEnd type="none" w="med" len="med"/>
+            </a:ln>
+            <a:effectLst/>
+          </p:spPr>
+        </p:cxnSp>
+        <p:cxnSp>
+          <p:nvCxnSpPr>
+            <p:cNvPr id="21" name="Straight Arrow Connector 20">
+              <a:extLst>
+                <a:ext uri="{FF2B5EF4-FFF2-40B4-BE49-F238E27FC236}">
+                  <a16:creationId xmlns:a16="http://schemas.microsoft.com/office/drawing/2014/main" id="{02739597-C2B2-3534-AFAC-5B0F4AF9FEA9}"/>
+                </a:ext>
+              </a:extLst>
+            </p:cNvPr>
+            <p:cNvCxnSpPr>
+              <a:cxnSpLocks/>
+            </p:cNvCxnSpPr>
+            <p:nvPr/>
+          </p:nvCxnSpPr>
+          <p:spPr bwMode="auto">
+            <a:xfrm flipH="1">
+              <a:off x="7415869" y="3856223"/>
+              <a:ext cx="542" cy="540000"/>
+            </a:xfrm>
+            <a:prstGeom prst="straightConnector1">
+              <a:avLst/>
+            </a:prstGeom>
             <a:solidFill>
-              <a:schemeClr val="tx1"/>
+              <a:schemeClr val="accent1"/>
             </a:solidFill>
-          </a:ln>
-        </p:spPr>
-        <p:txBody>
-          <a:bodyPr wrap="square" rtlCol="0" anchor="ctr" anchorCtr="0">
-            <a:spAutoFit/>
-          </a:bodyPr>
-          <a:lstStyle/>
-          <a:p>
-            <a:r>
-              <a:rPr lang="en-US" sz="1200" dirty="0">
-                <a:latin typeface="Arial" panose="020B0604020202020204" pitchFamily="34" charset="0"/>
-                <a:cs typeface="Arial" panose="020B0604020202020204" pitchFamily="34" charset="0"/>
-              </a:rPr>
-              <a:t>Q2: Different Cancer Patients</a:t>
-            </a:r>
-          </a:p>
-        </p:txBody>
-      </p:sp>
-      <p:sp>
-        <p:nvSpPr>
-          <p:cNvPr id="74" name="Textfeld 7">
-            <a:extLst>
-              <a:ext uri="{FF2B5EF4-FFF2-40B4-BE49-F238E27FC236}">
-                <a16:creationId xmlns:a16="http://schemas.microsoft.com/office/drawing/2014/main" id="{38AE17A8-1C2C-8FD4-E6E2-29D437D6BEF7}"/>
-              </a:ext>
-            </a:extLst>
-          </p:cNvPr>
-          <p:cNvSpPr txBox="1"/>
-          <p:nvPr/>
-        </p:nvSpPr>
-        <p:spPr>
-          <a:xfrm>
-            <a:off x="4656730" y="1912694"/>
-            <a:ext cx="1723297" cy="492067"/>
-          </a:xfrm>
-          <a:prstGeom prst="rect">
-            <a:avLst/>
-          </a:prstGeom>
-          <a:noFill/>
-          <a:ln>
-            <a:solidFill>
-              <a:schemeClr val="tx1"/>
-            </a:solidFill>
-          </a:ln>
-        </p:spPr>
-        <p:txBody>
-          <a:bodyPr wrap="square" rtlCol="0" anchor="ctr" anchorCtr="0">
-            <a:noAutofit/>
-          </a:bodyPr>
-          <a:lstStyle/>
-          <a:p>
-            <a:pPr algn="ctr"/>
-            <a:r>
-              <a:rPr lang="en-US" sz="1200" dirty="0">
-                <a:latin typeface="Arial" panose="020B0604020202020204" pitchFamily="34" charset="0"/>
-                <a:cs typeface="Arial" panose="020B0604020202020204" pitchFamily="34" charset="0"/>
-              </a:rPr>
-              <a:t>46,293 ICU septic stays in eICU-CRD</a:t>
-            </a:r>
-          </a:p>
-        </p:txBody>
-      </p:sp>
-      <p:sp>
-        <p:nvSpPr>
-          <p:cNvPr id="75" name="Textfeld 10">
-            <a:extLst>
-              <a:ext uri="{FF2B5EF4-FFF2-40B4-BE49-F238E27FC236}">
-                <a16:creationId xmlns:a16="http://schemas.microsoft.com/office/drawing/2014/main" id="{258EDA06-6330-1B52-BC70-8AEAC35ACBC2}"/>
-              </a:ext>
-            </a:extLst>
-          </p:cNvPr>
-          <p:cNvSpPr txBox="1"/>
-          <p:nvPr/>
-        </p:nvSpPr>
-        <p:spPr>
-          <a:xfrm>
-            <a:off x="7846622" y="2783924"/>
-            <a:ext cx="2358000" cy="461665"/>
-          </a:xfrm>
-          <a:prstGeom prst="rect">
-            <a:avLst/>
-          </a:prstGeom>
-          <a:noFill/>
-          <a:ln>
-            <a:solidFill>
-              <a:schemeClr val="tx1"/>
-            </a:solidFill>
-          </a:ln>
-        </p:spPr>
-        <p:txBody>
-          <a:bodyPr wrap="square" rtlCol="0" anchor="ctr" anchorCtr="0">
-            <a:spAutoFit/>
-          </a:bodyPr>
-          <a:lstStyle/>
-          <a:p>
-            <a:r>
-              <a:rPr lang="en-US" sz="1200" dirty="0">
-                <a:latin typeface="Arial" panose="020B0604020202020204" pitchFamily="34" charset="0"/>
-                <a:cs typeface="Arial" panose="020B0604020202020204" pitchFamily="34" charset="0"/>
-              </a:rPr>
-              <a:t>Admissions excluded:</a:t>
-            </a:r>
-          </a:p>
-          <a:p>
-            <a:pPr marL="171450" indent="-171450">
-              <a:buFont typeface="Arial" panose="020B0604020202020204" pitchFamily="34" charset="0"/>
-              <a:buChar char="•"/>
-            </a:pPr>
-            <a:r>
-              <a:rPr lang="en-US" sz="1200" dirty="0">
-                <a:latin typeface="Arial" panose="020B0604020202020204" pitchFamily="34" charset="0"/>
-                <a:cs typeface="Arial" panose="020B0604020202020204" pitchFamily="34" charset="0"/>
-              </a:rPr>
-              <a:t>Recurrent stays (n=4,018)</a:t>
-            </a:r>
-          </a:p>
-        </p:txBody>
-      </p:sp>
-      <p:cxnSp>
-        <p:nvCxnSpPr>
-          <p:cNvPr id="76" name="Straight Arrow Connector 75">
-            <a:extLst>
-              <a:ext uri="{FF2B5EF4-FFF2-40B4-BE49-F238E27FC236}">
-                <a16:creationId xmlns:a16="http://schemas.microsoft.com/office/drawing/2014/main" id="{8ADF50A7-DD6E-60A6-6FEE-86C316FA96D9}"/>
-              </a:ext>
-            </a:extLst>
-          </p:cNvPr>
-          <p:cNvCxnSpPr>
-            <a:cxnSpLocks/>
-          </p:cNvCxnSpPr>
-          <p:nvPr/>
-        </p:nvCxnSpPr>
-        <p:spPr bwMode="auto">
-          <a:xfrm flipH="1">
-            <a:off x="4438379" y="2764881"/>
-            <a:ext cx="542" cy="540000"/>
-          </a:xfrm>
-          <a:prstGeom prst="straightConnector1">
-            <a:avLst/>
-          </a:prstGeom>
-          <a:solidFill>
-            <a:schemeClr val="accent1"/>
-          </a:solidFill>
-          <a:ln w="9525" cap="flat" cmpd="sng" algn="ctr">
-            <a:solidFill>
-              <a:schemeClr val="tx1"/>
-            </a:solidFill>
-            <a:prstDash val="solid"/>
-            <a:round/>
-            <a:headEnd type="none" w="med" len="med"/>
-            <a:tailEnd type="triangle"/>
-          </a:ln>
-          <a:effectLst/>
-        </p:spPr>
-      </p:cxnSp>
-      <p:sp>
-        <p:nvSpPr>
-          <p:cNvPr id="78" name="Textfeld 7">
-            <a:extLst>
-              <a:ext uri="{FF2B5EF4-FFF2-40B4-BE49-F238E27FC236}">
-                <a16:creationId xmlns:a16="http://schemas.microsoft.com/office/drawing/2014/main" id="{1A888FFA-FB3D-8F88-6805-5698C957E190}"/>
-              </a:ext>
-            </a:extLst>
-          </p:cNvPr>
-          <p:cNvSpPr txBox="1"/>
-          <p:nvPr/>
-        </p:nvSpPr>
-        <p:spPr>
-          <a:xfrm>
-            <a:off x="3572073" y="3320871"/>
-            <a:ext cx="1723297" cy="649772"/>
-          </a:xfrm>
-          <a:prstGeom prst="rect">
-            <a:avLst/>
-          </a:prstGeom>
-          <a:noFill/>
-          <a:ln>
-            <a:solidFill>
-              <a:schemeClr val="tx1"/>
-            </a:solidFill>
-          </a:ln>
-        </p:spPr>
-        <p:txBody>
-          <a:bodyPr wrap="square" rtlCol="0" anchor="ctr" anchorCtr="0">
-            <a:noAutofit/>
-          </a:bodyPr>
-          <a:lstStyle>
-            <a:defPPr>
-              <a:defRPr lang="de-DE"/>
-            </a:defPPr>
-            <a:lvl1pPr algn="ctr">
-              <a:defRPr sz="1200">
-                <a:latin typeface="Arial" panose="020B0604020202020204" pitchFamily="34" charset="0"/>
-                <a:cs typeface="Arial" panose="020B0604020202020204" pitchFamily="34" charset="0"/>
-              </a:defRPr>
-            </a:lvl1pPr>
-          </a:lstStyle>
-          <a:p>
-            <a:r>
-              <a:rPr lang="en-US" dirty="0"/>
-              <a:t>2,699 septic, adult, cancer ICU patients</a:t>
-            </a:r>
-            <a:br>
-              <a:rPr lang="en-US" dirty="0"/>
-            </a:br>
-            <a:r>
-              <a:rPr lang="en-US" dirty="0"/>
-              <a:t>in eICU-CRD</a:t>
-            </a:r>
-          </a:p>
-        </p:txBody>
-      </p:sp>
-      <p:sp>
-        <p:nvSpPr>
-          <p:cNvPr id="80" name="Textfeld 10">
-            <a:extLst>
-              <a:ext uri="{FF2B5EF4-FFF2-40B4-BE49-F238E27FC236}">
-                <a16:creationId xmlns:a16="http://schemas.microsoft.com/office/drawing/2014/main" id="{424F9864-2871-62EE-7283-A836BA7F0840}"/>
-              </a:ext>
-            </a:extLst>
-          </p:cNvPr>
-          <p:cNvSpPr txBox="1"/>
-          <p:nvPr/>
-        </p:nvSpPr>
-        <p:spPr>
-          <a:xfrm>
-            <a:off x="778454" y="2711715"/>
-            <a:ext cx="2358000" cy="646331"/>
-          </a:xfrm>
-          <a:prstGeom prst="rect">
-            <a:avLst/>
-          </a:prstGeom>
-          <a:noFill/>
-          <a:ln>
-            <a:solidFill>
-              <a:schemeClr val="tx1"/>
-            </a:solidFill>
-          </a:ln>
-        </p:spPr>
-        <p:txBody>
-          <a:bodyPr wrap="square" rtlCol="0" anchor="ctr" anchorCtr="0">
-            <a:spAutoFit/>
-          </a:bodyPr>
-          <a:lstStyle/>
-          <a:p>
-            <a:r>
-              <a:rPr lang="en-US" sz="1200" dirty="0">
-                <a:latin typeface="Arial" panose="020B0604020202020204" pitchFamily="34" charset="0"/>
-                <a:cs typeface="Arial" panose="020B0604020202020204" pitchFamily="34" charset="0"/>
-              </a:rPr>
-              <a:t>Admissions excluded:</a:t>
-            </a:r>
-          </a:p>
-          <a:p>
-            <a:pPr marL="171450" indent="-171450">
-              <a:buFont typeface="Arial" panose="020B0604020202020204" pitchFamily="34" charset="0"/>
-              <a:buChar char="•"/>
-            </a:pPr>
-            <a:r>
-              <a:rPr lang="en-US" sz="1200" dirty="0">
-                <a:latin typeface="Arial" panose="020B0604020202020204" pitchFamily="34" charset="0"/>
-                <a:cs typeface="Arial" panose="020B0604020202020204" pitchFamily="34" charset="0"/>
-              </a:rPr>
-              <a:t>Non-cancer stays (n=43,360)</a:t>
-            </a:r>
-          </a:p>
-          <a:p>
-            <a:pPr marL="171450" indent="-171450">
-              <a:buFont typeface="Arial" panose="020B0604020202020204" pitchFamily="34" charset="0"/>
-              <a:buChar char="•"/>
-            </a:pPr>
-            <a:r>
-              <a:rPr lang="en-US" sz="1200" dirty="0">
-                <a:latin typeface="Arial" panose="020B0604020202020204" pitchFamily="34" charset="0"/>
-                <a:cs typeface="Arial" panose="020B0604020202020204" pitchFamily="34" charset="0"/>
-              </a:rPr>
-              <a:t>Recurrent stays (n=234)</a:t>
-            </a:r>
-          </a:p>
-        </p:txBody>
-      </p:sp>
-      <p:cxnSp>
-        <p:nvCxnSpPr>
-          <p:cNvPr id="82" name="Straight Arrow Connector 81">
-            <a:extLst>
-              <a:ext uri="{FF2B5EF4-FFF2-40B4-BE49-F238E27FC236}">
-                <a16:creationId xmlns:a16="http://schemas.microsoft.com/office/drawing/2014/main" id="{E3A3D7CE-132F-C4FC-CECF-CD4F0BB22B63}"/>
-              </a:ext>
-            </a:extLst>
-          </p:cNvPr>
-          <p:cNvCxnSpPr>
-            <a:cxnSpLocks/>
-          </p:cNvCxnSpPr>
-          <p:nvPr/>
-        </p:nvCxnSpPr>
-        <p:spPr bwMode="auto">
-          <a:xfrm flipH="1">
-            <a:off x="3173721" y="3013179"/>
-            <a:ext cx="1260000" cy="0"/>
-          </a:xfrm>
-          <a:prstGeom prst="straightConnector1">
-            <a:avLst/>
-          </a:prstGeom>
-          <a:solidFill>
-            <a:schemeClr val="accent1"/>
-          </a:solidFill>
-          <a:ln w="9525" cap="flat" cmpd="sng" algn="ctr">
-            <a:solidFill>
-              <a:schemeClr val="tx1"/>
-            </a:solidFill>
-            <a:prstDash val="solid"/>
-            <a:round/>
-            <a:headEnd type="none" w="med" len="med"/>
-            <a:tailEnd type="triangle"/>
-          </a:ln>
-          <a:effectLst/>
-        </p:spPr>
-      </p:cxnSp>
-      <p:cxnSp>
-        <p:nvCxnSpPr>
-          <p:cNvPr id="83" name="Gerade Verbindung mit Pfeil 12">
-            <a:extLst>
-              <a:ext uri="{FF2B5EF4-FFF2-40B4-BE49-F238E27FC236}">
-                <a16:creationId xmlns:a16="http://schemas.microsoft.com/office/drawing/2014/main" id="{BC667545-23EB-4839-D6F0-11C3B7CECBD7}"/>
-              </a:ext>
-            </a:extLst>
-          </p:cNvPr>
-          <p:cNvCxnSpPr>
-            <a:cxnSpLocks/>
-          </p:cNvCxnSpPr>
-          <p:nvPr/>
-        </p:nvCxnSpPr>
-        <p:spPr>
-          <a:xfrm>
-            <a:off x="6593179" y="3013179"/>
-            <a:ext cx="1258100" cy="0"/>
-          </a:xfrm>
-          <a:prstGeom prst="straightConnector1">
-            <a:avLst/>
-          </a:prstGeom>
-          <a:ln>
-            <a:tailEnd type="triangle"/>
-          </a:ln>
-        </p:spPr>
-        <p:style>
-          <a:lnRef idx="1">
-            <a:schemeClr val="dk1"/>
-          </a:lnRef>
-          <a:fillRef idx="0">
-            <a:schemeClr val="dk1"/>
-          </a:fillRef>
-          <a:effectRef idx="0">
-            <a:schemeClr val="dk1"/>
-          </a:effectRef>
-          <a:fontRef idx="minor">
-            <a:schemeClr val="tx1"/>
-          </a:fontRef>
-        </p:style>
-      </p:cxnSp>
-      <p:sp>
-        <p:nvSpPr>
-          <p:cNvPr id="84" name="TextBox 83">
-            <a:extLst>
-              <a:ext uri="{FF2B5EF4-FFF2-40B4-BE49-F238E27FC236}">
-                <a16:creationId xmlns:a16="http://schemas.microsoft.com/office/drawing/2014/main" id="{691C427F-6112-8C93-43E8-B4A76518B425}"/>
-              </a:ext>
-            </a:extLst>
-          </p:cNvPr>
-          <p:cNvSpPr txBox="1"/>
-          <p:nvPr/>
-        </p:nvSpPr>
-        <p:spPr>
-          <a:xfrm>
-            <a:off x="4188254" y="858253"/>
-            <a:ext cx="2736000" cy="261610"/>
-          </a:xfrm>
-          <a:prstGeom prst="rect">
-            <a:avLst/>
-          </a:prstGeom>
-          <a:noFill/>
-        </p:spPr>
-        <p:txBody>
-          <a:bodyPr wrap="square" rtlCol="0">
-            <a:spAutoFit/>
-          </a:bodyPr>
-          <a:lstStyle/>
-          <a:p>
-            <a:pPr algn="ctr"/>
-            <a:r>
-              <a:rPr lang="en-GB" sz="1100" dirty="0">
-                <a:latin typeface="Arial" panose="020B0604020202020204" pitchFamily="34" charset="0"/>
-                <a:cs typeface="Arial" panose="020B0604020202020204" pitchFamily="34" charset="0"/>
-              </a:rPr>
-              <a:t>Male: 52.3%   White: 76.8%</a:t>
-            </a:r>
-          </a:p>
-        </p:txBody>
-      </p:sp>
-      <p:sp>
-        <p:nvSpPr>
-          <p:cNvPr id="85" name="TextBox 84">
-            <a:extLst>
-              <a:ext uri="{FF2B5EF4-FFF2-40B4-BE49-F238E27FC236}">
-                <a16:creationId xmlns:a16="http://schemas.microsoft.com/office/drawing/2014/main" id="{80F2F787-FF5F-CA9B-5E2A-8F1D57828C6C}"/>
-              </a:ext>
-            </a:extLst>
-          </p:cNvPr>
-          <p:cNvSpPr txBox="1"/>
-          <p:nvPr/>
-        </p:nvSpPr>
-        <p:spPr>
-          <a:xfrm>
-            <a:off x="5400031" y="3970643"/>
-            <a:ext cx="2385211" cy="261610"/>
-          </a:xfrm>
-          <a:prstGeom prst="rect">
-            <a:avLst/>
-          </a:prstGeom>
-          <a:noFill/>
-        </p:spPr>
-        <p:txBody>
-          <a:bodyPr wrap="square" rtlCol="0">
-            <a:spAutoFit/>
-          </a:bodyPr>
-          <a:lstStyle/>
-          <a:p>
-            <a:pPr algn="ctr"/>
-            <a:r>
-              <a:rPr lang="en-GB" sz="1100" dirty="0">
-                <a:latin typeface="Arial" panose="020B0604020202020204" pitchFamily="34" charset="0"/>
-                <a:cs typeface="Arial" panose="020B0604020202020204" pitchFamily="34" charset="0"/>
-              </a:rPr>
-              <a:t>Male: 52.1%   White: 77.0%</a:t>
-            </a:r>
-          </a:p>
-        </p:txBody>
-      </p:sp>
-      <p:sp>
-        <p:nvSpPr>
-          <p:cNvPr id="86" name="TextBox 85">
-            <a:extLst>
-              <a:ext uri="{FF2B5EF4-FFF2-40B4-BE49-F238E27FC236}">
-                <a16:creationId xmlns:a16="http://schemas.microsoft.com/office/drawing/2014/main" id="{0775F2D5-60E4-D696-8803-F2399D3CE78A}"/>
-              </a:ext>
-            </a:extLst>
-          </p:cNvPr>
-          <p:cNvSpPr txBox="1"/>
-          <p:nvPr/>
-        </p:nvSpPr>
-        <p:spPr>
-          <a:xfrm>
-            <a:off x="3284282" y="3970643"/>
-            <a:ext cx="2360247" cy="261610"/>
-          </a:xfrm>
-          <a:prstGeom prst="rect">
-            <a:avLst/>
-          </a:prstGeom>
-          <a:noFill/>
-        </p:spPr>
-        <p:txBody>
-          <a:bodyPr wrap="square" rtlCol="0">
-            <a:spAutoFit/>
-          </a:bodyPr>
-          <a:lstStyle/>
-          <a:p>
-            <a:pPr algn="ctr"/>
-            <a:r>
-              <a:rPr lang="en-GB" sz="1100" dirty="0">
-                <a:latin typeface="Arial" panose="020B0604020202020204" pitchFamily="34" charset="0"/>
-                <a:cs typeface="Arial" panose="020B0604020202020204" pitchFamily="34" charset="0"/>
-              </a:rPr>
-              <a:t>Male: 56.3%   White: 77.5%</a:t>
-            </a:r>
-          </a:p>
-        </p:txBody>
-      </p:sp>
-      <p:cxnSp>
-        <p:nvCxnSpPr>
-          <p:cNvPr id="5" name="Straight Connector 4">
-            <a:extLst>
-              <a:ext uri="{FF2B5EF4-FFF2-40B4-BE49-F238E27FC236}">
-                <a16:creationId xmlns:a16="http://schemas.microsoft.com/office/drawing/2014/main" id="{7B0994F4-F9F1-B352-74DD-BF110259071F}"/>
-              </a:ext>
-            </a:extLst>
-          </p:cNvPr>
-          <p:cNvCxnSpPr>
-            <a:stCxn id="74" idx="2"/>
-          </p:cNvCxnSpPr>
-          <p:nvPr/>
-        </p:nvCxnSpPr>
-        <p:spPr bwMode="auto">
-          <a:xfrm flipH="1">
-            <a:off x="5513722" y="2404761"/>
-            <a:ext cx="4657" cy="359581"/>
-          </a:xfrm>
-          <a:prstGeom prst="line">
-            <a:avLst/>
-          </a:prstGeom>
-          <a:solidFill>
-            <a:schemeClr val="accent1"/>
-          </a:solidFill>
-          <a:ln w="9525" cap="flat" cmpd="sng" algn="ctr">
-            <a:solidFill>
-              <a:schemeClr val="tx1"/>
-            </a:solidFill>
-            <a:prstDash val="solid"/>
-            <a:round/>
-            <a:headEnd type="none" w="med" len="med"/>
-            <a:tailEnd type="none" w="med" len="med"/>
-          </a:ln>
-          <a:effectLst/>
-        </p:spPr>
-      </p:cxnSp>
-      <p:cxnSp>
-        <p:nvCxnSpPr>
-          <p:cNvPr id="12" name="Straight Connector 11">
-            <a:extLst>
-              <a:ext uri="{FF2B5EF4-FFF2-40B4-BE49-F238E27FC236}">
-                <a16:creationId xmlns:a16="http://schemas.microsoft.com/office/drawing/2014/main" id="{E6EF2D60-D10B-CE00-78B6-44F315FC1BFB}"/>
-              </a:ext>
-            </a:extLst>
-          </p:cNvPr>
-          <p:cNvCxnSpPr/>
-          <p:nvPr/>
-        </p:nvCxnSpPr>
-        <p:spPr bwMode="auto">
-          <a:xfrm>
-            <a:off x="4433722" y="2764342"/>
-            <a:ext cx="1080000" cy="0"/>
-          </a:xfrm>
-          <a:prstGeom prst="line">
-            <a:avLst/>
-          </a:prstGeom>
-          <a:solidFill>
-            <a:schemeClr val="accent1"/>
-          </a:solidFill>
-          <a:ln w="9525" cap="flat" cmpd="sng" algn="ctr">
-            <a:solidFill>
-              <a:schemeClr val="tx1"/>
-            </a:solidFill>
-            <a:prstDash val="solid"/>
-            <a:round/>
-            <a:headEnd type="none" w="med" len="med"/>
-            <a:tailEnd type="none" w="med" len="med"/>
-          </a:ln>
-          <a:effectLst/>
-        </p:spPr>
-      </p:cxnSp>
-      <p:cxnSp>
-        <p:nvCxnSpPr>
-          <p:cNvPr id="14" name="Straight Connector 13">
-            <a:extLst>
-              <a:ext uri="{FF2B5EF4-FFF2-40B4-BE49-F238E27FC236}">
-                <a16:creationId xmlns:a16="http://schemas.microsoft.com/office/drawing/2014/main" id="{7615786F-1BD3-A57E-8484-0C1E11092A1C}"/>
-              </a:ext>
-            </a:extLst>
-          </p:cNvPr>
-          <p:cNvCxnSpPr/>
-          <p:nvPr/>
-        </p:nvCxnSpPr>
-        <p:spPr bwMode="auto">
-          <a:xfrm>
-            <a:off x="5513722" y="2764342"/>
-            <a:ext cx="1080000" cy="0"/>
-          </a:xfrm>
-          <a:prstGeom prst="line">
-            <a:avLst/>
-          </a:prstGeom>
-          <a:solidFill>
-            <a:schemeClr val="accent1"/>
-          </a:solidFill>
-          <a:ln w="9525" cap="flat" cmpd="sng" algn="ctr">
-            <a:solidFill>
-              <a:schemeClr val="tx1"/>
-            </a:solidFill>
-            <a:prstDash val="solid"/>
-            <a:round/>
-            <a:headEnd type="none" w="med" len="med"/>
-            <a:tailEnd type="none" w="med" len="med"/>
-          </a:ln>
-          <a:effectLst/>
-        </p:spPr>
-      </p:cxnSp>
-      <p:cxnSp>
-        <p:nvCxnSpPr>
-          <p:cNvPr id="21" name="Straight Arrow Connector 20">
-            <a:extLst>
-              <a:ext uri="{FF2B5EF4-FFF2-40B4-BE49-F238E27FC236}">
-                <a16:creationId xmlns:a16="http://schemas.microsoft.com/office/drawing/2014/main" id="{02739597-C2B2-3534-AFAC-5B0F4AF9FEA9}"/>
-              </a:ext>
-            </a:extLst>
-          </p:cNvPr>
-          <p:cNvCxnSpPr>
-            <a:cxnSpLocks/>
-          </p:cNvCxnSpPr>
-          <p:nvPr/>
-        </p:nvCxnSpPr>
-        <p:spPr bwMode="auto">
-          <a:xfrm flipH="1">
-            <a:off x="6592638" y="2766349"/>
-            <a:ext cx="542" cy="540000"/>
-          </a:xfrm>
-          <a:prstGeom prst="straightConnector1">
-            <a:avLst/>
-          </a:prstGeom>
-          <a:solidFill>
-            <a:schemeClr val="accent1"/>
-          </a:solidFill>
-          <a:ln w="9525" cap="flat" cmpd="sng" algn="ctr">
-            <a:solidFill>
-              <a:schemeClr val="tx1"/>
-            </a:solidFill>
-            <a:prstDash val="solid"/>
-            <a:round/>
-            <a:headEnd type="none" w="med" len="med"/>
-            <a:tailEnd type="triangle"/>
-          </a:ln>
-          <a:effectLst/>
-        </p:spPr>
-      </p:cxnSp>
-      <p:sp>
-        <p:nvSpPr>
-          <p:cNvPr id="24" name="TextBox 23">
-            <a:extLst>
-              <a:ext uri="{FF2B5EF4-FFF2-40B4-BE49-F238E27FC236}">
-                <a16:creationId xmlns:a16="http://schemas.microsoft.com/office/drawing/2014/main" id="{C5559FA8-23AE-6A90-D689-D4F6A3440E12}"/>
-              </a:ext>
-            </a:extLst>
-          </p:cNvPr>
-          <p:cNvSpPr txBox="1"/>
-          <p:nvPr/>
-        </p:nvSpPr>
-        <p:spPr>
-          <a:xfrm>
-            <a:off x="4376130" y="2411292"/>
-            <a:ext cx="2360247" cy="261610"/>
-          </a:xfrm>
-          <a:prstGeom prst="rect">
-            <a:avLst/>
-          </a:prstGeom>
-          <a:noFill/>
-        </p:spPr>
-        <p:txBody>
-          <a:bodyPr wrap="square" rtlCol="0">
-            <a:spAutoFit/>
-          </a:bodyPr>
-          <a:lstStyle/>
-          <a:p>
-            <a:pPr algn="ctr"/>
-            <a:r>
-              <a:rPr lang="en-GB" sz="1100" dirty="0">
-                <a:latin typeface="Arial" panose="020B0604020202020204" pitchFamily="34" charset="0"/>
-                <a:cs typeface="Arial" panose="020B0604020202020204" pitchFamily="34" charset="0"/>
-              </a:rPr>
-              <a:t>Male: 52.4%   White: 76.7%</a:t>
-            </a:r>
-          </a:p>
-        </p:txBody>
-      </p:sp>
+            <a:ln w="9525" cap="flat" cmpd="sng" algn="ctr">
+              <a:solidFill>
+                <a:schemeClr val="tx1"/>
+              </a:solidFill>
+              <a:prstDash val="solid"/>
+              <a:round/>
+              <a:headEnd type="none" w="med" len="med"/>
+              <a:tailEnd type="triangle"/>
+            </a:ln>
+            <a:effectLst/>
+          </p:spPr>
+        </p:cxnSp>
+        <p:sp>
+          <p:nvSpPr>
+            <p:cNvPr id="24" name="TextBox 23">
+              <a:extLst>
+                <a:ext uri="{FF2B5EF4-FFF2-40B4-BE49-F238E27FC236}">
+                  <a16:creationId xmlns:a16="http://schemas.microsoft.com/office/drawing/2014/main" id="{C5559FA8-23AE-6A90-D689-D4F6A3440E12}"/>
+                </a:ext>
+              </a:extLst>
+            </p:cNvPr>
+            <p:cNvSpPr txBox="1"/>
+            <p:nvPr/>
+          </p:nvSpPr>
+          <p:spPr>
+            <a:xfrm>
+              <a:off x="5199361" y="3501166"/>
+              <a:ext cx="2360247" cy="261610"/>
+            </a:xfrm>
+            <a:prstGeom prst="rect">
+              <a:avLst/>
+            </a:prstGeom>
+            <a:noFill/>
+          </p:spPr>
+          <p:txBody>
+            <a:bodyPr wrap="square" rtlCol="0">
+              <a:spAutoFit/>
+            </a:bodyPr>
+            <a:lstStyle/>
+            <a:p>
+              <a:pPr algn="ctr"/>
+              <a:r>
+                <a:rPr lang="en-GB" sz="1100" dirty="0">
+                  <a:latin typeface="Arial" panose="020B0604020202020204" pitchFamily="34" charset="0"/>
+                  <a:cs typeface="Arial" panose="020B0604020202020204" pitchFamily="34" charset="0"/>
+                </a:rPr>
+                <a:t>Male: 52.4%   White: 76.7%</a:t>
+              </a:r>
+            </a:p>
+          </p:txBody>
+        </p:sp>
+      </p:grpSp>
     </p:spTree>
     <p:extLst>
       <p:ext uri="{BB962C8B-B14F-4D97-AF65-F5344CB8AC3E}">
@@ -10809,18 +10926,18 @@
 </file>
 
 <file path=customXml/item1.xml><?xml version="1.0" encoding="utf-8"?>
+<p:properties xmlns:p="http://schemas.microsoft.com/office/2006/metadata/properties" xmlns:xsi="http://www.w3.org/2001/XMLSchema-instance" xmlns:pc="http://schemas.microsoft.com/office/infopath/2007/PartnerControls">
+  <documentManagement/>
+</p:properties>
+</file>
+
+<file path=customXml/item2.xml><?xml version="1.0" encoding="utf-8"?>
 <?mso-contentType ?>
 <FormTemplates xmlns="http://schemas.microsoft.com/sharepoint/v3/contenttype/forms">
   <Display>DocumentLibraryForm</Display>
   <Edit>DocumentLibraryForm</Edit>
   <New>DocumentLibraryForm</New>
 </FormTemplates>
-</file>
-
-<file path=customXml/item2.xml><?xml version="1.0" encoding="utf-8"?>
-<p:properties xmlns:p="http://schemas.microsoft.com/office/2006/metadata/properties" xmlns:xsi="http://www.w3.org/2001/XMLSchema-instance" xmlns:pc="http://schemas.microsoft.com/office/infopath/2007/PartnerControls">
-  <documentManagement/>
-</p:properties>
 </file>
 
 <file path=customXml/item3.xml><?xml version="1.0" encoding="utf-8"?>
@@ -11053,14 +11170,6 @@
 </file>
 
 <file path=customXml/itemProps1.xml><?xml version="1.0" encoding="utf-8"?>
-<ds:datastoreItem xmlns:ds="http://schemas.openxmlformats.org/officeDocument/2006/customXml" ds:itemID="{9FA18103-7F7B-4DF6-B5E4-0AF29ECCC122}">
-  <ds:schemaRefs>
-    <ds:schemaRef ds:uri="http://schemas.microsoft.com/sharepoint/v3/contenttype/forms"/>
-  </ds:schemaRefs>
-</ds:datastoreItem>
-</file>
-
-<file path=customXml/itemProps2.xml><?xml version="1.0" encoding="utf-8"?>
 <ds:datastoreItem xmlns:ds="http://schemas.openxmlformats.org/officeDocument/2006/customXml" ds:itemID="{1A94CC53-2CAC-471B-9BA4-2797B3DA82E3}">
   <ds:schemaRefs>
     <ds:schemaRef ds:uri="0c7ed570-c004-4df7-b924-f6f15cff9822"/>
@@ -11073,6 +11182,14 @@
     <ds:schemaRef ds:uri="fd3c8342-50e0-4f70-a5fe-1cf354f99926"/>
     <ds:schemaRef ds:uri="http://schemas.microsoft.com/office/2006/metadata/properties"/>
     <ds:schemaRef ds:uri="http://www.w3.org/XML/1998/namespace"/>
+  </ds:schemaRefs>
+</ds:datastoreItem>
+</file>
+
+<file path=customXml/itemProps2.xml><?xml version="1.0" encoding="utf-8"?>
+<ds:datastoreItem xmlns:ds="http://schemas.openxmlformats.org/officeDocument/2006/customXml" ds:itemID="{9FA18103-7F7B-4DF6-B5E4-0AF29ECCC122}">
+  <ds:schemaRefs>
+    <ds:schemaRef ds:uri="http://schemas.microsoft.com/sharepoint/v3/contenttype/forms"/>
   </ds:schemaRefs>
 </ds:datastoreItem>
 </file>

</xml_diff>

<commit_message>
Add Logistic Regression results and plotting
</commit_message>
<xml_diff>
--- a/results/fig1/flow_chart.pptx
+++ b/results/fig1/flow_chart.pptx
@@ -201,7 +201,7 @@
           <a:p>
             <a:fld id="{3EEE108C-EB67-DA4C-A2B8-5DDAA9AACF1E}" type="datetimeFigureOut">
               <a:rPr lang="de-CH" smtClean="0"/>
-              <a:t>09.03.2023</a:t>
+              <a:t>10.03.2023</a:t>
             </a:fld>
             <a:endParaRPr lang="de-CH"/>
           </a:p>
@@ -2316,7 +2316,7 @@
             <a:fld id="{4B6055F8-1D02-4417-9241-55C834FD9970}" type="datetimeFigureOut">
               <a:rPr lang="it-IT" smtClean="0"/>
               <a:pPr/>
-              <a:t>09/03/2023</a:t>
+              <a:t>10/03/2023</a:t>
             </a:fld>
             <a:endParaRPr lang="it-IT"/>
           </a:p>
@@ -4837,7 +4837,7 @@
               </a14:hiddenLine>
             </a:ext>
             <a:ext uri="{FAA26D3D-D897-4be2-8F04-BA451C77F1D7}">
-              <ma14:placeholderFlag xmlns:ma14="http://schemas.microsoft.com/office/mac/drawingml/2011/main" xmlns="" val="1"/>
+              <ma14:placeholderFlag xmlns="" xmlns:ma14="http://schemas.microsoft.com/office/mac/drawingml/2011/main" val="1"/>
             </a:ext>
           </a:extLst>
         </p:spPr>
@@ -4893,7 +4893,7 @@
               </a14:hiddenLine>
             </a:ext>
             <a:ext uri="{FAA26D3D-D897-4be2-8F04-BA451C77F1D7}">
-              <ma14:placeholderFlag xmlns:ma14="http://schemas.microsoft.com/office/mac/drawingml/2011/main" xmlns="" val="1"/>
+              <ma14:placeholderFlag xmlns="" xmlns:ma14="http://schemas.microsoft.com/office/mac/drawingml/2011/main" val="1"/>
             </a:ext>
           </a:extLst>
         </p:spPr>
@@ -10698,1123 +10698,1144 @@
           <a:chExt cx="0" cy="0"/>
         </a:xfrm>
       </p:grpSpPr>
-      <p:sp>
-        <p:nvSpPr>
-          <p:cNvPr id="63" name="Textfeld 7">
+      <p:grpSp>
+        <p:nvGrpSpPr>
+          <p:cNvPr id="2" name="Group 1">
             <a:extLst>
               <a:ext uri="{FF2B5EF4-FFF2-40B4-BE49-F238E27FC236}">
-                <a16:creationId xmlns:a16="http://schemas.microsoft.com/office/drawing/2014/main" id="{F842C1C4-D381-C0D6-6D5B-A9C2DA2C8A70}"/>
+                <a16:creationId xmlns:a16="http://schemas.microsoft.com/office/drawing/2014/main" id="{CDCA2687-1172-C7AA-8DFF-5383844641CD}"/>
               </a:ext>
             </a:extLst>
           </p:cNvPr>
-          <p:cNvSpPr txBox="1"/>
+          <p:cNvGrpSpPr/>
           <p:nvPr/>
-        </p:nvSpPr>
-        <p:spPr>
+        </p:nvGrpSpPr>
+        <p:grpSpPr>
           <a:xfrm>
-            <a:off x="5465443" y="938456"/>
-            <a:ext cx="1723297" cy="492067"/>
+            <a:off x="1324386" y="938456"/>
+            <a:ext cx="9995491" cy="3841505"/>
+            <a:chOff x="1324386" y="938456"/>
+            <a:chExt cx="9995491" cy="3841505"/>
           </a:xfrm>
-          <a:prstGeom prst="rect">
-            <a:avLst/>
-          </a:prstGeom>
-          <a:noFill/>
-          <a:ln>
+        </p:grpSpPr>
+        <p:sp>
+          <p:nvSpPr>
+            <p:cNvPr id="63" name="Textfeld 7">
+              <a:extLst>
+                <a:ext uri="{FF2B5EF4-FFF2-40B4-BE49-F238E27FC236}">
+                  <a16:creationId xmlns:a16="http://schemas.microsoft.com/office/drawing/2014/main" id="{F842C1C4-D381-C0D6-6D5B-A9C2DA2C8A70}"/>
+                </a:ext>
+              </a:extLst>
+            </p:cNvPr>
+            <p:cNvSpPr txBox="1"/>
+            <p:nvPr/>
+          </p:nvSpPr>
+          <p:spPr>
+            <a:xfrm>
+              <a:off x="5465443" y="938456"/>
+              <a:ext cx="1723297" cy="492067"/>
+            </a:xfrm>
+            <a:prstGeom prst="rect">
+              <a:avLst/>
+            </a:prstGeom>
+            <a:noFill/>
+            <a:ln>
+              <a:solidFill>
+                <a:schemeClr val="tx1"/>
+              </a:solidFill>
+            </a:ln>
+          </p:spPr>
+          <p:txBody>
+            <a:bodyPr wrap="square" rtlCol="0" anchor="ctr" anchorCtr="0">
+              <a:noAutofit/>
+            </a:bodyPr>
+            <a:lstStyle/>
+            <a:p>
+              <a:pPr algn="ctr"/>
+              <a:r>
+                <a:rPr lang="en-US" sz="1200" dirty="0">
+                  <a:latin typeface="Arial" panose="020B0604020202020204" pitchFamily="34" charset="0"/>
+                  <a:cs typeface="Arial" panose="020B0604020202020204" pitchFamily="34" charset="0"/>
+                </a:rPr>
+                <a:t>200,859 ICU stays</a:t>
+              </a:r>
+              <a:br>
+                <a:rPr lang="en-US" sz="1200" dirty="0">
+                  <a:latin typeface="Arial" panose="020B0604020202020204" pitchFamily="34" charset="0"/>
+                  <a:cs typeface="Arial" panose="020B0604020202020204" pitchFamily="34" charset="0"/>
+                </a:rPr>
+              </a:br>
+              <a:r>
+                <a:rPr lang="en-US" sz="1200" dirty="0">
+                  <a:latin typeface="Arial" panose="020B0604020202020204" pitchFamily="34" charset="0"/>
+                  <a:cs typeface="Arial" panose="020B0604020202020204" pitchFamily="34" charset="0"/>
+                </a:rPr>
+                <a:t>in eICU-CRD</a:t>
+              </a:r>
+            </a:p>
+          </p:txBody>
+        </p:sp>
+        <p:sp>
+          <p:nvSpPr>
+            <p:cNvPr id="64" name="Textfeld 10">
+              <a:extLst>
+                <a:ext uri="{FF2B5EF4-FFF2-40B4-BE49-F238E27FC236}">
+                  <a16:creationId xmlns:a16="http://schemas.microsoft.com/office/drawing/2014/main" id="{FD30DBF9-ECDA-6D60-7329-5A5A5EC7BC11}"/>
+                </a:ext>
+              </a:extLst>
+            </p:cNvPr>
+            <p:cNvSpPr txBox="1"/>
+            <p:nvPr/>
+          </p:nvSpPr>
+          <p:spPr>
+            <a:xfrm>
+              <a:off x="7581077" y="1488373"/>
+              <a:ext cx="2736000" cy="830997"/>
+            </a:xfrm>
+            <a:prstGeom prst="rect">
+              <a:avLst/>
+            </a:prstGeom>
+            <a:noFill/>
+            <a:ln>
+              <a:solidFill>
+                <a:schemeClr val="tx1"/>
+              </a:solidFill>
+            </a:ln>
+          </p:spPr>
+          <p:txBody>
+            <a:bodyPr wrap="square" rtlCol="0" anchor="ctr" anchorCtr="0">
+              <a:spAutoFit/>
+            </a:bodyPr>
+            <a:lstStyle/>
+            <a:p>
+              <a:r>
+                <a:rPr lang="en-US" sz="1200" dirty="0">
+                  <a:latin typeface="Arial" panose="020B0604020202020204" pitchFamily="34" charset="0"/>
+                  <a:cs typeface="Arial" panose="020B0604020202020204" pitchFamily="34" charset="0"/>
+                </a:rPr>
+                <a:t>Admissions excluded:</a:t>
+              </a:r>
+            </a:p>
+            <a:p>
+              <a:pPr marL="171450" indent="-171450">
+                <a:buFont typeface="Arial" panose="020B0604020202020204" pitchFamily="34" charset="0"/>
+                <a:buChar char="•"/>
+              </a:pPr>
+              <a:r>
+                <a:rPr lang="en-US" sz="1200" dirty="0">
+                  <a:latin typeface="Arial" panose="020B0604020202020204" pitchFamily="34" charset="0"/>
+                  <a:cs typeface="Arial" panose="020B0604020202020204" pitchFamily="34" charset="0"/>
+                </a:rPr>
+                <a:t>Non-septic ICU stays (n=152,079)</a:t>
+              </a:r>
+            </a:p>
+            <a:p>
+              <a:pPr marL="171450" indent="-171450">
+                <a:buFont typeface="Arial" panose="020B0604020202020204" pitchFamily="34" charset="0"/>
+                <a:buChar char="•"/>
+              </a:pPr>
+              <a:r>
+                <a:rPr lang="en-US" sz="1200" dirty="0">
+                  <a:latin typeface="Arial" panose="020B0604020202020204" pitchFamily="34" charset="0"/>
+                  <a:cs typeface="Arial" panose="020B0604020202020204" pitchFamily="34" charset="0"/>
+                </a:rPr>
+                <a:t>LoS &lt; 24 hours (n=2,467)</a:t>
+              </a:r>
+            </a:p>
+            <a:p>
+              <a:pPr marL="171450" indent="-171450">
+                <a:buFont typeface="Arial" panose="020B0604020202020204" pitchFamily="34" charset="0"/>
+                <a:buChar char="•"/>
+              </a:pPr>
+              <a:r>
+                <a:rPr lang="en-US" sz="1200" dirty="0">
+                  <a:latin typeface="Arial" panose="020B0604020202020204" pitchFamily="34" charset="0"/>
+                  <a:cs typeface="Arial" panose="020B0604020202020204" pitchFamily="34" charset="0"/>
+                </a:rPr>
+                <a:t>Age &lt; 18 (n=20)</a:t>
+              </a:r>
+            </a:p>
+          </p:txBody>
+        </p:sp>
+        <p:cxnSp>
+          <p:nvCxnSpPr>
+            <p:cNvPr id="65" name="Gerade Verbindung mit Pfeil 12">
+              <a:extLst>
+                <a:ext uri="{FF2B5EF4-FFF2-40B4-BE49-F238E27FC236}">
+                  <a16:creationId xmlns:a16="http://schemas.microsoft.com/office/drawing/2014/main" id="{5405368C-D870-ACB8-7654-856C800511D0}"/>
+                </a:ext>
+              </a:extLst>
+            </p:cNvPr>
+            <p:cNvCxnSpPr>
+              <a:cxnSpLocks/>
+              <a:endCxn id="64" idx="1"/>
+            </p:cNvCxnSpPr>
+            <p:nvPr/>
+          </p:nvCxnSpPr>
+          <p:spPr>
+            <a:xfrm>
+              <a:off x="6327634" y="1903871"/>
+              <a:ext cx="1253443" cy="1"/>
+            </a:xfrm>
+            <a:prstGeom prst="straightConnector1">
+              <a:avLst/>
+            </a:prstGeom>
+            <a:ln>
+              <a:tailEnd type="triangle"/>
+            </a:ln>
+          </p:spPr>
+          <p:style>
+            <a:lnRef idx="1">
+              <a:schemeClr val="dk1"/>
+            </a:lnRef>
+            <a:fillRef idx="0">
+              <a:schemeClr val="dk1"/>
+            </a:fillRef>
+            <a:effectRef idx="0">
+              <a:schemeClr val="dk1"/>
+            </a:effectRef>
+            <a:fontRef idx="minor">
+              <a:schemeClr val="tx1"/>
+            </a:fontRef>
+          </p:style>
+        </p:cxnSp>
+        <p:cxnSp>
+          <p:nvCxnSpPr>
+            <p:cNvPr id="66" name="Gerade Verbindung mit Pfeil 11">
+              <a:extLst>
+                <a:ext uri="{FF2B5EF4-FFF2-40B4-BE49-F238E27FC236}">
+                  <a16:creationId xmlns:a16="http://schemas.microsoft.com/office/drawing/2014/main" id="{779AAE41-520E-F999-07CE-B6F2E6C65E97}"/>
+                </a:ext>
+              </a:extLst>
+            </p:cNvPr>
+            <p:cNvCxnSpPr>
+              <a:cxnSpLocks/>
+              <a:stCxn id="63" idx="2"/>
+              <a:endCxn id="74" idx="0"/>
+            </p:cNvCxnSpPr>
+            <p:nvPr/>
+          </p:nvCxnSpPr>
+          <p:spPr>
+            <a:xfrm>
+              <a:off x="6327092" y="1430523"/>
+              <a:ext cx="542" cy="1029879"/>
+            </a:xfrm>
+            <a:prstGeom prst="straightConnector1">
+              <a:avLst/>
+            </a:prstGeom>
+            <a:ln>
+              <a:tailEnd type="triangle"/>
+            </a:ln>
+          </p:spPr>
+          <p:style>
+            <a:lnRef idx="1">
+              <a:schemeClr val="dk1"/>
+            </a:lnRef>
+            <a:fillRef idx="0">
+              <a:schemeClr val="dk1"/>
+            </a:fillRef>
+            <a:effectRef idx="0">
+              <a:schemeClr val="dk1"/>
+            </a:effectRef>
+            <a:fontRef idx="minor">
+              <a:schemeClr val="tx1"/>
+            </a:fontRef>
+          </p:style>
+        </p:cxnSp>
+        <p:sp>
+          <p:nvSpPr>
+            <p:cNvPr id="67" name="Textfeld 7">
+              <a:extLst>
+                <a:ext uri="{FF2B5EF4-FFF2-40B4-BE49-F238E27FC236}">
+                  <a16:creationId xmlns:a16="http://schemas.microsoft.com/office/drawing/2014/main" id="{9C81AA3C-95EC-A11B-5DBB-E3014D96FE56}"/>
+                </a:ext>
+              </a:extLst>
+            </p:cNvPr>
+            <p:cNvSpPr txBox="1"/>
+            <p:nvPr/>
+          </p:nvSpPr>
+          <p:spPr>
+            <a:xfrm>
+              <a:off x="6540244" y="3868579"/>
+              <a:ext cx="1723297" cy="649772"/>
+            </a:xfrm>
+            <a:prstGeom prst="rect">
+              <a:avLst/>
+            </a:prstGeom>
+            <a:noFill/>
+            <a:ln>
+              <a:solidFill>
+                <a:schemeClr val="tx1"/>
+              </a:solidFill>
+            </a:ln>
+          </p:spPr>
+          <p:txBody>
+            <a:bodyPr wrap="square" rtlCol="0" anchor="ctr" anchorCtr="0">
+              <a:noAutofit/>
+            </a:bodyPr>
+            <a:lstStyle>
+              <a:defPPr>
+                <a:defRPr lang="de-DE"/>
+              </a:defPPr>
+              <a:lvl1pPr algn="ctr">
+                <a:defRPr sz="1200">
+                  <a:latin typeface="Arial" panose="020B0604020202020204" pitchFamily="34" charset="0"/>
+                  <a:cs typeface="Arial" panose="020B0604020202020204" pitchFamily="34" charset="0"/>
+                </a:defRPr>
+              </a:lvl1pPr>
+            </a:lstStyle>
+            <a:p>
+              <a:pPr marL="0" marR="0" lvl="0" indent="0" defTabSz="914400" rtl="0" eaLnBrk="1" fontAlgn="auto" latinLnBrk="0" hangingPunct="1">
+                <a:lnSpc>
+                  <a:spcPct val="100000"/>
+                </a:lnSpc>
+                <a:spcBef>
+                  <a:spcPts val="0"/>
+                </a:spcBef>
+                <a:spcAft>
+                  <a:spcPts val="0"/>
+                </a:spcAft>
+                <a:buClrTx/>
+                <a:buSzTx/>
+                <a:buFontTx/>
+                <a:buNone/>
+                <a:tabLst/>
+                <a:defRPr/>
+              </a:pPr>
+              <a:r>
+                <a:rPr lang="en-US" dirty="0"/>
+                <a:t>2,718 septic, adult, cancer ICU patients</a:t>
+              </a:r>
+              <a:br>
+                <a:rPr lang="en-US" dirty="0"/>
+              </a:br>
+              <a:r>
+                <a:rPr lang="en-US" dirty="0"/>
+                <a:t>in eICU-CRD</a:t>
+              </a:r>
+            </a:p>
+          </p:txBody>
+        </p:sp>
+        <p:cxnSp>
+          <p:nvCxnSpPr>
+            <p:cNvPr id="70" name="Gerade Verbindung mit Pfeil 12">
+              <a:extLst>
+                <a:ext uri="{FF2B5EF4-FFF2-40B4-BE49-F238E27FC236}">
+                  <a16:creationId xmlns:a16="http://schemas.microsoft.com/office/drawing/2014/main" id="{512EE106-FD5F-AE1D-7E64-54C3630E5567}"/>
+                </a:ext>
+              </a:extLst>
+            </p:cNvPr>
+            <p:cNvCxnSpPr>
+              <a:cxnSpLocks/>
+            </p:cNvCxnSpPr>
+            <p:nvPr/>
+          </p:nvCxnSpPr>
+          <p:spPr>
+            <a:xfrm>
+              <a:off x="8264083" y="4179679"/>
+              <a:ext cx="391795" cy="0"/>
+            </a:xfrm>
+            <a:prstGeom prst="straightConnector1">
+              <a:avLst/>
+            </a:prstGeom>
+            <a:ln>
+              <a:tailEnd type="triangle"/>
+            </a:ln>
+          </p:spPr>
+          <p:style>
+            <a:lnRef idx="1">
+              <a:schemeClr val="dk1"/>
+            </a:lnRef>
+            <a:fillRef idx="0">
+              <a:schemeClr val="dk1"/>
+            </a:fillRef>
+            <a:effectRef idx="0">
+              <a:schemeClr val="dk1"/>
+            </a:effectRef>
+            <a:fontRef idx="minor">
+              <a:schemeClr val="tx1"/>
+            </a:fontRef>
+          </p:style>
+        </p:cxnSp>
+        <p:sp>
+          <p:nvSpPr>
+            <p:cNvPr id="71" name="Textfeld 10">
+              <a:extLst>
+                <a:ext uri="{FF2B5EF4-FFF2-40B4-BE49-F238E27FC236}">
+                  <a16:creationId xmlns:a16="http://schemas.microsoft.com/office/drawing/2014/main" id="{BC7BEE25-B563-E7D4-295D-0D91E75FECC4}"/>
+                </a:ext>
+              </a:extLst>
+            </p:cNvPr>
+            <p:cNvSpPr txBox="1"/>
+            <p:nvPr/>
+          </p:nvSpPr>
+          <p:spPr>
+            <a:xfrm>
+              <a:off x="8655877" y="4071296"/>
+              <a:ext cx="2664000" cy="276999"/>
+            </a:xfrm>
+            <a:prstGeom prst="rect">
+              <a:avLst/>
+            </a:prstGeom>
             <a:solidFill>
+              <a:schemeClr val="bg1">
+                <a:lumMod val="85000"/>
+              </a:schemeClr>
+            </a:solidFill>
+            <a:ln>
+              <a:solidFill>
+                <a:schemeClr val="tx1"/>
+              </a:solidFill>
+            </a:ln>
+          </p:spPr>
+          <p:txBody>
+            <a:bodyPr wrap="square" rtlCol="0" anchor="ctr" anchorCtr="0">
+              <a:spAutoFit/>
+            </a:bodyPr>
+            <a:lstStyle/>
+            <a:p>
+              <a:r>
+                <a:rPr lang="en-US" sz="1200" dirty="0">
+                  <a:latin typeface="Arial" panose="020B0604020202020204" pitchFamily="34" charset="0"/>
+                  <a:cs typeface="Arial" panose="020B0604020202020204" pitchFamily="34" charset="0"/>
+                </a:rPr>
+                <a:t>Q2: Different Cancer Patients</a:t>
+              </a:r>
+            </a:p>
+          </p:txBody>
+        </p:sp>
+        <p:cxnSp>
+          <p:nvCxnSpPr>
+            <p:cNvPr id="72" name="Gerade Verbindung mit Pfeil 12">
+              <a:extLst>
+                <a:ext uri="{FF2B5EF4-FFF2-40B4-BE49-F238E27FC236}">
+                  <a16:creationId xmlns:a16="http://schemas.microsoft.com/office/drawing/2014/main" id="{3A790D12-EB46-AC86-8CC3-8AA1CB11CBA2}"/>
+                </a:ext>
+              </a:extLst>
+            </p:cNvPr>
+            <p:cNvCxnSpPr>
+              <a:cxnSpLocks/>
+              <a:endCxn id="73" idx="3"/>
+            </p:cNvCxnSpPr>
+            <p:nvPr/>
+          </p:nvCxnSpPr>
+          <p:spPr>
+            <a:xfrm flipH="1">
+              <a:off x="3945709" y="4199964"/>
+              <a:ext cx="442800" cy="0"/>
+            </a:xfrm>
+            <a:prstGeom prst="straightConnector1">
+              <a:avLst/>
+            </a:prstGeom>
+            <a:ln>
+              <a:tailEnd type="triangle"/>
+            </a:ln>
+          </p:spPr>
+          <p:style>
+            <a:lnRef idx="1">
+              <a:schemeClr val="dk1"/>
+            </a:lnRef>
+            <a:fillRef idx="0">
+              <a:schemeClr val="dk1"/>
+            </a:fillRef>
+            <a:effectRef idx="0">
+              <a:schemeClr val="dk1"/>
+            </a:effectRef>
+            <a:fontRef idx="minor">
               <a:schemeClr val="tx1"/>
+            </a:fontRef>
+          </p:style>
+        </p:cxnSp>
+        <p:sp>
+          <p:nvSpPr>
+            <p:cNvPr id="73" name="Textfeld 10">
+              <a:extLst>
+                <a:ext uri="{FF2B5EF4-FFF2-40B4-BE49-F238E27FC236}">
+                  <a16:creationId xmlns:a16="http://schemas.microsoft.com/office/drawing/2014/main" id="{BD3C0D72-1E1E-F9E4-F9C4-7C6B26BFF127}"/>
+                </a:ext>
+              </a:extLst>
+            </p:cNvPr>
+            <p:cNvSpPr txBox="1"/>
+            <p:nvPr/>
+          </p:nvSpPr>
+          <p:spPr>
+            <a:xfrm>
+              <a:off x="1324386" y="4061464"/>
+              <a:ext cx="2621323" cy="276999"/>
+            </a:xfrm>
+            <a:prstGeom prst="rect">
+              <a:avLst/>
+            </a:prstGeom>
+            <a:solidFill>
+              <a:schemeClr val="bg1">
+                <a:lumMod val="85000"/>
+              </a:schemeClr>
             </a:solidFill>
-          </a:ln>
-        </p:spPr>
-        <p:txBody>
-          <a:bodyPr wrap="square" rtlCol="0" anchor="ctr" anchorCtr="0">
-            <a:noAutofit/>
-          </a:bodyPr>
-          <a:lstStyle/>
-          <a:p>
-            <a:pPr algn="ctr"/>
-            <a:r>
-              <a:rPr lang="en-US" sz="1200" dirty="0">
-                <a:latin typeface="Arial" panose="020B0604020202020204" pitchFamily="34" charset="0"/>
-                <a:cs typeface="Arial" panose="020B0604020202020204" pitchFamily="34" charset="0"/>
-              </a:rPr>
-              <a:t>200,859 ICU stays</a:t>
-            </a:r>
-            <a:br>
-              <a:rPr lang="en-US" sz="1200" dirty="0">
-                <a:latin typeface="Arial" panose="020B0604020202020204" pitchFamily="34" charset="0"/>
-                <a:cs typeface="Arial" panose="020B0604020202020204" pitchFamily="34" charset="0"/>
-              </a:rPr>
-            </a:br>
-            <a:r>
-              <a:rPr lang="en-US" sz="1200" dirty="0">
-                <a:latin typeface="Arial" panose="020B0604020202020204" pitchFamily="34" charset="0"/>
-                <a:cs typeface="Arial" panose="020B0604020202020204" pitchFamily="34" charset="0"/>
-              </a:rPr>
-              <a:t>in eICU-CRD</a:t>
-            </a:r>
-          </a:p>
-        </p:txBody>
-      </p:sp>
-      <p:sp>
-        <p:nvSpPr>
-          <p:cNvPr id="64" name="Textfeld 10">
-            <a:extLst>
-              <a:ext uri="{FF2B5EF4-FFF2-40B4-BE49-F238E27FC236}">
-                <a16:creationId xmlns:a16="http://schemas.microsoft.com/office/drawing/2014/main" id="{FD30DBF9-ECDA-6D60-7329-5A5A5EC7BC11}"/>
-              </a:ext>
-            </a:extLst>
-          </p:cNvPr>
-          <p:cNvSpPr txBox="1"/>
-          <p:nvPr/>
-        </p:nvSpPr>
-        <p:spPr>
-          <a:xfrm>
-            <a:off x="7581077" y="1488373"/>
-            <a:ext cx="2736000" cy="830997"/>
-          </a:xfrm>
-          <a:prstGeom prst="rect">
-            <a:avLst/>
-          </a:prstGeom>
-          <a:noFill/>
-          <a:ln>
+            <a:ln>
+              <a:solidFill>
+                <a:schemeClr val="tx1"/>
+              </a:solidFill>
+            </a:ln>
+          </p:spPr>
+          <p:txBody>
+            <a:bodyPr wrap="square" rtlCol="0" anchor="ctr" anchorCtr="0">
+              <a:spAutoFit/>
+            </a:bodyPr>
+            <a:lstStyle/>
+            <a:p>
+              <a:r>
+                <a:rPr lang="en-US" sz="1200" dirty="0">
+                  <a:latin typeface="Arial" panose="020B0604020202020204" pitchFamily="34" charset="0"/>
+                  <a:cs typeface="Arial" panose="020B0604020202020204" pitchFamily="34" charset="0"/>
+                </a:rPr>
+                <a:t>Q1: Cancer vs. Non-Cancer Stays</a:t>
+              </a:r>
+            </a:p>
+          </p:txBody>
+        </p:sp>
+        <p:sp>
+          <p:nvSpPr>
+            <p:cNvPr id="74" name="Textfeld 7">
+              <a:extLst>
+                <a:ext uri="{FF2B5EF4-FFF2-40B4-BE49-F238E27FC236}">
+                  <a16:creationId xmlns:a16="http://schemas.microsoft.com/office/drawing/2014/main" id="{38AE17A8-1C2C-8FD4-E6E2-29D437D6BEF7}"/>
+                </a:ext>
+              </a:extLst>
+            </p:cNvPr>
+            <p:cNvSpPr txBox="1"/>
+            <p:nvPr/>
+          </p:nvSpPr>
+          <p:spPr>
+            <a:xfrm>
+              <a:off x="5465985" y="2460402"/>
+              <a:ext cx="1723297" cy="492067"/>
+            </a:xfrm>
+            <a:prstGeom prst="rect">
+              <a:avLst/>
+            </a:prstGeom>
+            <a:noFill/>
+            <a:ln>
+              <a:solidFill>
+                <a:schemeClr val="tx1"/>
+              </a:solidFill>
+            </a:ln>
+          </p:spPr>
+          <p:txBody>
+            <a:bodyPr wrap="square" rtlCol="0" anchor="ctr" anchorCtr="0">
+              <a:noAutofit/>
+            </a:bodyPr>
+            <a:lstStyle/>
+            <a:p>
+              <a:pPr algn="ctr"/>
+              <a:r>
+                <a:rPr lang="en-US" sz="1200" dirty="0">
+                  <a:latin typeface="Arial" panose="020B0604020202020204" pitchFamily="34" charset="0"/>
+                  <a:cs typeface="Arial" panose="020B0604020202020204" pitchFamily="34" charset="0"/>
+                </a:rPr>
+                <a:t>46,293 ICU septic stays in eICU-CRD</a:t>
+              </a:r>
+            </a:p>
+          </p:txBody>
+        </p:sp>
+        <p:sp>
+          <p:nvSpPr>
+            <p:cNvPr id="75" name="Textfeld 10">
+              <a:extLst>
+                <a:ext uri="{FF2B5EF4-FFF2-40B4-BE49-F238E27FC236}">
+                  <a16:creationId xmlns:a16="http://schemas.microsoft.com/office/drawing/2014/main" id="{258EDA06-6330-1B52-BC70-8AEAC35ACBC2}"/>
+                </a:ext>
+              </a:extLst>
+            </p:cNvPr>
+            <p:cNvSpPr txBox="1"/>
+            <p:nvPr/>
+          </p:nvSpPr>
+          <p:spPr>
+            <a:xfrm>
+              <a:off x="8655876" y="3239299"/>
+              <a:ext cx="2650025" cy="646331"/>
+            </a:xfrm>
+            <a:prstGeom prst="rect">
+              <a:avLst/>
+            </a:prstGeom>
+            <a:noFill/>
+            <a:ln>
+              <a:solidFill>
+                <a:schemeClr val="tx1"/>
+              </a:solidFill>
+            </a:ln>
+          </p:spPr>
+          <p:txBody>
+            <a:bodyPr wrap="square" rtlCol="0" anchor="ctr" anchorCtr="0">
+              <a:spAutoFit/>
+            </a:bodyPr>
+            <a:lstStyle/>
+            <a:p>
+              <a:r>
+                <a:rPr lang="en-US" sz="1200" dirty="0">
+                  <a:latin typeface="Arial" panose="020B0604020202020204" pitchFamily="34" charset="0"/>
+                  <a:cs typeface="Arial" panose="020B0604020202020204" pitchFamily="34" charset="0"/>
+                </a:rPr>
+                <a:t>Admissions excluded:</a:t>
+              </a:r>
+            </a:p>
+            <a:p>
+              <a:pPr marL="171450" indent="-171450">
+                <a:buFont typeface="Arial" panose="020B0604020202020204" pitchFamily="34" charset="0"/>
+                <a:buChar char="•"/>
+              </a:pPr>
+              <a:r>
+                <a:rPr lang="en-US" sz="1200" dirty="0">
+                  <a:latin typeface="Arial" panose="020B0604020202020204" pitchFamily="34" charset="0"/>
+                  <a:cs typeface="Arial" panose="020B0604020202020204" pitchFamily="34" charset="0"/>
+                </a:rPr>
+                <a:t>Non-cancer stays (n=43,338)</a:t>
+              </a:r>
+            </a:p>
+            <a:p>
+              <a:pPr marL="171450" indent="-171450">
+                <a:buFont typeface="Arial" panose="020B0604020202020204" pitchFamily="34" charset="0"/>
+                <a:buChar char="•"/>
+              </a:pPr>
+              <a:r>
+                <a:rPr lang="en-US" sz="1200" dirty="0">
+                  <a:latin typeface="Arial" panose="020B0604020202020204" pitchFamily="34" charset="0"/>
+                  <a:cs typeface="Arial" panose="020B0604020202020204" pitchFamily="34" charset="0"/>
+                </a:rPr>
+                <a:t>Recurrent stays (n=237)</a:t>
+              </a:r>
+            </a:p>
+          </p:txBody>
+        </p:sp>
+        <p:cxnSp>
+          <p:nvCxnSpPr>
+            <p:cNvPr id="76" name="Straight Arrow Connector 75">
+              <a:extLst>
+                <a:ext uri="{FF2B5EF4-FFF2-40B4-BE49-F238E27FC236}">
+                  <a16:creationId xmlns:a16="http://schemas.microsoft.com/office/drawing/2014/main" id="{8ADF50A7-DD6E-60A6-6FEE-86C316FA96D9}"/>
+                </a:ext>
+              </a:extLst>
+            </p:cNvPr>
+            <p:cNvCxnSpPr>
+              <a:cxnSpLocks/>
+            </p:cNvCxnSpPr>
+            <p:nvPr/>
+          </p:nvCxnSpPr>
+          <p:spPr bwMode="auto">
+            <a:xfrm flipH="1">
+              <a:off x="5247634" y="3312589"/>
+              <a:ext cx="542" cy="540000"/>
+            </a:xfrm>
+            <a:prstGeom prst="straightConnector1">
+              <a:avLst/>
+            </a:prstGeom>
             <a:solidFill>
+              <a:schemeClr val="accent1"/>
+            </a:solidFill>
+            <a:ln w="9525" cap="flat" cmpd="sng" algn="ctr">
+              <a:solidFill>
+                <a:schemeClr val="tx1"/>
+              </a:solidFill>
+              <a:prstDash val="solid"/>
+              <a:round/>
+              <a:headEnd type="none" w="med" len="med"/>
+              <a:tailEnd type="triangle"/>
+            </a:ln>
+            <a:effectLst/>
+          </p:spPr>
+        </p:cxnSp>
+        <p:sp>
+          <p:nvSpPr>
+            <p:cNvPr id="78" name="Textfeld 7">
+              <a:extLst>
+                <a:ext uri="{FF2B5EF4-FFF2-40B4-BE49-F238E27FC236}">
+                  <a16:creationId xmlns:a16="http://schemas.microsoft.com/office/drawing/2014/main" id="{1A888FFA-FB3D-8F88-6805-5698C957E190}"/>
+                </a:ext>
+              </a:extLst>
+            </p:cNvPr>
+            <p:cNvSpPr txBox="1"/>
+            <p:nvPr/>
+          </p:nvSpPr>
+          <p:spPr>
+            <a:xfrm>
+              <a:off x="4381328" y="3868579"/>
+              <a:ext cx="1723297" cy="649772"/>
+            </a:xfrm>
+            <a:prstGeom prst="rect">
+              <a:avLst/>
+            </a:prstGeom>
+            <a:noFill/>
+            <a:ln>
+              <a:solidFill>
+                <a:schemeClr val="tx1"/>
+              </a:solidFill>
+            </a:ln>
+          </p:spPr>
+          <p:txBody>
+            <a:bodyPr wrap="square" rtlCol="0" anchor="ctr" anchorCtr="0">
+              <a:noAutofit/>
+            </a:bodyPr>
+            <a:lstStyle>
+              <a:defPPr>
+                <a:defRPr lang="de-DE"/>
+              </a:defPPr>
+              <a:lvl1pPr algn="ctr">
+                <a:defRPr sz="1200">
+                  <a:latin typeface="Arial" panose="020B0604020202020204" pitchFamily="34" charset="0"/>
+                  <a:cs typeface="Arial" panose="020B0604020202020204" pitchFamily="34" charset="0"/>
+                </a:defRPr>
+              </a:lvl1pPr>
+            </a:lstStyle>
+            <a:p>
+              <a:r>
+                <a:rPr lang="en-US" dirty="0"/>
+                <a:t>42,275 septic, adult ICU patients</a:t>
+              </a:r>
+              <a:br>
+                <a:rPr lang="en-US" dirty="0"/>
+              </a:br>
+              <a:r>
+                <a:rPr lang="en-US" dirty="0"/>
+                <a:t>in eICU-CRD</a:t>
+              </a:r>
+            </a:p>
+          </p:txBody>
+        </p:sp>
+        <p:sp>
+          <p:nvSpPr>
+            <p:cNvPr id="80" name="Textfeld 10">
+              <a:extLst>
+                <a:ext uri="{FF2B5EF4-FFF2-40B4-BE49-F238E27FC236}">
+                  <a16:creationId xmlns:a16="http://schemas.microsoft.com/office/drawing/2014/main" id="{424F9864-2871-62EE-7283-A836BA7F0840}"/>
+                </a:ext>
+              </a:extLst>
+            </p:cNvPr>
+            <p:cNvSpPr txBox="1"/>
+            <p:nvPr/>
+          </p:nvSpPr>
+          <p:spPr>
+            <a:xfrm>
+              <a:off x="1324386" y="3351756"/>
+              <a:ext cx="2621323" cy="461665"/>
+            </a:xfrm>
+            <a:prstGeom prst="rect">
+              <a:avLst/>
+            </a:prstGeom>
+            <a:noFill/>
+            <a:ln>
+              <a:solidFill>
+                <a:schemeClr val="tx1"/>
+              </a:solidFill>
+            </a:ln>
+          </p:spPr>
+          <p:txBody>
+            <a:bodyPr wrap="square" rtlCol="0" anchor="ctr" anchorCtr="0">
+              <a:spAutoFit/>
+            </a:bodyPr>
+            <a:lstStyle/>
+            <a:p>
+              <a:r>
+                <a:rPr lang="en-US" sz="1200" dirty="0">
+                  <a:latin typeface="Arial" panose="020B0604020202020204" pitchFamily="34" charset="0"/>
+                  <a:cs typeface="Arial" panose="020B0604020202020204" pitchFamily="34" charset="0"/>
+                </a:rPr>
+                <a:t>Admissions excluded:</a:t>
+              </a:r>
+            </a:p>
+            <a:p>
+              <a:pPr marL="171450" indent="-171450">
+                <a:buFont typeface="Arial" panose="020B0604020202020204" pitchFamily="34" charset="0"/>
+                <a:buChar char="•"/>
+              </a:pPr>
+              <a:r>
+                <a:rPr lang="en-US" sz="1200" dirty="0">
+                  <a:latin typeface="Arial" panose="020B0604020202020204" pitchFamily="34" charset="0"/>
+                  <a:cs typeface="Arial" panose="020B0604020202020204" pitchFamily="34" charset="0"/>
+                </a:rPr>
+                <a:t>Recurrent stays (n=4,018)</a:t>
+              </a:r>
+            </a:p>
+          </p:txBody>
+        </p:sp>
+        <p:cxnSp>
+          <p:nvCxnSpPr>
+            <p:cNvPr id="82" name="Straight Arrow Connector 81">
+              <a:extLst>
+                <a:ext uri="{FF2B5EF4-FFF2-40B4-BE49-F238E27FC236}">
+                  <a16:creationId xmlns:a16="http://schemas.microsoft.com/office/drawing/2014/main" id="{E3A3D7CE-132F-C4FC-CECF-CD4F0BB22B63}"/>
+                </a:ext>
+              </a:extLst>
+            </p:cNvPr>
+            <p:cNvCxnSpPr>
+              <a:cxnSpLocks/>
+            </p:cNvCxnSpPr>
+            <p:nvPr/>
+          </p:nvCxnSpPr>
+          <p:spPr bwMode="auto">
+            <a:xfrm flipH="1">
+              <a:off x="3982976" y="3560887"/>
+              <a:ext cx="1260000" cy="0"/>
+            </a:xfrm>
+            <a:prstGeom prst="straightConnector1">
+              <a:avLst/>
+            </a:prstGeom>
+            <a:solidFill>
+              <a:schemeClr val="accent1"/>
+            </a:solidFill>
+            <a:ln w="9525" cap="flat" cmpd="sng" algn="ctr">
+              <a:solidFill>
+                <a:schemeClr val="tx1"/>
+              </a:solidFill>
+              <a:prstDash val="solid"/>
+              <a:round/>
+              <a:headEnd type="none" w="med" len="med"/>
+              <a:tailEnd type="triangle"/>
+            </a:ln>
+            <a:effectLst/>
+          </p:spPr>
+        </p:cxnSp>
+        <p:cxnSp>
+          <p:nvCxnSpPr>
+            <p:cNvPr id="83" name="Gerade Verbindung mit Pfeil 12">
+              <a:extLst>
+                <a:ext uri="{FF2B5EF4-FFF2-40B4-BE49-F238E27FC236}">
+                  <a16:creationId xmlns:a16="http://schemas.microsoft.com/office/drawing/2014/main" id="{BC667545-23EB-4839-D6F0-11C3B7CECBD7}"/>
+                </a:ext>
+              </a:extLst>
+            </p:cNvPr>
+            <p:cNvCxnSpPr>
+              <a:cxnSpLocks/>
+            </p:cNvCxnSpPr>
+            <p:nvPr/>
+          </p:nvCxnSpPr>
+          <p:spPr>
+            <a:xfrm>
+              <a:off x="7402434" y="3560887"/>
+              <a:ext cx="1258100" cy="0"/>
+            </a:xfrm>
+            <a:prstGeom prst="straightConnector1">
+              <a:avLst/>
+            </a:prstGeom>
+            <a:ln>
+              <a:tailEnd type="triangle"/>
+            </a:ln>
+          </p:spPr>
+          <p:style>
+            <a:lnRef idx="1">
+              <a:schemeClr val="dk1"/>
+            </a:lnRef>
+            <a:fillRef idx="0">
+              <a:schemeClr val="dk1"/>
+            </a:fillRef>
+            <a:effectRef idx="0">
+              <a:schemeClr val="dk1"/>
+            </a:effectRef>
+            <a:fontRef idx="minor">
               <a:schemeClr val="tx1"/>
+            </a:fontRef>
+          </p:style>
+        </p:cxnSp>
+        <p:sp>
+          <p:nvSpPr>
+            <p:cNvPr id="84" name="TextBox 83">
+              <a:extLst>
+                <a:ext uri="{FF2B5EF4-FFF2-40B4-BE49-F238E27FC236}">
+                  <a16:creationId xmlns:a16="http://schemas.microsoft.com/office/drawing/2014/main" id="{691C427F-6112-8C93-43E8-B4A76518B425}"/>
+                </a:ext>
+              </a:extLst>
+            </p:cNvPr>
+            <p:cNvSpPr txBox="1"/>
+            <p:nvPr/>
+          </p:nvSpPr>
+          <p:spPr>
+            <a:xfrm>
+              <a:off x="4997509" y="1405961"/>
+              <a:ext cx="2736000" cy="261610"/>
+            </a:xfrm>
+            <a:prstGeom prst="rect">
+              <a:avLst/>
+            </a:prstGeom>
+            <a:noFill/>
+          </p:spPr>
+          <p:txBody>
+            <a:bodyPr wrap="square" rtlCol="0">
+              <a:spAutoFit/>
+            </a:bodyPr>
+            <a:lstStyle/>
+            <a:p>
+              <a:pPr algn="ctr"/>
+              <a:r>
+                <a:rPr lang="en-GB" sz="1100" dirty="0">
+                  <a:latin typeface="Arial" panose="020B0604020202020204" pitchFamily="34" charset="0"/>
+                  <a:cs typeface="Arial" panose="020B0604020202020204" pitchFamily="34" charset="0"/>
+                </a:rPr>
+                <a:t>Male: 52.3%   White: 76.8%</a:t>
+              </a:r>
+            </a:p>
+          </p:txBody>
+        </p:sp>
+        <p:sp>
+          <p:nvSpPr>
+            <p:cNvPr id="85" name="TextBox 84">
+              <a:extLst>
+                <a:ext uri="{FF2B5EF4-FFF2-40B4-BE49-F238E27FC236}">
+                  <a16:creationId xmlns:a16="http://schemas.microsoft.com/office/drawing/2014/main" id="{80F2F787-FF5F-CA9B-5E2A-8F1D57828C6C}"/>
+                </a:ext>
+              </a:extLst>
+            </p:cNvPr>
+            <p:cNvSpPr txBox="1"/>
+            <p:nvPr/>
+          </p:nvSpPr>
+          <p:spPr>
+            <a:xfrm>
+              <a:off x="6228950" y="4518351"/>
+              <a:ext cx="2385211" cy="261610"/>
+            </a:xfrm>
+            <a:prstGeom prst="rect">
+              <a:avLst/>
+            </a:prstGeom>
+            <a:noFill/>
+          </p:spPr>
+          <p:txBody>
+            <a:bodyPr wrap="square" rtlCol="0">
+              <a:spAutoFit/>
+            </a:bodyPr>
+            <a:lstStyle/>
+            <a:p>
+              <a:pPr algn="ctr"/>
+              <a:r>
+                <a:rPr lang="en-GB" sz="1100" dirty="0">
+                  <a:latin typeface="Arial" panose="020B0604020202020204" pitchFamily="34" charset="0"/>
+                  <a:cs typeface="Arial" panose="020B0604020202020204" pitchFamily="34" charset="0"/>
+                </a:rPr>
+                <a:t>Male: 56.3%   White: 77.6%</a:t>
+              </a:r>
+            </a:p>
+          </p:txBody>
+        </p:sp>
+        <p:sp>
+          <p:nvSpPr>
+            <p:cNvPr id="86" name="TextBox 85">
+              <a:extLst>
+                <a:ext uri="{FF2B5EF4-FFF2-40B4-BE49-F238E27FC236}">
+                  <a16:creationId xmlns:a16="http://schemas.microsoft.com/office/drawing/2014/main" id="{0775F2D5-60E4-D696-8803-F2399D3CE78A}"/>
+                </a:ext>
+              </a:extLst>
+            </p:cNvPr>
+            <p:cNvSpPr txBox="1"/>
+            <p:nvPr/>
+          </p:nvSpPr>
+          <p:spPr>
+            <a:xfrm>
+              <a:off x="4083705" y="4518351"/>
+              <a:ext cx="2360247" cy="261610"/>
+            </a:xfrm>
+            <a:prstGeom prst="rect">
+              <a:avLst/>
+            </a:prstGeom>
+            <a:noFill/>
+          </p:spPr>
+          <p:txBody>
+            <a:bodyPr wrap="square" rtlCol="0">
+              <a:spAutoFit/>
+            </a:bodyPr>
+            <a:lstStyle/>
+            <a:p>
+              <a:pPr algn="ctr"/>
+              <a:r>
+                <a:rPr lang="en-GB" sz="1100" dirty="0">
+                  <a:latin typeface="Arial" panose="020B0604020202020204" pitchFamily="34" charset="0"/>
+                  <a:cs typeface="Arial" panose="020B0604020202020204" pitchFamily="34" charset="0"/>
+                </a:rPr>
+                <a:t>Male: 52.1%   White: 77.0%</a:t>
+              </a:r>
+            </a:p>
+          </p:txBody>
+        </p:sp>
+        <p:cxnSp>
+          <p:nvCxnSpPr>
+            <p:cNvPr id="5" name="Straight Connector 4">
+              <a:extLst>
+                <a:ext uri="{FF2B5EF4-FFF2-40B4-BE49-F238E27FC236}">
+                  <a16:creationId xmlns:a16="http://schemas.microsoft.com/office/drawing/2014/main" id="{7B0994F4-F9F1-B352-74DD-BF110259071F}"/>
+                </a:ext>
+              </a:extLst>
+            </p:cNvPr>
+            <p:cNvCxnSpPr>
+              <a:cxnSpLocks/>
+              <a:stCxn id="74" idx="2"/>
+            </p:cNvCxnSpPr>
+            <p:nvPr/>
+          </p:nvCxnSpPr>
+          <p:spPr bwMode="auto">
+            <a:xfrm>
+              <a:off x="6327634" y="2952469"/>
+              <a:ext cx="0" cy="361588"/>
+            </a:xfrm>
+            <a:prstGeom prst="line">
+              <a:avLst/>
+            </a:prstGeom>
+            <a:solidFill>
+              <a:schemeClr val="accent1"/>
             </a:solidFill>
-          </a:ln>
-        </p:spPr>
-        <p:txBody>
-          <a:bodyPr wrap="square" rtlCol="0" anchor="ctr" anchorCtr="0">
-            <a:spAutoFit/>
-          </a:bodyPr>
-          <a:lstStyle/>
-          <a:p>
-            <a:r>
-              <a:rPr lang="en-US" sz="1200" dirty="0">
-                <a:latin typeface="Arial" panose="020B0604020202020204" pitchFamily="34" charset="0"/>
-                <a:cs typeface="Arial" panose="020B0604020202020204" pitchFamily="34" charset="0"/>
-              </a:rPr>
-              <a:t>Admissions excluded:</a:t>
-            </a:r>
-          </a:p>
-          <a:p>
-            <a:pPr marL="171450" indent="-171450">
-              <a:buFont typeface="Arial" panose="020B0604020202020204" pitchFamily="34" charset="0"/>
-              <a:buChar char="•"/>
-            </a:pPr>
-            <a:r>
-              <a:rPr lang="en-US" sz="1200" dirty="0">
-                <a:latin typeface="Arial" panose="020B0604020202020204" pitchFamily="34" charset="0"/>
-                <a:cs typeface="Arial" panose="020B0604020202020204" pitchFamily="34" charset="0"/>
-              </a:rPr>
-              <a:t>Non-septic ICU stays (n=152,079)</a:t>
-            </a:r>
-          </a:p>
-          <a:p>
-            <a:pPr marL="171450" indent="-171450">
-              <a:buFont typeface="Arial" panose="020B0604020202020204" pitchFamily="34" charset="0"/>
-              <a:buChar char="•"/>
-            </a:pPr>
-            <a:r>
-              <a:rPr lang="en-US" sz="1200" dirty="0">
-                <a:latin typeface="Arial" panose="020B0604020202020204" pitchFamily="34" charset="0"/>
-                <a:cs typeface="Arial" panose="020B0604020202020204" pitchFamily="34" charset="0"/>
-              </a:rPr>
-              <a:t>LoS &lt; 24 hours (n=2,467)</a:t>
-            </a:r>
-          </a:p>
-          <a:p>
-            <a:pPr marL="171450" indent="-171450">
-              <a:buFont typeface="Arial" panose="020B0604020202020204" pitchFamily="34" charset="0"/>
-              <a:buChar char="•"/>
-            </a:pPr>
-            <a:r>
-              <a:rPr lang="en-US" sz="1200" dirty="0">
-                <a:latin typeface="Arial" panose="020B0604020202020204" pitchFamily="34" charset="0"/>
-                <a:cs typeface="Arial" panose="020B0604020202020204" pitchFamily="34" charset="0"/>
-              </a:rPr>
-              <a:t>Age &lt; 18 (n=20)</a:t>
-            </a:r>
-          </a:p>
-        </p:txBody>
-      </p:sp>
-      <p:cxnSp>
-        <p:nvCxnSpPr>
-          <p:cNvPr id="65" name="Gerade Verbindung mit Pfeil 12">
-            <a:extLst>
-              <a:ext uri="{FF2B5EF4-FFF2-40B4-BE49-F238E27FC236}">
-                <a16:creationId xmlns:a16="http://schemas.microsoft.com/office/drawing/2014/main" id="{5405368C-D870-ACB8-7654-856C800511D0}"/>
-              </a:ext>
-            </a:extLst>
-          </p:cNvPr>
-          <p:cNvCxnSpPr>
-            <a:cxnSpLocks/>
-            <a:endCxn id="64" idx="1"/>
-          </p:cNvCxnSpPr>
-          <p:nvPr/>
-        </p:nvCxnSpPr>
-        <p:spPr>
-          <a:xfrm>
-            <a:off x="6327634" y="1903871"/>
-            <a:ext cx="1253443" cy="1"/>
-          </a:xfrm>
-          <a:prstGeom prst="straightConnector1">
-            <a:avLst/>
-          </a:prstGeom>
-          <a:ln>
-            <a:tailEnd type="triangle"/>
-          </a:ln>
-        </p:spPr>
-        <p:style>
-          <a:lnRef idx="1">
-            <a:schemeClr val="dk1"/>
-          </a:lnRef>
-          <a:fillRef idx="0">
-            <a:schemeClr val="dk1"/>
-          </a:fillRef>
-          <a:effectRef idx="0">
-            <a:schemeClr val="dk1"/>
-          </a:effectRef>
-          <a:fontRef idx="minor">
-            <a:schemeClr val="tx1"/>
-          </a:fontRef>
-        </p:style>
-      </p:cxnSp>
-      <p:cxnSp>
-        <p:nvCxnSpPr>
-          <p:cNvPr id="66" name="Gerade Verbindung mit Pfeil 11">
-            <a:extLst>
-              <a:ext uri="{FF2B5EF4-FFF2-40B4-BE49-F238E27FC236}">
-                <a16:creationId xmlns:a16="http://schemas.microsoft.com/office/drawing/2014/main" id="{779AAE41-520E-F999-07CE-B6F2E6C65E97}"/>
-              </a:ext>
-            </a:extLst>
-          </p:cNvPr>
-          <p:cNvCxnSpPr>
-            <a:cxnSpLocks/>
-            <a:stCxn id="63" idx="2"/>
-            <a:endCxn id="74" idx="0"/>
-          </p:cNvCxnSpPr>
-          <p:nvPr/>
-        </p:nvCxnSpPr>
-        <p:spPr>
-          <a:xfrm>
-            <a:off x="6327092" y="1430523"/>
-            <a:ext cx="542" cy="1029879"/>
-          </a:xfrm>
-          <a:prstGeom prst="straightConnector1">
-            <a:avLst/>
-          </a:prstGeom>
-          <a:ln>
-            <a:tailEnd type="triangle"/>
-          </a:ln>
-        </p:spPr>
-        <p:style>
-          <a:lnRef idx="1">
-            <a:schemeClr val="dk1"/>
-          </a:lnRef>
-          <a:fillRef idx="0">
-            <a:schemeClr val="dk1"/>
-          </a:fillRef>
-          <a:effectRef idx="0">
-            <a:schemeClr val="dk1"/>
-          </a:effectRef>
-          <a:fontRef idx="minor">
-            <a:schemeClr val="tx1"/>
-          </a:fontRef>
-        </p:style>
-      </p:cxnSp>
-      <p:sp>
-        <p:nvSpPr>
-          <p:cNvPr id="67" name="Textfeld 7">
-            <a:extLst>
-              <a:ext uri="{FF2B5EF4-FFF2-40B4-BE49-F238E27FC236}">
-                <a16:creationId xmlns:a16="http://schemas.microsoft.com/office/drawing/2014/main" id="{9C81AA3C-95EC-A11B-5DBB-E3014D96FE56}"/>
-              </a:ext>
-            </a:extLst>
-          </p:cNvPr>
-          <p:cNvSpPr txBox="1"/>
-          <p:nvPr/>
-        </p:nvSpPr>
-        <p:spPr>
-          <a:xfrm>
-            <a:off x="6540244" y="3868579"/>
-            <a:ext cx="1723297" cy="649772"/>
-          </a:xfrm>
-          <a:prstGeom prst="rect">
-            <a:avLst/>
-          </a:prstGeom>
-          <a:noFill/>
-          <a:ln>
+            <a:ln w="9525" cap="flat" cmpd="sng" algn="ctr">
+              <a:solidFill>
+                <a:schemeClr val="tx1"/>
+              </a:solidFill>
+              <a:prstDash val="solid"/>
+              <a:round/>
+              <a:headEnd type="none" w="med" len="med"/>
+              <a:tailEnd type="none" w="med" len="med"/>
+            </a:ln>
+            <a:effectLst/>
+          </p:spPr>
+        </p:cxnSp>
+        <p:cxnSp>
+          <p:nvCxnSpPr>
+            <p:cNvPr id="12" name="Straight Connector 11">
+              <a:extLst>
+                <a:ext uri="{FF2B5EF4-FFF2-40B4-BE49-F238E27FC236}">
+                  <a16:creationId xmlns:a16="http://schemas.microsoft.com/office/drawing/2014/main" id="{E6EF2D60-D10B-CE00-78B6-44F315FC1BFB}"/>
+                </a:ext>
+              </a:extLst>
+            </p:cNvPr>
+            <p:cNvCxnSpPr/>
+            <p:nvPr/>
+          </p:nvCxnSpPr>
+          <p:spPr bwMode="auto">
+            <a:xfrm>
+              <a:off x="5242977" y="3312050"/>
+              <a:ext cx="1080000" cy="0"/>
+            </a:xfrm>
+            <a:prstGeom prst="line">
+              <a:avLst/>
+            </a:prstGeom>
             <a:solidFill>
-              <a:schemeClr val="tx1"/>
+              <a:schemeClr val="accent1"/>
             </a:solidFill>
-          </a:ln>
-        </p:spPr>
-        <p:txBody>
-          <a:bodyPr wrap="square" rtlCol="0" anchor="ctr" anchorCtr="0">
-            <a:noAutofit/>
-          </a:bodyPr>
-          <a:lstStyle>
-            <a:defPPr>
-              <a:defRPr lang="de-DE"/>
-            </a:defPPr>
-            <a:lvl1pPr algn="ctr">
-              <a:defRPr sz="1200">
-                <a:latin typeface="Arial" panose="020B0604020202020204" pitchFamily="34" charset="0"/>
-                <a:cs typeface="Arial" panose="020B0604020202020204" pitchFamily="34" charset="0"/>
-              </a:defRPr>
-            </a:lvl1pPr>
-          </a:lstStyle>
-          <a:p>
-            <a:pPr marL="0" marR="0" lvl="0" indent="0" defTabSz="914400" rtl="0" eaLnBrk="1" fontAlgn="auto" latinLnBrk="0" hangingPunct="1">
-              <a:lnSpc>
-                <a:spcPct val="100000"/>
-              </a:lnSpc>
-              <a:spcBef>
-                <a:spcPts val="0"/>
-              </a:spcBef>
-              <a:spcAft>
-                <a:spcPts val="0"/>
-              </a:spcAft>
-              <a:buClrTx/>
-              <a:buSzTx/>
-              <a:buFontTx/>
-              <a:buNone/>
-              <a:tabLst/>
-              <a:defRPr/>
-            </a:pPr>
-            <a:r>
-              <a:rPr lang="en-US" dirty="0"/>
-              <a:t>2,718 septic, adult, cancer ICU patients</a:t>
-            </a:r>
-            <a:br>
-              <a:rPr lang="en-US" dirty="0"/>
-            </a:br>
-            <a:r>
-              <a:rPr lang="en-US" dirty="0"/>
-              <a:t>in eICU-CRD</a:t>
-            </a:r>
-          </a:p>
-        </p:txBody>
-      </p:sp>
-      <p:cxnSp>
-        <p:nvCxnSpPr>
-          <p:cNvPr id="70" name="Gerade Verbindung mit Pfeil 12">
-            <a:extLst>
-              <a:ext uri="{FF2B5EF4-FFF2-40B4-BE49-F238E27FC236}">
-                <a16:creationId xmlns:a16="http://schemas.microsoft.com/office/drawing/2014/main" id="{512EE106-FD5F-AE1D-7E64-54C3630E5567}"/>
-              </a:ext>
-            </a:extLst>
-          </p:cNvPr>
-          <p:cNvCxnSpPr>
-            <a:cxnSpLocks/>
-          </p:cNvCxnSpPr>
-          <p:nvPr/>
-        </p:nvCxnSpPr>
-        <p:spPr>
-          <a:xfrm>
-            <a:off x="8264083" y="4179679"/>
-            <a:ext cx="391795" cy="0"/>
-          </a:xfrm>
-          <a:prstGeom prst="straightConnector1">
-            <a:avLst/>
-          </a:prstGeom>
-          <a:ln>
-            <a:tailEnd type="triangle"/>
-          </a:ln>
-        </p:spPr>
-        <p:style>
-          <a:lnRef idx="1">
-            <a:schemeClr val="dk1"/>
-          </a:lnRef>
-          <a:fillRef idx="0">
-            <a:schemeClr val="dk1"/>
-          </a:fillRef>
-          <a:effectRef idx="0">
-            <a:schemeClr val="dk1"/>
-          </a:effectRef>
-          <a:fontRef idx="minor">
-            <a:schemeClr val="tx1"/>
-          </a:fontRef>
-        </p:style>
-      </p:cxnSp>
-      <p:sp>
-        <p:nvSpPr>
-          <p:cNvPr id="71" name="Textfeld 10">
-            <a:extLst>
-              <a:ext uri="{FF2B5EF4-FFF2-40B4-BE49-F238E27FC236}">
-                <a16:creationId xmlns:a16="http://schemas.microsoft.com/office/drawing/2014/main" id="{BC7BEE25-B563-E7D4-295D-0D91E75FECC4}"/>
-              </a:ext>
-            </a:extLst>
-          </p:cNvPr>
-          <p:cNvSpPr txBox="1"/>
-          <p:nvPr/>
-        </p:nvSpPr>
-        <p:spPr>
-          <a:xfrm>
-            <a:off x="8655877" y="4071296"/>
-            <a:ext cx="2664000" cy="276999"/>
-          </a:xfrm>
-          <a:prstGeom prst="rect">
-            <a:avLst/>
-          </a:prstGeom>
-          <a:solidFill>
-            <a:schemeClr val="bg1">
-              <a:lumMod val="85000"/>
-            </a:schemeClr>
-          </a:solidFill>
-          <a:ln>
+            <a:ln w="9525" cap="flat" cmpd="sng" algn="ctr">
+              <a:solidFill>
+                <a:schemeClr val="tx1"/>
+              </a:solidFill>
+              <a:prstDash val="solid"/>
+              <a:round/>
+              <a:headEnd type="none" w="med" len="med"/>
+              <a:tailEnd type="none" w="med" len="med"/>
+            </a:ln>
+            <a:effectLst/>
+          </p:spPr>
+        </p:cxnSp>
+        <p:cxnSp>
+          <p:nvCxnSpPr>
+            <p:cNvPr id="14" name="Straight Connector 13">
+              <a:extLst>
+                <a:ext uri="{FF2B5EF4-FFF2-40B4-BE49-F238E27FC236}">
+                  <a16:creationId xmlns:a16="http://schemas.microsoft.com/office/drawing/2014/main" id="{7615786F-1BD3-A57E-8484-0C1E11092A1C}"/>
+                </a:ext>
+              </a:extLst>
+            </p:cNvPr>
+            <p:cNvCxnSpPr/>
+            <p:nvPr/>
+          </p:nvCxnSpPr>
+          <p:spPr bwMode="auto">
+            <a:xfrm>
+              <a:off x="6322977" y="3312050"/>
+              <a:ext cx="1080000" cy="0"/>
+            </a:xfrm>
+            <a:prstGeom prst="line">
+              <a:avLst/>
+            </a:prstGeom>
             <a:solidFill>
-              <a:schemeClr val="tx1"/>
+              <a:schemeClr val="accent1"/>
             </a:solidFill>
-          </a:ln>
-        </p:spPr>
-        <p:txBody>
-          <a:bodyPr wrap="square" rtlCol="0" anchor="ctr" anchorCtr="0">
-            <a:spAutoFit/>
-          </a:bodyPr>
-          <a:lstStyle/>
-          <a:p>
-            <a:r>
-              <a:rPr lang="en-US" sz="1200" dirty="0">
-                <a:latin typeface="Arial" panose="020B0604020202020204" pitchFamily="34" charset="0"/>
-                <a:cs typeface="Arial" panose="020B0604020202020204" pitchFamily="34" charset="0"/>
-              </a:rPr>
-              <a:t>Q2: Different Cancer Patients</a:t>
-            </a:r>
-          </a:p>
-        </p:txBody>
-      </p:sp>
-      <p:cxnSp>
-        <p:nvCxnSpPr>
-          <p:cNvPr id="72" name="Gerade Verbindung mit Pfeil 12">
-            <a:extLst>
-              <a:ext uri="{FF2B5EF4-FFF2-40B4-BE49-F238E27FC236}">
-                <a16:creationId xmlns:a16="http://schemas.microsoft.com/office/drawing/2014/main" id="{3A790D12-EB46-AC86-8CC3-8AA1CB11CBA2}"/>
-              </a:ext>
-            </a:extLst>
-          </p:cNvPr>
-          <p:cNvCxnSpPr>
-            <a:cxnSpLocks/>
-            <a:endCxn id="73" idx="3"/>
-          </p:cNvCxnSpPr>
-          <p:nvPr/>
-        </p:nvCxnSpPr>
-        <p:spPr>
-          <a:xfrm flipH="1">
-            <a:off x="3945709" y="4199964"/>
-            <a:ext cx="442800" cy="0"/>
-          </a:xfrm>
-          <a:prstGeom prst="straightConnector1">
-            <a:avLst/>
-          </a:prstGeom>
-          <a:ln>
-            <a:tailEnd type="triangle"/>
-          </a:ln>
-        </p:spPr>
-        <p:style>
-          <a:lnRef idx="1">
-            <a:schemeClr val="dk1"/>
-          </a:lnRef>
-          <a:fillRef idx="0">
-            <a:schemeClr val="dk1"/>
-          </a:fillRef>
-          <a:effectRef idx="0">
-            <a:schemeClr val="dk1"/>
-          </a:effectRef>
-          <a:fontRef idx="minor">
-            <a:schemeClr val="tx1"/>
-          </a:fontRef>
-        </p:style>
-      </p:cxnSp>
-      <p:sp>
-        <p:nvSpPr>
-          <p:cNvPr id="73" name="Textfeld 10">
-            <a:extLst>
-              <a:ext uri="{FF2B5EF4-FFF2-40B4-BE49-F238E27FC236}">
-                <a16:creationId xmlns:a16="http://schemas.microsoft.com/office/drawing/2014/main" id="{BD3C0D72-1E1E-F9E4-F9C4-7C6B26BFF127}"/>
-              </a:ext>
-            </a:extLst>
-          </p:cNvPr>
-          <p:cNvSpPr txBox="1"/>
-          <p:nvPr/>
-        </p:nvSpPr>
-        <p:spPr>
-          <a:xfrm>
-            <a:off x="1324386" y="4061464"/>
-            <a:ext cx="2621323" cy="276999"/>
-          </a:xfrm>
-          <a:prstGeom prst="rect">
-            <a:avLst/>
-          </a:prstGeom>
-          <a:solidFill>
-            <a:schemeClr val="bg1">
-              <a:lumMod val="85000"/>
-            </a:schemeClr>
-          </a:solidFill>
-          <a:ln>
+            <a:ln w="9525" cap="flat" cmpd="sng" algn="ctr">
+              <a:solidFill>
+                <a:schemeClr val="tx1"/>
+              </a:solidFill>
+              <a:prstDash val="solid"/>
+              <a:round/>
+              <a:headEnd type="none" w="med" len="med"/>
+              <a:tailEnd type="none" w="med" len="med"/>
+            </a:ln>
+            <a:effectLst/>
+          </p:spPr>
+        </p:cxnSp>
+        <p:cxnSp>
+          <p:nvCxnSpPr>
+            <p:cNvPr id="21" name="Straight Arrow Connector 20">
+              <a:extLst>
+                <a:ext uri="{FF2B5EF4-FFF2-40B4-BE49-F238E27FC236}">
+                  <a16:creationId xmlns:a16="http://schemas.microsoft.com/office/drawing/2014/main" id="{02739597-C2B2-3534-AFAC-5B0F4AF9FEA9}"/>
+                </a:ext>
+              </a:extLst>
+            </p:cNvPr>
+            <p:cNvCxnSpPr>
+              <a:cxnSpLocks/>
+            </p:cNvCxnSpPr>
+            <p:nvPr/>
+          </p:nvCxnSpPr>
+          <p:spPr bwMode="auto">
+            <a:xfrm flipH="1">
+              <a:off x="7401893" y="3314057"/>
+              <a:ext cx="542" cy="540000"/>
+            </a:xfrm>
+            <a:prstGeom prst="straightConnector1">
+              <a:avLst/>
+            </a:prstGeom>
             <a:solidFill>
-              <a:schemeClr val="tx1"/>
+              <a:schemeClr val="accent1"/>
             </a:solidFill>
-          </a:ln>
-        </p:spPr>
-        <p:txBody>
-          <a:bodyPr wrap="square" rtlCol="0" anchor="ctr" anchorCtr="0">
-            <a:spAutoFit/>
-          </a:bodyPr>
-          <a:lstStyle/>
-          <a:p>
-            <a:r>
-              <a:rPr lang="en-US" sz="1200" dirty="0">
-                <a:latin typeface="Arial" panose="020B0604020202020204" pitchFamily="34" charset="0"/>
-                <a:cs typeface="Arial" panose="020B0604020202020204" pitchFamily="34" charset="0"/>
-              </a:rPr>
-              <a:t>Q1: Cancer vs. Non-Cancer Stays</a:t>
-            </a:r>
-          </a:p>
-        </p:txBody>
-      </p:sp>
-      <p:sp>
-        <p:nvSpPr>
-          <p:cNvPr id="74" name="Textfeld 7">
-            <a:extLst>
-              <a:ext uri="{FF2B5EF4-FFF2-40B4-BE49-F238E27FC236}">
-                <a16:creationId xmlns:a16="http://schemas.microsoft.com/office/drawing/2014/main" id="{38AE17A8-1C2C-8FD4-E6E2-29D437D6BEF7}"/>
-              </a:ext>
-            </a:extLst>
-          </p:cNvPr>
-          <p:cNvSpPr txBox="1"/>
-          <p:nvPr/>
-        </p:nvSpPr>
-        <p:spPr>
-          <a:xfrm>
-            <a:off x="5465985" y="2460402"/>
-            <a:ext cx="1723297" cy="492067"/>
-          </a:xfrm>
-          <a:prstGeom prst="rect">
-            <a:avLst/>
-          </a:prstGeom>
-          <a:noFill/>
-          <a:ln>
-            <a:solidFill>
-              <a:schemeClr val="tx1"/>
-            </a:solidFill>
-          </a:ln>
-        </p:spPr>
-        <p:txBody>
-          <a:bodyPr wrap="square" rtlCol="0" anchor="ctr" anchorCtr="0">
-            <a:noAutofit/>
-          </a:bodyPr>
-          <a:lstStyle/>
-          <a:p>
-            <a:pPr algn="ctr"/>
-            <a:r>
-              <a:rPr lang="en-US" sz="1200" dirty="0">
-                <a:latin typeface="Arial" panose="020B0604020202020204" pitchFamily="34" charset="0"/>
-                <a:cs typeface="Arial" panose="020B0604020202020204" pitchFamily="34" charset="0"/>
-              </a:rPr>
-              <a:t>46,293 ICU septic stays in eICU-CRD</a:t>
-            </a:r>
-          </a:p>
-        </p:txBody>
-      </p:sp>
-      <p:sp>
-        <p:nvSpPr>
-          <p:cNvPr id="75" name="Textfeld 10">
-            <a:extLst>
-              <a:ext uri="{FF2B5EF4-FFF2-40B4-BE49-F238E27FC236}">
-                <a16:creationId xmlns:a16="http://schemas.microsoft.com/office/drawing/2014/main" id="{258EDA06-6330-1B52-BC70-8AEAC35ACBC2}"/>
-              </a:ext>
-            </a:extLst>
-          </p:cNvPr>
-          <p:cNvSpPr txBox="1"/>
-          <p:nvPr/>
-        </p:nvSpPr>
-        <p:spPr>
-          <a:xfrm>
-            <a:off x="8655876" y="3239299"/>
-            <a:ext cx="2650025" cy="646331"/>
-          </a:xfrm>
-          <a:prstGeom prst="rect">
-            <a:avLst/>
-          </a:prstGeom>
-          <a:noFill/>
-          <a:ln>
-            <a:solidFill>
-              <a:schemeClr val="tx1"/>
-            </a:solidFill>
-          </a:ln>
-        </p:spPr>
-        <p:txBody>
-          <a:bodyPr wrap="square" rtlCol="0" anchor="ctr" anchorCtr="0">
-            <a:spAutoFit/>
-          </a:bodyPr>
-          <a:lstStyle/>
-          <a:p>
-            <a:r>
-              <a:rPr lang="en-US" sz="1200" dirty="0">
-                <a:latin typeface="Arial" panose="020B0604020202020204" pitchFamily="34" charset="0"/>
-                <a:cs typeface="Arial" panose="020B0604020202020204" pitchFamily="34" charset="0"/>
-              </a:rPr>
-              <a:t>Admissions excluded:</a:t>
-            </a:r>
-          </a:p>
-          <a:p>
-            <a:pPr marL="171450" indent="-171450">
-              <a:buFont typeface="Arial" panose="020B0604020202020204" pitchFamily="34" charset="0"/>
-              <a:buChar char="•"/>
-            </a:pPr>
-            <a:r>
-              <a:rPr lang="en-US" sz="1200" dirty="0">
-                <a:latin typeface="Arial" panose="020B0604020202020204" pitchFamily="34" charset="0"/>
-                <a:cs typeface="Arial" panose="020B0604020202020204" pitchFamily="34" charset="0"/>
-              </a:rPr>
-              <a:t>Non-cancer stays (n=43,338)</a:t>
-            </a:r>
-          </a:p>
-          <a:p>
-            <a:pPr marL="171450" indent="-171450">
-              <a:buFont typeface="Arial" panose="020B0604020202020204" pitchFamily="34" charset="0"/>
-              <a:buChar char="•"/>
-            </a:pPr>
-            <a:r>
-              <a:rPr lang="en-US" sz="1200" dirty="0">
-                <a:latin typeface="Arial" panose="020B0604020202020204" pitchFamily="34" charset="0"/>
-                <a:cs typeface="Arial" panose="020B0604020202020204" pitchFamily="34" charset="0"/>
-              </a:rPr>
-              <a:t>Recurrent stays (n=237)</a:t>
-            </a:r>
-          </a:p>
-        </p:txBody>
-      </p:sp>
-      <p:cxnSp>
-        <p:nvCxnSpPr>
-          <p:cNvPr id="76" name="Straight Arrow Connector 75">
-            <a:extLst>
-              <a:ext uri="{FF2B5EF4-FFF2-40B4-BE49-F238E27FC236}">
-                <a16:creationId xmlns:a16="http://schemas.microsoft.com/office/drawing/2014/main" id="{8ADF50A7-DD6E-60A6-6FEE-86C316FA96D9}"/>
-              </a:ext>
-            </a:extLst>
-          </p:cNvPr>
-          <p:cNvCxnSpPr>
-            <a:cxnSpLocks/>
-          </p:cNvCxnSpPr>
-          <p:nvPr/>
-        </p:nvCxnSpPr>
-        <p:spPr bwMode="auto">
-          <a:xfrm flipH="1">
-            <a:off x="5247634" y="3312589"/>
-            <a:ext cx="542" cy="540000"/>
-          </a:xfrm>
-          <a:prstGeom prst="straightConnector1">
-            <a:avLst/>
-          </a:prstGeom>
-          <a:solidFill>
-            <a:schemeClr val="accent1"/>
-          </a:solidFill>
-          <a:ln w="9525" cap="flat" cmpd="sng" algn="ctr">
-            <a:solidFill>
-              <a:schemeClr val="tx1"/>
-            </a:solidFill>
-            <a:prstDash val="solid"/>
-            <a:round/>
-            <a:headEnd type="none" w="med" len="med"/>
-            <a:tailEnd type="triangle"/>
-          </a:ln>
-          <a:effectLst/>
-        </p:spPr>
-      </p:cxnSp>
-      <p:sp>
-        <p:nvSpPr>
-          <p:cNvPr id="78" name="Textfeld 7">
-            <a:extLst>
-              <a:ext uri="{FF2B5EF4-FFF2-40B4-BE49-F238E27FC236}">
-                <a16:creationId xmlns:a16="http://schemas.microsoft.com/office/drawing/2014/main" id="{1A888FFA-FB3D-8F88-6805-5698C957E190}"/>
-              </a:ext>
-            </a:extLst>
-          </p:cNvPr>
-          <p:cNvSpPr txBox="1"/>
-          <p:nvPr/>
-        </p:nvSpPr>
-        <p:spPr>
-          <a:xfrm>
-            <a:off x="4381328" y="3868579"/>
-            <a:ext cx="1723297" cy="649772"/>
-          </a:xfrm>
-          <a:prstGeom prst="rect">
-            <a:avLst/>
-          </a:prstGeom>
-          <a:noFill/>
-          <a:ln>
-            <a:solidFill>
-              <a:schemeClr val="tx1"/>
-            </a:solidFill>
-          </a:ln>
-        </p:spPr>
-        <p:txBody>
-          <a:bodyPr wrap="square" rtlCol="0" anchor="ctr" anchorCtr="0">
-            <a:noAutofit/>
-          </a:bodyPr>
-          <a:lstStyle>
-            <a:defPPr>
-              <a:defRPr lang="de-DE"/>
-            </a:defPPr>
-            <a:lvl1pPr algn="ctr">
-              <a:defRPr sz="1200">
-                <a:latin typeface="Arial" panose="020B0604020202020204" pitchFamily="34" charset="0"/>
-                <a:cs typeface="Arial" panose="020B0604020202020204" pitchFamily="34" charset="0"/>
-              </a:defRPr>
-            </a:lvl1pPr>
-          </a:lstStyle>
-          <a:p>
-            <a:r>
-              <a:rPr lang="en-US" dirty="0"/>
-              <a:t>42,275 septic, adult ICU patients</a:t>
-            </a:r>
-            <a:br>
-              <a:rPr lang="en-US" dirty="0"/>
-            </a:br>
-            <a:r>
-              <a:rPr lang="en-US" dirty="0"/>
-              <a:t>in eICU-CRD</a:t>
-            </a:r>
-          </a:p>
-        </p:txBody>
-      </p:sp>
-      <p:sp>
-        <p:nvSpPr>
-          <p:cNvPr id="80" name="Textfeld 10">
-            <a:extLst>
-              <a:ext uri="{FF2B5EF4-FFF2-40B4-BE49-F238E27FC236}">
-                <a16:creationId xmlns:a16="http://schemas.microsoft.com/office/drawing/2014/main" id="{424F9864-2871-62EE-7283-A836BA7F0840}"/>
-              </a:ext>
-            </a:extLst>
-          </p:cNvPr>
-          <p:cNvSpPr txBox="1"/>
-          <p:nvPr/>
-        </p:nvSpPr>
-        <p:spPr>
-          <a:xfrm>
-            <a:off x="1324386" y="3351756"/>
-            <a:ext cx="2621323" cy="461665"/>
-          </a:xfrm>
-          <a:prstGeom prst="rect">
-            <a:avLst/>
-          </a:prstGeom>
-          <a:noFill/>
-          <a:ln>
-            <a:solidFill>
-              <a:schemeClr val="tx1"/>
-            </a:solidFill>
-          </a:ln>
-        </p:spPr>
-        <p:txBody>
-          <a:bodyPr wrap="square" rtlCol="0" anchor="ctr" anchorCtr="0">
-            <a:spAutoFit/>
-          </a:bodyPr>
-          <a:lstStyle/>
-          <a:p>
-            <a:r>
-              <a:rPr lang="en-US" sz="1200" dirty="0">
-                <a:latin typeface="Arial" panose="020B0604020202020204" pitchFamily="34" charset="0"/>
-                <a:cs typeface="Arial" panose="020B0604020202020204" pitchFamily="34" charset="0"/>
-              </a:rPr>
-              <a:t>Admissions excluded:</a:t>
-            </a:r>
-          </a:p>
-          <a:p>
-            <a:pPr marL="171450" indent="-171450">
-              <a:buFont typeface="Arial" panose="020B0604020202020204" pitchFamily="34" charset="0"/>
-              <a:buChar char="•"/>
-            </a:pPr>
-            <a:r>
-              <a:rPr lang="en-US" sz="1200" dirty="0">
-                <a:latin typeface="Arial" panose="020B0604020202020204" pitchFamily="34" charset="0"/>
-                <a:cs typeface="Arial" panose="020B0604020202020204" pitchFamily="34" charset="0"/>
-              </a:rPr>
-              <a:t>Recurrent stays (n=4,018)</a:t>
-            </a:r>
-          </a:p>
-        </p:txBody>
-      </p:sp>
-      <p:cxnSp>
-        <p:nvCxnSpPr>
-          <p:cNvPr id="82" name="Straight Arrow Connector 81">
-            <a:extLst>
-              <a:ext uri="{FF2B5EF4-FFF2-40B4-BE49-F238E27FC236}">
-                <a16:creationId xmlns:a16="http://schemas.microsoft.com/office/drawing/2014/main" id="{E3A3D7CE-132F-C4FC-CECF-CD4F0BB22B63}"/>
-              </a:ext>
-            </a:extLst>
-          </p:cNvPr>
-          <p:cNvCxnSpPr>
-            <a:cxnSpLocks/>
-          </p:cNvCxnSpPr>
-          <p:nvPr/>
-        </p:nvCxnSpPr>
-        <p:spPr bwMode="auto">
-          <a:xfrm flipH="1">
-            <a:off x="3982976" y="3560887"/>
-            <a:ext cx="1260000" cy="0"/>
-          </a:xfrm>
-          <a:prstGeom prst="straightConnector1">
-            <a:avLst/>
-          </a:prstGeom>
-          <a:solidFill>
-            <a:schemeClr val="accent1"/>
-          </a:solidFill>
-          <a:ln w="9525" cap="flat" cmpd="sng" algn="ctr">
-            <a:solidFill>
-              <a:schemeClr val="tx1"/>
-            </a:solidFill>
-            <a:prstDash val="solid"/>
-            <a:round/>
-            <a:headEnd type="none" w="med" len="med"/>
-            <a:tailEnd type="triangle"/>
-          </a:ln>
-          <a:effectLst/>
-        </p:spPr>
-      </p:cxnSp>
-      <p:cxnSp>
-        <p:nvCxnSpPr>
-          <p:cNvPr id="83" name="Gerade Verbindung mit Pfeil 12">
-            <a:extLst>
-              <a:ext uri="{FF2B5EF4-FFF2-40B4-BE49-F238E27FC236}">
-                <a16:creationId xmlns:a16="http://schemas.microsoft.com/office/drawing/2014/main" id="{BC667545-23EB-4839-D6F0-11C3B7CECBD7}"/>
-              </a:ext>
-            </a:extLst>
-          </p:cNvPr>
-          <p:cNvCxnSpPr>
-            <a:cxnSpLocks/>
-          </p:cNvCxnSpPr>
-          <p:nvPr/>
-        </p:nvCxnSpPr>
-        <p:spPr>
-          <a:xfrm>
-            <a:off x="7402434" y="3560887"/>
-            <a:ext cx="1258100" cy="0"/>
-          </a:xfrm>
-          <a:prstGeom prst="straightConnector1">
-            <a:avLst/>
-          </a:prstGeom>
-          <a:ln>
-            <a:tailEnd type="triangle"/>
-          </a:ln>
-        </p:spPr>
-        <p:style>
-          <a:lnRef idx="1">
-            <a:schemeClr val="dk1"/>
-          </a:lnRef>
-          <a:fillRef idx="0">
-            <a:schemeClr val="dk1"/>
-          </a:fillRef>
-          <a:effectRef idx="0">
-            <a:schemeClr val="dk1"/>
-          </a:effectRef>
-          <a:fontRef idx="minor">
-            <a:schemeClr val="tx1"/>
-          </a:fontRef>
-        </p:style>
-      </p:cxnSp>
-      <p:sp>
-        <p:nvSpPr>
-          <p:cNvPr id="84" name="TextBox 83">
-            <a:extLst>
-              <a:ext uri="{FF2B5EF4-FFF2-40B4-BE49-F238E27FC236}">
-                <a16:creationId xmlns:a16="http://schemas.microsoft.com/office/drawing/2014/main" id="{691C427F-6112-8C93-43E8-B4A76518B425}"/>
-              </a:ext>
-            </a:extLst>
-          </p:cNvPr>
-          <p:cNvSpPr txBox="1"/>
-          <p:nvPr/>
-        </p:nvSpPr>
-        <p:spPr>
-          <a:xfrm>
-            <a:off x="4997509" y="1405961"/>
-            <a:ext cx="2736000" cy="261610"/>
-          </a:xfrm>
-          <a:prstGeom prst="rect">
-            <a:avLst/>
-          </a:prstGeom>
-          <a:noFill/>
-        </p:spPr>
-        <p:txBody>
-          <a:bodyPr wrap="square" rtlCol="0">
-            <a:spAutoFit/>
-          </a:bodyPr>
-          <a:lstStyle/>
-          <a:p>
-            <a:pPr algn="ctr"/>
-            <a:r>
-              <a:rPr lang="en-GB" sz="1100" dirty="0">
-                <a:latin typeface="Arial" panose="020B0604020202020204" pitchFamily="34" charset="0"/>
-                <a:cs typeface="Arial" panose="020B0604020202020204" pitchFamily="34" charset="0"/>
-              </a:rPr>
-              <a:t>Male: 52.3%   White: 76.8%</a:t>
-            </a:r>
-          </a:p>
-        </p:txBody>
-      </p:sp>
-      <p:sp>
-        <p:nvSpPr>
-          <p:cNvPr id="85" name="TextBox 84">
-            <a:extLst>
-              <a:ext uri="{FF2B5EF4-FFF2-40B4-BE49-F238E27FC236}">
-                <a16:creationId xmlns:a16="http://schemas.microsoft.com/office/drawing/2014/main" id="{80F2F787-FF5F-CA9B-5E2A-8F1D57828C6C}"/>
-              </a:ext>
-            </a:extLst>
-          </p:cNvPr>
-          <p:cNvSpPr txBox="1"/>
-          <p:nvPr/>
-        </p:nvSpPr>
-        <p:spPr>
-          <a:xfrm>
-            <a:off x="6228950" y="4518351"/>
-            <a:ext cx="2385211" cy="261610"/>
-          </a:xfrm>
-          <a:prstGeom prst="rect">
-            <a:avLst/>
-          </a:prstGeom>
-          <a:noFill/>
-        </p:spPr>
-        <p:txBody>
-          <a:bodyPr wrap="square" rtlCol="0">
-            <a:spAutoFit/>
-          </a:bodyPr>
-          <a:lstStyle/>
-          <a:p>
-            <a:pPr algn="ctr"/>
-            <a:r>
-              <a:rPr lang="en-GB" sz="1100" dirty="0">
-                <a:latin typeface="Arial" panose="020B0604020202020204" pitchFamily="34" charset="0"/>
-                <a:cs typeface="Arial" panose="020B0604020202020204" pitchFamily="34" charset="0"/>
-              </a:rPr>
-              <a:t>Male: 56.3%   White: 77.6%</a:t>
-            </a:r>
-          </a:p>
-        </p:txBody>
-      </p:sp>
-      <p:sp>
-        <p:nvSpPr>
-          <p:cNvPr id="86" name="TextBox 85">
-            <a:extLst>
-              <a:ext uri="{FF2B5EF4-FFF2-40B4-BE49-F238E27FC236}">
-                <a16:creationId xmlns:a16="http://schemas.microsoft.com/office/drawing/2014/main" id="{0775F2D5-60E4-D696-8803-F2399D3CE78A}"/>
-              </a:ext>
-            </a:extLst>
-          </p:cNvPr>
-          <p:cNvSpPr txBox="1"/>
-          <p:nvPr/>
-        </p:nvSpPr>
-        <p:spPr>
-          <a:xfrm>
-            <a:off x="4083705" y="4518351"/>
-            <a:ext cx="2360247" cy="261610"/>
-          </a:xfrm>
-          <a:prstGeom prst="rect">
-            <a:avLst/>
-          </a:prstGeom>
-          <a:noFill/>
-        </p:spPr>
-        <p:txBody>
-          <a:bodyPr wrap="square" rtlCol="0">
-            <a:spAutoFit/>
-          </a:bodyPr>
-          <a:lstStyle/>
-          <a:p>
-            <a:pPr algn="ctr"/>
-            <a:r>
-              <a:rPr lang="en-GB" sz="1100" dirty="0">
-                <a:latin typeface="Arial" panose="020B0604020202020204" pitchFamily="34" charset="0"/>
-                <a:cs typeface="Arial" panose="020B0604020202020204" pitchFamily="34" charset="0"/>
-              </a:rPr>
-              <a:t>Male: 52.1%   White: 77.0%</a:t>
-            </a:r>
-          </a:p>
-        </p:txBody>
-      </p:sp>
-      <p:cxnSp>
-        <p:nvCxnSpPr>
-          <p:cNvPr id="5" name="Straight Connector 4">
-            <a:extLst>
-              <a:ext uri="{FF2B5EF4-FFF2-40B4-BE49-F238E27FC236}">
-                <a16:creationId xmlns:a16="http://schemas.microsoft.com/office/drawing/2014/main" id="{7B0994F4-F9F1-B352-74DD-BF110259071F}"/>
-              </a:ext>
-            </a:extLst>
-          </p:cNvPr>
-          <p:cNvCxnSpPr>
-            <a:cxnSpLocks/>
-            <a:stCxn id="74" idx="2"/>
-          </p:cNvCxnSpPr>
-          <p:nvPr/>
-        </p:nvCxnSpPr>
-        <p:spPr bwMode="auto">
-          <a:xfrm>
-            <a:off x="6327634" y="2952469"/>
-            <a:ext cx="0" cy="361588"/>
-          </a:xfrm>
-          <a:prstGeom prst="line">
-            <a:avLst/>
-          </a:prstGeom>
-          <a:solidFill>
-            <a:schemeClr val="accent1"/>
-          </a:solidFill>
-          <a:ln w="9525" cap="flat" cmpd="sng" algn="ctr">
-            <a:solidFill>
-              <a:schemeClr val="tx1"/>
-            </a:solidFill>
-            <a:prstDash val="solid"/>
-            <a:round/>
-            <a:headEnd type="none" w="med" len="med"/>
-            <a:tailEnd type="none" w="med" len="med"/>
-          </a:ln>
-          <a:effectLst/>
-        </p:spPr>
-      </p:cxnSp>
-      <p:cxnSp>
-        <p:nvCxnSpPr>
-          <p:cNvPr id="12" name="Straight Connector 11">
-            <a:extLst>
-              <a:ext uri="{FF2B5EF4-FFF2-40B4-BE49-F238E27FC236}">
-                <a16:creationId xmlns:a16="http://schemas.microsoft.com/office/drawing/2014/main" id="{E6EF2D60-D10B-CE00-78B6-44F315FC1BFB}"/>
-              </a:ext>
-            </a:extLst>
-          </p:cNvPr>
-          <p:cNvCxnSpPr/>
-          <p:nvPr/>
-        </p:nvCxnSpPr>
-        <p:spPr bwMode="auto">
-          <a:xfrm>
-            <a:off x="5242977" y="3312050"/>
-            <a:ext cx="1080000" cy="0"/>
-          </a:xfrm>
-          <a:prstGeom prst="line">
-            <a:avLst/>
-          </a:prstGeom>
-          <a:solidFill>
-            <a:schemeClr val="accent1"/>
-          </a:solidFill>
-          <a:ln w="9525" cap="flat" cmpd="sng" algn="ctr">
-            <a:solidFill>
-              <a:schemeClr val="tx1"/>
-            </a:solidFill>
-            <a:prstDash val="solid"/>
-            <a:round/>
-            <a:headEnd type="none" w="med" len="med"/>
-            <a:tailEnd type="none" w="med" len="med"/>
-          </a:ln>
-          <a:effectLst/>
-        </p:spPr>
-      </p:cxnSp>
-      <p:cxnSp>
-        <p:nvCxnSpPr>
-          <p:cNvPr id="14" name="Straight Connector 13">
-            <a:extLst>
-              <a:ext uri="{FF2B5EF4-FFF2-40B4-BE49-F238E27FC236}">
-                <a16:creationId xmlns:a16="http://schemas.microsoft.com/office/drawing/2014/main" id="{7615786F-1BD3-A57E-8484-0C1E11092A1C}"/>
-              </a:ext>
-            </a:extLst>
-          </p:cNvPr>
-          <p:cNvCxnSpPr/>
-          <p:nvPr/>
-        </p:nvCxnSpPr>
-        <p:spPr bwMode="auto">
-          <a:xfrm>
-            <a:off x="6322977" y="3312050"/>
-            <a:ext cx="1080000" cy="0"/>
-          </a:xfrm>
-          <a:prstGeom prst="line">
-            <a:avLst/>
-          </a:prstGeom>
-          <a:solidFill>
-            <a:schemeClr val="accent1"/>
-          </a:solidFill>
-          <a:ln w="9525" cap="flat" cmpd="sng" algn="ctr">
-            <a:solidFill>
-              <a:schemeClr val="tx1"/>
-            </a:solidFill>
-            <a:prstDash val="solid"/>
-            <a:round/>
-            <a:headEnd type="none" w="med" len="med"/>
-            <a:tailEnd type="none" w="med" len="med"/>
-          </a:ln>
-          <a:effectLst/>
-        </p:spPr>
-      </p:cxnSp>
-      <p:cxnSp>
-        <p:nvCxnSpPr>
-          <p:cNvPr id="21" name="Straight Arrow Connector 20">
-            <a:extLst>
-              <a:ext uri="{FF2B5EF4-FFF2-40B4-BE49-F238E27FC236}">
-                <a16:creationId xmlns:a16="http://schemas.microsoft.com/office/drawing/2014/main" id="{02739597-C2B2-3534-AFAC-5B0F4AF9FEA9}"/>
-              </a:ext>
-            </a:extLst>
-          </p:cNvPr>
-          <p:cNvCxnSpPr>
-            <a:cxnSpLocks/>
-          </p:cNvCxnSpPr>
-          <p:nvPr/>
-        </p:nvCxnSpPr>
-        <p:spPr bwMode="auto">
-          <a:xfrm flipH="1">
-            <a:off x="7401893" y="3314057"/>
-            <a:ext cx="542" cy="540000"/>
-          </a:xfrm>
-          <a:prstGeom prst="straightConnector1">
-            <a:avLst/>
-          </a:prstGeom>
-          <a:solidFill>
-            <a:schemeClr val="accent1"/>
-          </a:solidFill>
-          <a:ln w="9525" cap="flat" cmpd="sng" algn="ctr">
-            <a:solidFill>
-              <a:schemeClr val="tx1"/>
-            </a:solidFill>
-            <a:prstDash val="solid"/>
-            <a:round/>
-            <a:headEnd type="none" w="med" len="med"/>
-            <a:tailEnd type="triangle"/>
-          </a:ln>
-          <a:effectLst/>
-        </p:spPr>
-      </p:cxnSp>
-      <p:sp>
-        <p:nvSpPr>
-          <p:cNvPr id="24" name="TextBox 23">
-            <a:extLst>
-              <a:ext uri="{FF2B5EF4-FFF2-40B4-BE49-F238E27FC236}">
-                <a16:creationId xmlns:a16="http://schemas.microsoft.com/office/drawing/2014/main" id="{C5559FA8-23AE-6A90-D689-D4F6A3440E12}"/>
-              </a:ext>
-            </a:extLst>
-          </p:cNvPr>
-          <p:cNvSpPr txBox="1"/>
-          <p:nvPr/>
-        </p:nvSpPr>
-        <p:spPr>
-          <a:xfrm>
-            <a:off x="5185448" y="2959819"/>
-            <a:ext cx="2360247" cy="261610"/>
-          </a:xfrm>
-          <a:prstGeom prst="rect">
-            <a:avLst/>
-          </a:prstGeom>
-          <a:noFill/>
-        </p:spPr>
-        <p:txBody>
-          <a:bodyPr wrap="square" rtlCol="0">
-            <a:spAutoFit/>
-          </a:bodyPr>
-          <a:lstStyle/>
-          <a:p>
-            <a:pPr algn="ctr"/>
-            <a:r>
-              <a:rPr lang="en-GB" sz="1100" dirty="0">
-                <a:latin typeface="Arial" panose="020B0604020202020204" pitchFamily="34" charset="0"/>
-                <a:cs typeface="Arial" panose="020B0604020202020204" pitchFamily="34" charset="0"/>
-              </a:rPr>
-              <a:t>Male: 52.4%   White: 76.7%</a:t>
-            </a:r>
-          </a:p>
-        </p:txBody>
-      </p:sp>
+            <a:ln w="9525" cap="flat" cmpd="sng" algn="ctr">
+              <a:solidFill>
+                <a:schemeClr val="tx1"/>
+              </a:solidFill>
+              <a:prstDash val="solid"/>
+              <a:round/>
+              <a:headEnd type="none" w="med" len="med"/>
+              <a:tailEnd type="triangle"/>
+            </a:ln>
+            <a:effectLst/>
+          </p:spPr>
+        </p:cxnSp>
+        <p:sp>
+          <p:nvSpPr>
+            <p:cNvPr id="24" name="TextBox 23">
+              <a:extLst>
+                <a:ext uri="{FF2B5EF4-FFF2-40B4-BE49-F238E27FC236}">
+                  <a16:creationId xmlns:a16="http://schemas.microsoft.com/office/drawing/2014/main" id="{C5559FA8-23AE-6A90-D689-D4F6A3440E12}"/>
+                </a:ext>
+              </a:extLst>
+            </p:cNvPr>
+            <p:cNvSpPr txBox="1"/>
+            <p:nvPr/>
+          </p:nvSpPr>
+          <p:spPr>
+            <a:xfrm>
+              <a:off x="5185448" y="2959819"/>
+              <a:ext cx="2360247" cy="261610"/>
+            </a:xfrm>
+            <a:prstGeom prst="rect">
+              <a:avLst/>
+            </a:prstGeom>
+            <a:noFill/>
+          </p:spPr>
+          <p:txBody>
+            <a:bodyPr wrap="square" rtlCol="0">
+              <a:spAutoFit/>
+            </a:bodyPr>
+            <a:lstStyle/>
+            <a:p>
+              <a:pPr algn="ctr"/>
+              <a:r>
+                <a:rPr lang="en-GB" sz="1100" dirty="0">
+                  <a:latin typeface="Arial" panose="020B0604020202020204" pitchFamily="34" charset="0"/>
+                  <a:cs typeface="Arial" panose="020B0604020202020204" pitchFamily="34" charset="0"/>
+                </a:rPr>
+                <a:t>Male: 52.4%   White: 76.7%</a:t>
+              </a:r>
+            </a:p>
+          </p:txBody>
+        </p:sp>
+      </p:grpSp>
     </p:spTree>
     <p:extLst>
       <p:ext uri="{BB962C8B-B14F-4D97-AF65-F5344CB8AC3E}">
@@ -14852,21 +14873,6 @@
 </file>
 
 <file path=customXml/item1.xml><?xml version="1.0" encoding="utf-8"?>
-<?mso-contentType ?>
-<FormTemplates xmlns="http://schemas.microsoft.com/sharepoint/v3/contenttype/forms">
-  <Display>DocumentLibraryForm</Display>
-  <Edit>DocumentLibraryForm</Edit>
-  <New>DocumentLibraryForm</New>
-</FormTemplates>
-</file>
-
-<file path=customXml/item2.xml><?xml version="1.0" encoding="utf-8"?>
-<p:properties xmlns:p="http://schemas.microsoft.com/office/2006/metadata/properties" xmlns:xsi="http://www.w3.org/2001/XMLSchema-instance" xmlns:pc="http://schemas.microsoft.com/office/infopath/2007/PartnerControls">
-  <documentManagement/>
-</p:properties>
-</file>
-
-<file path=customXml/item3.xml><?xml version="1.0" encoding="utf-8"?>
 <ct:contentTypeSchema xmlns:ct="http://schemas.microsoft.com/office/2006/metadata/contentType" xmlns:ma="http://schemas.microsoft.com/office/2006/metadata/properties/metaAttributes" ct:_="" ma:_="" ma:contentTypeName="Dokument" ma:contentTypeID="0x01010007E9DA9E47B96D4A9FF5869A522D2EBE" ma:contentTypeVersion="14" ma:contentTypeDescription="Ein neues Dokument erstellen." ma:contentTypeScope="" ma:versionID="c6b567c2eb3fec7b6e0779b66ade1c1d">
   <xsd:schema xmlns:xsd="http://www.w3.org/2001/XMLSchema" xmlns:xs="http://www.w3.org/2001/XMLSchema" xmlns:p="http://schemas.microsoft.com/office/2006/metadata/properties" xmlns:ns3="0c7ed570-c004-4df7-b924-f6f15cff9822" xmlns:ns4="fd3c8342-50e0-4f70-a5fe-1cf354f99926" targetNamespace="http://schemas.microsoft.com/office/2006/metadata/properties" ma:root="true" ma:fieldsID="cf608d3f30b78ea6f7b5008d854f34c9" ns3:_="" ns4:_="">
     <xsd:import namespace="0c7ed570-c004-4df7-b924-f6f15cff9822"/>
@@ -15095,10 +15101,36 @@
 </ct:contentTypeSchema>
 </file>
 
+<file path=customXml/item2.xml><?xml version="1.0" encoding="utf-8"?>
+<p:properties xmlns:p="http://schemas.microsoft.com/office/2006/metadata/properties" xmlns:xsi="http://www.w3.org/2001/XMLSchema-instance" xmlns:pc="http://schemas.microsoft.com/office/infopath/2007/PartnerControls">
+  <documentManagement/>
+</p:properties>
+</file>
+
+<file path=customXml/item3.xml><?xml version="1.0" encoding="utf-8"?>
+<?mso-contentType ?>
+<FormTemplates xmlns="http://schemas.microsoft.com/sharepoint/v3/contenttype/forms">
+  <Display>DocumentLibraryForm</Display>
+  <Edit>DocumentLibraryForm</Edit>
+  <New>DocumentLibraryForm</New>
+</FormTemplates>
+</file>
+
 <file path=customXml/itemProps1.xml><?xml version="1.0" encoding="utf-8"?>
-<ds:datastoreItem xmlns:ds="http://schemas.openxmlformats.org/officeDocument/2006/customXml" ds:itemID="{9FA18103-7F7B-4DF6-B5E4-0AF29ECCC122}">
+<ds:datastoreItem xmlns:ds="http://schemas.openxmlformats.org/officeDocument/2006/customXml" ds:itemID="{82D84E0E-EA78-4BD7-BB0A-CB2F5B4B4D89}">
   <ds:schemaRefs>
-    <ds:schemaRef ds:uri="http://schemas.microsoft.com/sharepoint/v3/contenttype/forms"/>
+    <ds:schemaRef ds:uri="http://schemas.microsoft.com/office/2006/metadata/contentType"/>
+    <ds:schemaRef ds:uri="http://schemas.microsoft.com/office/2006/metadata/properties/metaAttributes"/>
+    <ds:schemaRef ds:uri="http://www.w3.org/2001/XMLSchema"/>
+    <ds:schemaRef ds:uri="http://schemas.microsoft.com/office/2006/metadata/properties"/>
+    <ds:schemaRef ds:uri="0c7ed570-c004-4df7-b924-f6f15cff9822"/>
+    <ds:schemaRef ds:uri="fd3c8342-50e0-4f70-a5fe-1cf354f99926"/>
+    <ds:schemaRef ds:uri="http://schemas.microsoft.com/office/2006/documentManagement/types"/>
+    <ds:schemaRef ds:uri="http://schemas.microsoft.com/office/infopath/2007/PartnerControls"/>
+    <ds:schemaRef ds:uri="http://schemas.openxmlformats.org/package/2006/metadata/core-properties"/>
+    <ds:schemaRef ds:uri="http://purl.org/dc/elements/1.1/"/>
+    <ds:schemaRef ds:uri="http://purl.org/dc/terms/"/>
+    <ds:schemaRef ds:uri="http://schemas.microsoft.com/internal/obd"/>
   </ds:schemaRefs>
 </ds:datastoreItem>
 </file>
@@ -15121,20 +15153,9 @@
 </file>
 
 <file path=customXml/itemProps3.xml><?xml version="1.0" encoding="utf-8"?>
-<ds:datastoreItem xmlns:ds="http://schemas.openxmlformats.org/officeDocument/2006/customXml" ds:itemID="{82D84E0E-EA78-4BD7-BB0A-CB2F5B4B4D89}">
+<ds:datastoreItem xmlns:ds="http://schemas.openxmlformats.org/officeDocument/2006/customXml" ds:itemID="{9FA18103-7F7B-4DF6-B5E4-0AF29ECCC122}">
   <ds:schemaRefs>
-    <ds:schemaRef ds:uri="http://schemas.microsoft.com/office/2006/metadata/contentType"/>
-    <ds:schemaRef ds:uri="http://schemas.microsoft.com/office/2006/metadata/properties/metaAttributes"/>
-    <ds:schemaRef ds:uri="http://www.w3.org/2001/XMLSchema"/>
-    <ds:schemaRef ds:uri="http://schemas.microsoft.com/office/2006/metadata/properties"/>
-    <ds:schemaRef ds:uri="0c7ed570-c004-4df7-b924-f6f15cff9822"/>
-    <ds:schemaRef ds:uri="fd3c8342-50e0-4f70-a5fe-1cf354f99926"/>
-    <ds:schemaRef ds:uri="http://schemas.microsoft.com/office/2006/documentManagement/types"/>
-    <ds:schemaRef ds:uri="http://schemas.microsoft.com/office/infopath/2007/PartnerControls"/>
-    <ds:schemaRef ds:uri="http://schemas.openxmlformats.org/package/2006/metadata/core-properties"/>
-    <ds:schemaRef ds:uri="http://purl.org/dc/elements/1.1/"/>
-    <ds:schemaRef ds:uri="http://purl.org/dc/terms/"/>
-    <ds:schemaRef ds:uri="http://schemas.microsoft.com/internal/obd"/>
+    <ds:schemaRef ds:uri="http://schemas.microsoft.com/sharepoint/v3/contenttype/forms"/>
   </ds:schemaRefs>
 </ds:datastoreItem>
 </file>
</xml_diff>

<commit_message>
Update binary files and delete xgb_cv_all_coh.csv
</commit_message>
<xml_diff>
--- a/results/fig1/flow_chart.pptx
+++ b/results/fig1/flow_chart.pptx
@@ -119,6 +119,67 @@
 </p:presentation>
 </file>
 
+<file path=ppt/revisionInfo.xml><?xml version="1.0" encoding="utf-8"?>
+<p1510:revInfo xmlns:a="http://schemas.openxmlformats.org/drawingml/2006/main" xmlns:r="http://schemas.openxmlformats.org/officeDocument/2006/relationships" xmlns:p1510="http://schemas.microsoft.com/office/powerpoint/2015/10/main">
+  <p1510:revLst>
+    <p1510:client id="{D809BAAF-E6DE-49B0-8AEB-B9BE0DAD4E84}" v="1" dt="2023-12-01T16:38:01.395"/>
+  </p1510:revLst>
+</p1510:revInfo>
+</file>
+
+<file path=ppt/changesInfos/changesInfo1.xml><?xml version="1.0" encoding="utf-8"?>
+<pc:chgInfo xmlns:a="http://schemas.openxmlformats.org/drawingml/2006/main" xmlns:r="http://schemas.openxmlformats.org/officeDocument/2006/relationships" xmlns:ac="http://schemas.microsoft.com/office/drawing/2013/main/command" xmlns:pc="http://schemas.microsoft.com/office/powerpoint/2013/main/command">
+  <pc:docChgLst>
+    <pc:chgData name="Chris Sauer" userId="e009d5d5f78a01ea" providerId="LiveId" clId="{D809BAAF-E6DE-49B0-8AEB-B9BE0DAD4E84}"/>
+    <pc:docChg chg="modSld">
+      <pc:chgData name="Chris Sauer" userId="e009d5d5f78a01ea" providerId="LiveId" clId="{D809BAAF-E6DE-49B0-8AEB-B9BE0DAD4E84}" dt="2023-12-01T16:38:01.395" v="0"/>
+      <pc:docMkLst>
+        <pc:docMk/>
+      </pc:docMkLst>
+      <pc:sldChg chg="addSp modSp">
+        <pc:chgData name="Chris Sauer" userId="e009d5d5f78a01ea" providerId="LiveId" clId="{D809BAAF-E6DE-49B0-8AEB-B9BE0DAD4E84}" dt="2023-12-01T16:38:01.395" v="0"/>
+        <pc:sldMkLst>
+          <pc:docMk/>
+          <pc:sldMk cId="1186949164" sldId="2154"/>
+        </pc:sldMkLst>
+        <pc:spChg chg="add mod">
+          <ac:chgData name="Chris Sauer" userId="e009d5d5f78a01ea" providerId="LiveId" clId="{D809BAAF-E6DE-49B0-8AEB-B9BE0DAD4E84}" dt="2023-12-01T16:38:01.395" v="0"/>
+          <ac:spMkLst>
+            <pc:docMk/>
+            <pc:sldMk cId="1186949164" sldId="2154"/>
+            <ac:spMk id="2" creationId="{FDE847E0-6C18-0397-87F8-CD0DD76C022F}"/>
+          </ac:spMkLst>
+        </pc:spChg>
+        <pc:spChg chg="add mod">
+          <ac:chgData name="Chris Sauer" userId="e009d5d5f78a01ea" providerId="LiveId" clId="{D809BAAF-E6DE-49B0-8AEB-B9BE0DAD4E84}" dt="2023-12-01T16:38:01.395" v="0"/>
+          <ac:spMkLst>
+            <pc:docMk/>
+            <pc:sldMk cId="1186949164" sldId="2154"/>
+            <ac:spMk id="5" creationId="{E23F0A4B-C432-0571-F849-0AD1006B74C3}"/>
+          </ac:spMkLst>
+        </pc:spChg>
+        <pc:spChg chg="add mod">
+          <ac:chgData name="Chris Sauer" userId="e009d5d5f78a01ea" providerId="LiveId" clId="{D809BAAF-E6DE-49B0-8AEB-B9BE0DAD4E84}" dt="2023-12-01T16:38:01.395" v="0"/>
+          <ac:spMkLst>
+            <pc:docMk/>
+            <pc:sldMk cId="1186949164" sldId="2154"/>
+            <ac:spMk id="7" creationId="{867210B0-3DD0-E606-2113-4B60B44C8961}"/>
+          </ac:spMkLst>
+        </pc:spChg>
+        <pc:spChg chg="add mod">
+          <ac:chgData name="Chris Sauer" userId="e009d5d5f78a01ea" providerId="LiveId" clId="{D809BAAF-E6DE-49B0-8AEB-B9BE0DAD4E84}" dt="2023-12-01T16:38:01.395" v="0"/>
+          <ac:spMkLst>
+            <pc:docMk/>
+            <pc:sldMk cId="1186949164" sldId="2154"/>
+            <ac:spMk id="10" creationId="{05C1D99C-7F60-8860-9372-2C134D1A9509}"/>
+          </ac:spMkLst>
+        </pc:spChg>
+      </pc:sldChg>
+    </pc:docChg>
+  </pc:docChgLst>
+</pc:chgInfo>
+</file>
+
 <file path=ppt/notesMasters/notesMaster1.xml><?xml version="1.0" encoding="utf-8"?>
 <p:notesMaster xmlns:a="http://schemas.openxmlformats.org/drawingml/2006/main" xmlns:r="http://schemas.openxmlformats.org/officeDocument/2006/relationships" xmlns:p="http://schemas.openxmlformats.org/presentationml/2006/main">
   <p:cSld>
@@ -201,7 +262,7 @@
           <a:p>
             <a:fld id="{3EEE108C-EB67-DA4C-A2B8-5DDAA9AACF1E}" type="datetimeFigureOut">
               <a:rPr lang="de-CH" smtClean="0"/>
-              <a:t>06.06.23</a:t>
+              <a:t>01.12.2023</a:t>
             </a:fld>
             <a:endParaRPr lang="de-CH"/>
           </a:p>
@@ -2316,7 +2377,7 @@
             <a:fld id="{4B6055F8-1D02-4417-9241-55C834FD9970}" type="datetimeFigureOut">
               <a:rPr lang="it-IT" smtClean="0"/>
               <a:pPr/>
-              <a:t>06/06/23</a:t>
+              <a:t>01/12/2023</a:t>
             </a:fld>
             <a:endParaRPr lang="it-IT"/>
           </a:p>
@@ -5391,8 +5452,8 @@
         </p:nvSpPr>
         <p:spPr>
           <a:xfrm>
-            <a:off x="6846931" y="390748"/>
-            <a:ext cx="1723297" cy="492067"/>
+            <a:off x="6846931" y="546988"/>
+            <a:ext cx="1723297" cy="335827"/>
           </a:xfrm>
           <a:prstGeom prst="rect">
             <a:avLst/>
@@ -5417,19 +5478,6 @@
                 <a:cs typeface="Arial" panose="020B0604020202020204" pitchFamily="34" charset="0"/>
               </a:rPr>
               <a:t>73,181 ICU stays</a:t>
-            </a:r>
-            <a:br>
-              <a:rPr lang="en-US" sz="1200" dirty="0">
-                <a:latin typeface="Arial" panose="020B0604020202020204" pitchFamily="34" charset="0"/>
-                <a:cs typeface="Arial" panose="020B0604020202020204" pitchFamily="34" charset="0"/>
-              </a:rPr>
-            </a:br>
-            <a:r>
-              <a:rPr lang="en-US" sz="1200" dirty="0">
-                <a:latin typeface="Arial" panose="020B0604020202020204" pitchFamily="34" charset="0"/>
-                <a:cs typeface="Arial" panose="020B0604020202020204" pitchFamily="34" charset="0"/>
-              </a:rPr>
-              <a:t>in MIMIC-IV</a:t>
             </a:r>
           </a:p>
         </p:txBody>
@@ -5648,13 +5696,6 @@
               <a:rPr lang="en-US" dirty="0"/>
               <a:t>23,619 septic, adult ICU patients</a:t>
             </a:r>
-            <a:br>
-              <a:rPr lang="en-US" dirty="0"/>
-            </a:br>
-            <a:r>
-              <a:rPr lang="en-US" dirty="0"/>
-              <a:t>in MIMIC-IV</a:t>
-            </a:r>
           </a:p>
         </p:txBody>
       </p:sp>
@@ -5971,7 +6012,7 @@
                 <a:latin typeface="Arial" panose="020B0604020202020204" pitchFamily="34" charset="0"/>
                 <a:cs typeface="Arial" panose="020B0604020202020204" pitchFamily="34" charset="0"/>
               </a:rPr>
-              <a:t>29,834 ICU septic stays in MIMIC-IV</a:t>
+              <a:t>29,834 ICU septic stays</a:t>
             </a:r>
           </a:p>
         </p:txBody>
@@ -6130,13 +6171,6 @@
               <a:rPr lang="en-US" dirty="0"/>
               <a:t>4,888 ICU septic stays with cancer diagnosis</a:t>
             </a:r>
-            <a:br>
-              <a:rPr lang="en-US" dirty="0"/>
-            </a:br>
-            <a:r>
-              <a:rPr lang="en-US" dirty="0"/>
-              <a:t>in MIMIC-IV</a:t>
-            </a:r>
           </a:p>
         </p:txBody>
       </p:sp>
@@ -6186,13 +6220,6 @@
             <a:r>
               <a:rPr lang="en-US" dirty="0"/>
               <a:t>4,065 septic, adult, cancer ICU patients</a:t>
-            </a:r>
-            <a:br>
-              <a:rPr lang="en-US" dirty="0"/>
-            </a:br>
-            <a:r>
-              <a:rPr lang="en-US" dirty="0"/>
-              <a:t>in MIMIC-IV</a:t>
             </a:r>
           </a:p>
         </p:txBody>
@@ -6451,109 +6478,6 @@
       </p:sp>
       <p:sp>
         <p:nvSpPr>
-          <p:cNvPr id="61" name="TextBox 60">
-            <a:extLst>
-              <a:ext uri="{FF2B5EF4-FFF2-40B4-BE49-F238E27FC236}">
-                <a16:creationId xmlns:a16="http://schemas.microsoft.com/office/drawing/2014/main" id="{02DD7EC9-E13C-8C89-A400-B123BA772A64}"/>
-              </a:ext>
-            </a:extLst>
-          </p:cNvPr>
-          <p:cNvSpPr txBox="1"/>
-          <p:nvPr/>
-        </p:nvSpPr>
-        <p:spPr>
-          <a:xfrm>
-            <a:off x="6378997" y="3733326"/>
-            <a:ext cx="2736000" cy="261610"/>
-          </a:xfrm>
-          <a:prstGeom prst="rect">
-            <a:avLst/>
-          </a:prstGeom>
-          <a:noFill/>
-        </p:spPr>
-        <p:txBody>
-          <a:bodyPr wrap="square" rtlCol="0">
-            <a:spAutoFit/>
-          </a:bodyPr>
-          <a:lstStyle/>
-          <a:p>
-            <a:pPr algn="ctr"/>
-            <a:r>
-              <a:rPr lang="en-GB" sz="1100" dirty="0">
-                <a:latin typeface="Arial" panose="020B0604020202020204" pitchFamily="34" charset="0"/>
-                <a:cs typeface="Arial" panose="020B0604020202020204" pitchFamily="34" charset="0"/>
-              </a:rPr>
-              <a:t>Male: 58%   White: 68%</a:t>
-            </a:r>
-          </a:p>
-        </p:txBody>
-      </p:sp>
-      <p:sp>
-        <p:nvSpPr>
-          <p:cNvPr id="62" name="TextBox 61">
-            <a:extLst>
-              <a:ext uri="{FF2B5EF4-FFF2-40B4-BE49-F238E27FC236}">
-                <a16:creationId xmlns:a16="http://schemas.microsoft.com/office/drawing/2014/main" id="{4319D216-9028-E923-7F81-8EF6E9BB73C8}"/>
-              </a:ext>
-            </a:extLst>
-          </p:cNvPr>
-          <p:cNvSpPr txBox="1"/>
-          <p:nvPr/>
-        </p:nvSpPr>
-        <p:spPr>
-          <a:xfrm>
-            <a:off x="6378997" y="6624527"/>
-            <a:ext cx="2736000" cy="261610"/>
-          </a:xfrm>
-          <a:prstGeom prst="rect">
-            <a:avLst/>
-          </a:prstGeom>
-          <a:noFill/>
-        </p:spPr>
-        <p:txBody>
-          <a:bodyPr wrap="square" rtlCol="0">
-            <a:spAutoFit/>
-          </a:bodyPr>
-          <a:lstStyle/>
-          <a:p>
-            <a:pPr algn="ctr"/>
-            <a:r>
-              <a:rPr lang="en-GB" sz="1100" dirty="0">
-                <a:latin typeface="Arial" panose="020B0604020202020204" pitchFamily="34" charset="0"/>
-                <a:cs typeface="Arial" panose="020B0604020202020204" pitchFamily="34" charset="0"/>
-              </a:rPr>
-              <a:t>Male</a:t>
-            </a:r>
-            <a:r>
-              <a:rPr lang="en-GB" sz="1100">
-                <a:latin typeface="Arial" panose="020B0604020202020204" pitchFamily="34" charset="0"/>
-                <a:cs typeface="Arial" panose="020B0604020202020204" pitchFamily="34" charset="0"/>
-              </a:rPr>
-              <a:t>: 62%   </a:t>
-            </a:r>
-            <a:r>
-              <a:rPr lang="en-GB" sz="1100" dirty="0">
-                <a:latin typeface="Arial" panose="020B0604020202020204" pitchFamily="34" charset="0"/>
-                <a:cs typeface="Arial" panose="020B0604020202020204" pitchFamily="34" charset="0"/>
-              </a:rPr>
-              <a:t>White</a:t>
-            </a:r>
-            <a:r>
-              <a:rPr lang="en-GB" sz="1100">
-                <a:latin typeface="Arial" panose="020B0604020202020204" pitchFamily="34" charset="0"/>
-                <a:cs typeface="Arial" panose="020B0604020202020204" pitchFamily="34" charset="0"/>
-              </a:rPr>
-              <a:t>: 72%</a:t>
-            </a:r>
-            <a:endParaRPr lang="en-GB" sz="1100" dirty="0">
-              <a:latin typeface="Arial" panose="020B0604020202020204" pitchFamily="34" charset="0"/>
-              <a:cs typeface="Arial" panose="020B0604020202020204" pitchFamily="34" charset="0"/>
-            </a:endParaRPr>
-          </a:p>
-        </p:txBody>
-      </p:sp>
-      <p:sp>
-        <p:nvSpPr>
           <p:cNvPr id="63" name="Textfeld 7">
             <a:extLst>
               <a:ext uri="{FF2B5EF4-FFF2-40B4-BE49-F238E27FC236}">
@@ -6566,8 +6490,8 @@
         </p:nvSpPr>
         <p:spPr>
           <a:xfrm>
-            <a:off x="1172748" y="390748"/>
-            <a:ext cx="1723297" cy="492067"/>
+            <a:off x="1172748" y="546988"/>
+            <a:ext cx="1723297" cy="335827"/>
           </a:xfrm>
           <a:prstGeom prst="rect">
             <a:avLst/>
@@ -6592,19 +6516,6 @@
                 <a:cs typeface="Arial" panose="020B0604020202020204" pitchFamily="34" charset="0"/>
               </a:rPr>
               <a:t>200,859 ICU stays</a:t>
-            </a:r>
-            <a:br>
-              <a:rPr lang="en-US" sz="1200" dirty="0">
-                <a:latin typeface="Arial" panose="020B0604020202020204" pitchFamily="34" charset="0"/>
-                <a:cs typeface="Arial" panose="020B0604020202020204" pitchFamily="34" charset="0"/>
-              </a:rPr>
-            </a:br>
-            <a:r>
-              <a:rPr lang="en-US" sz="1200" dirty="0">
-                <a:latin typeface="Arial" panose="020B0604020202020204" pitchFamily="34" charset="0"/>
-                <a:cs typeface="Arial" panose="020B0604020202020204" pitchFamily="34" charset="0"/>
-              </a:rPr>
-              <a:t>in eICU-CRD</a:t>
             </a:r>
           </a:p>
         </p:txBody>
@@ -6823,13 +6734,6 @@
               <a:rPr lang="en-US" dirty="0"/>
               <a:t>35,369 septic, adult ICU patients</a:t>
             </a:r>
-            <a:br>
-              <a:rPr lang="en-US" dirty="0"/>
-            </a:br>
-            <a:r>
-              <a:rPr lang="en-US" dirty="0"/>
-              <a:t>in eICU-CRD</a:t>
-            </a:r>
           </a:p>
         </p:txBody>
       </p:sp>
@@ -7146,7 +7050,7 @@
                 <a:latin typeface="Arial" panose="020B0604020202020204" pitchFamily="34" charset="0"/>
                 <a:cs typeface="Arial" panose="020B0604020202020204" pitchFamily="34" charset="0"/>
               </a:rPr>
-              <a:t>46,293 ICU septic stays in eICU-CRD</a:t>
+              <a:t>46,293 ICU septic stays</a:t>
             </a:r>
           </a:p>
         </p:txBody>
@@ -7306,13 +7210,6 @@
               <a:rPr lang="en-US" dirty="0"/>
               <a:t>2,270 ICU septic stays with cancer diagnosis</a:t>
             </a:r>
-            <a:br>
-              <a:rPr lang="en-US" dirty="0"/>
-            </a:br>
-            <a:r>
-              <a:rPr lang="en-US" dirty="0"/>
-              <a:t>in eICU-CRD</a:t>
-            </a:r>
           </a:p>
         </p:txBody>
       </p:sp>
@@ -7362,13 +7259,6 @@
             <a:r>
               <a:rPr lang="en-US" dirty="0"/>
               <a:t>2,270 septic, adult, cancer ICU patients</a:t>
-            </a:r>
-            <a:br>
-              <a:rPr lang="en-US" dirty="0"/>
-            </a:br>
-            <a:r>
-              <a:rPr lang="en-US" dirty="0"/>
-              <a:t>in eICU-CRD</a:t>
             </a:r>
           </a:p>
         </p:txBody>
@@ -7630,10 +7520,198 @@
       </p:sp>
       <p:sp>
         <p:nvSpPr>
-          <p:cNvPr id="85" name="TextBox 84">
+          <p:cNvPr id="6" name="TextBox 5">
             <a:extLst>
               <a:ext uri="{FF2B5EF4-FFF2-40B4-BE49-F238E27FC236}">
-                <a16:creationId xmlns:a16="http://schemas.microsoft.com/office/drawing/2014/main" id="{80F2F787-FF5F-CA9B-5E2A-8F1D57828C6C}"/>
+                <a16:creationId xmlns:a16="http://schemas.microsoft.com/office/drawing/2014/main" id="{389EAC7C-B437-33DF-26C5-8FDBF74E6BBF}"/>
+              </a:ext>
+            </a:extLst>
+          </p:cNvPr>
+          <p:cNvSpPr txBox="1"/>
+          <p:nvPr/>
+        </p:nvSpPr>
+        <p:spPr>
+          <a:xfrm>
+            <a:off x="704814" y="122728"/>
+            <a:ext cx="1162498" cy="338554"/>
+          </a:xfrm>
+          <a:prstGeom prst="rect">
+            <a:avLst/>
+          </a:prstGeom>
+          <a:noFill/>
+        </p:spPr>
+        <p:txBody>
+          <a:bodyPr wrap="none" rtlCol="0">
+            <a:spAutoFit/>
+          </a:bodyPr>
+          <a:lstStyle/>
+          <a:p>
+            <a:r>
+              <a:rPr lang="en-US" sz="1600" b="1" dirty="0" err="1">
+                <a:latin typeface="Arial" panose="020B0604020202020204" pitchFamily="34" charset="0"/>
+                <a:cs typeface="Arial" panose="020B0604020202020204" pitchFamily="34" charset="0"/>
+              </a:rPr>
+              <a:t>eICU</a:t>
+            </a:r>
+            <a:r>
+              <a:rPr lang="en-US" sz="1600" b="1" dirty="0">
+                <a:latin typeface="Arial" panose="020B0604020202020204" pitchFamily="34" charset="0"/>
+                <a:cs typeface="Arial" panose="020B0604020202020204" pitchFamily="34" charset="0"/>
+              </a:rPr>
+              <a:t>-CRD</a:t>
+            </a:r>
+            <a:endParaRPr lang="en-US" b="1" dirty="0"/>
+          </a:p>
+        </p:txBody>
+      </p:sp>
+      <p:sp>
+        <p:nvSpPr>
+          <p:cNvPr id="9" name="TextBox 8">
+            <a:extLst>
+              <a:ext uri="{FF2B5EF4-FFF2-40B4-BE49-F238E27FC236}">
+                <a16:creationId xmlns:a16="http://schemas.microsoft.com/office/drawing/2014/main" id="{38BFD8E2-AB7B-6C27-70E6-AEA0075FAA13}"/>
+              </a:ext>
+            </a:extLst>
+          </p:cNvPr>
+          <p:cNvSpPr txBox="1"/>
+          <p:nvPr/>
+        </p:nvSpPr>
+        <p:spPr>
+          <a:xfrm>
+            <a:off x="6514600" y="122728"/>
+            <a:ext cx="1053494" cy="338554"/>
+          </a:xfrm>
+          <a:prstGeom prst="rect">
+            <a:avLst/>
+          </a:prstGeom>
+          <a:noFill/>
+        </p:spPr>
+        <p:txBody>
+          <a:bodyPr wrap="none" rtlCol="0">
+            <a:spAutoFit/>
+          </a:bodyPr>
+          <a:lstStyle/>
+          <a:p>
+            <a:r>
+              <a:rPr lang="en-US" sz="1600" b="1" dirty="0">
+                <a:latin typeface="Arial" panose="020B0604020202020204" pitchFamily="34" charset="0"/>
+                <a:cs typeface="Arial" panose="020B0604020202020204" pitchFamily="34" charset="0"/>
+              </a:rPr>
+              <a:t>MIMIC-IV</a:t>
+            </a:r>
+            <a:endParaRPr lang="en-US" b="1" dirty="0"/>
+          </a:p>
+        </p:txBody>
+      </p:sp>
+      <p:sp>
+        <p:nvSpPr>
+          <p:cNvPr id="2" name="TextBox 1">
+            <a:extLst>
+              <a:ext uri="{FF2B5EF4-FFF2-40B4-BE49-F238E27FC236}">
+                <a16:creationId xmlns:a16="http://schemas.microsoft.com/office/drawing/2014/main" id="{FDE847E0-6C18-0397-87F8-CD0DD76C022F}"/>
+              </a:ext>
+            </a:extLst>
+          </p:cNvPr>
+          <p:cNvSpPr txBox="1"/>
+          <p:nvPr/>
+        </p:nvSpPr>
+        <p:spPr>
+          <a:xfrm>
+            <a:off x="6378997" y="3733326"/>
+            <a:ext cx="2736000" cy="261610"/>
+          </a:xfrm>
+          <a:prstGeom prst="rect">
+            <a:avLst/>
+          </a:prstGeom>
+          <a:noFill/>
+        </p:spPr>
+        <p:txBody>
+          <a:bodyPr wrap="square" rtlCol="0">
+            <a:spAutoFit/>
+          </a:bodyPr>
+          <a:lstStyle/>
+          <a:p>
+            <a:pPr algn="ctr"/>
+            <a:r>
+              <a:rPr lang="en-GB" sz="1100" dirty="0">
+                <a:latin typeface="Arial" panose="020B0604020202020204" pitchFamily="34" charset="0"/>
+                <a:cs typeface="Arial" panose="020B0604020202020204" pitchFamily="34" charset="0"/>
+              </a:rPr>
+              <a:t>Male: 58%   White: 68%</a:t>
+            </a:r>
+          </a:p>
+        </p:txBody>
+      </p:sp>
+      <p:sp>
+        <p:nvSpPr>
+          <p:cNvPr id="5" name="TextBox 4">
+            <a:extLst>
+              <a:ext uri="{FF2B5EF4-FFF2-40B4-BE49-F238E27FC236}">
+                <a16:creationId xmlns:a16="http://schemas.microsoft.com/office/drawing/2014/main" id="{E23F0A4B-C432-0571-F849-0AD1006B74C3}"/>
+              </a:ext>
+            </a:extLst>
+          </p:cNvPr>
+          <p:cNvSpPr txBox="1"/>
+          <p:nvPr/>
+        </p:nvSpPr>
+        <p:spPr>
+          <a:xfrm>
+            <a:off x="6378997" y="6624527"/>
+            <a:ext cx="2736000" cy="261610"/>
+          </a:xfrm>
+          <a:prstGeom prst="rect">
+            <a:avLst/>
+          </a:prstGeom>
+          <a:noFill/>
+        </p:spPr>
+        <p:txBody>
+          <a:bodyPr wrap="square" rtlCol="0">
+            <a:spAutoFit/>
+          </a:bodyPr>
+          <a:lstStyle/>
+          <a:p>
+            <a:pPr algn="ctr"/>
+            <a:r>
+              <a:rPr lang="en-GB" sz="1100" dirty="0">
+                <a:latin typeface="Arial" panose="020B0604020202020204" pitchFamily="34" charset="0"/>
+                <a:cs typeface="Arial" panose="020B0604020202020204" pitchFamily="34" charset="0"/>
+              </a:rPr>
+              <a:t>Male</a:t>
+            </a:r>
+            <a:r>
+              <a:rPr lang="en-GB" sz="1100">
+                <a:latin typeface="Arial" panose="020B0604020202020204" pitchFamily="34" charset="0"/>
+                <a:cs typeface="Arial" panose="020B0604020202020204" pitchFamily="34" charset="0"/>
+              </a:rPr>
+              <a:t>: 62%   </a:t>
+            </a:r>
+            <a:r>
+              <a:rPr lang="en-GB" sz="1100" dirty="0">
+                <a:latin typeface="Arial" panose="020B0604020202020204" pitchFamily="34" charset="0"/>
+                <a:cs typeface="Arial" panose="020B0604020202020204" pitchFamily="34" charset="0"/>
+              </a:rPr>
+              <a:t>White</a:t>
+            </a:r>
+            <a:r>
+              <a:rPr lang="en-GB" sz="1100">
+                <a:latin typeface="Arial" panose="020B0604020202020204" pitchFamily="34" charset="0"/>
+                <a:cs typeface="Arial" panose="020B0604020202020204" pitchFamily="34" charset="0"/>
+              </a:rPr>
+              <a:t>: 72%</a:t>
+            </a:r>
+            <a:endParaRPr lang="en-GB" sz="1100" dirty="0">
+              <a:latin typeface="Arial" panose="020B0604020202020204" pitchFamily="34" charset="0"/>
+              <a:cs typeface="Arial" panose="020B0604020202020204" pitchFamily="34" charset="0"/>
+            </a:endParaRPr>
+          </a:p>
+        </p:txBody>
+      </p:sp>
+      <p:sp>
+        <p:nvSpPr>
+          <p:cNvPr id="7" name="TextBox 6">
+            <a:extLst>
+              <a:ext uri="{FF2B5EF4-FFF2-40B4-BE49-F238E27FC236}">
+                <a16:creationId xmlns:a16="http://schemas.microsoft.com/office/drawing/2014/main" id="{867210B0-3DD0-E606-2113-4B60B44C8961}"/>
               </a:ext>
             </a:extLst>
           </p:cNvPr>
@@ -7669,10 +7747,10 @@
       </p:sp>
       <p:sp>
         <p:nvSpPr>
-          <p:cNvPr id="86" name="TextBox 85">
+          <p:cNvPr id="10" name="TextBox 9">
             <a:extLst>
               <a:ext uri="{FF2B5EF4-FFF2-40B4-BE49-F238E27FC236}">
-                <a16:creationId xmlns:a16="http://schemas.microsoft.com/office/drawing/2014/main" id="{0775F2D5-60E4-D696-8803-F2399D3CE78A}"/>
+                <a16:creationId xmlns:a16="http://schemas.microsoft.com/office/drawing/2014/main" id="{05C1D99C-7F60-8860-9372-2C134D1A9509}"/>
               </a:ext>
             </a:extLst>
           </p:cNvPr>
@@ -14937,12 +15015,21 @@
 </file>
 
 <file path=customXml/item1.xml><?xml version="1.0" encoding="utf-8"?>
+<?mso-contentType ?>
+<FormTemplates xmlns="http://schemas.microsoft.com/sharepoint/v3/contenttype/forms">
+  <Display>DocumentLibraryForm</Display>
+  <Edit>DocumentLibraryForm</Edit>
+  <New>DocumentLibraryForm</New>
+</FormTemplates>
+</file>
+
+<file path=customXml/item2.xml><?xml version="1.0" encoding="utf-8"?>
 <p:properties xmlns:p="http://schemas.microsoft.com/office/2006/metadata/properties" xmlns:xsi="http://www.w3.org/2001/XMLSchema-instance" xmlns:pc="http://schemas.microsoft.com/office/infopath/2007/PartnerControls">
   <documentManagement/>
 </p:properties>
 </file>
 
-<file path=customXml/item2.xml><?xml version="1.0" encoding="utf-8"?>
+<file path=customXml/item3.xml><?xml version="1.0" encoding="utf-8"?>
 <ct:contentTypeSchema xmlns:ct="http://schemas.microsoft.com/office/2006/metadata/contentType" xmlns:ma="http://schemas.microsoft.com/office/2006/metadata/properties/metaAttributes" ct:_="" ma:_="" ma:contentTypeName="Dokument" ma:contentTypeID="0x01010007E9DA9E47B96D4A9FF5869A522D2EBE" ma:contentTypeVersion="14" ma:contentTypeDescription="Ein neues Dokument erstellen." ma:contentTypeScope="" ma:versionID="c6b567c2eb3fec7b6e0779b66ade1c1d">
   <xsd:schema xmlns:xsd="http://www.w3.org/2001/XMLSchema" xmlns:xs="http://www.w3.org/2001/XMLSchema" xmlns:p="http://schemas.microsoft.com/office/2006/metadata/properties" xmlns:ns3="0c7ed570-c004-4df7-b924-f6f15cff9822" xmlns:ns4="fd3c8342-50e0-4f70-a5fe-1cf354f99926" targetNamespace="http://schemas.microsoft.com/office/2006/metadata/properties" ma:root="true" ma:fieldsID="cf608d3f30b78ea6f7b5008d854f34c9" ns3:_="" ns4:_="">
     <xsd:import namespace="0c7ed570-c004-4df7-b924-f6f15cff9822"/>
@@ -15171,16 +15258,15 @@
 </ct:contentTypeSchema>
 </file>
 
-<file path=customXml/item3.xml><?xml version="1.0" encoding="utf-8"?>
-<?mso-contentType ?>
-<FormTemplates xmlns="http://schemas.microsoft.com/sharepoint/v3/contenttype/forms">
-  <Display>DocumentLibraryForm</Display>
-  <Edit>DocumentLibraryForm</Edit>
-  <New>DocumentLibraryForm</New>
-</FormTemplates>
+<file path=customXml/itemProps1.xml><?xml version="1.0" encoding="utf-8"?>
+<ds:datastoreItem xmlns:ds="http://schemas.openxmlformats.org/officeDocument/2006/customXml" ds:itemID="{9FA18103-7F7B-4DF6-B5E4-0AF29ECCC122}">
+  <ds:schemaRefs>
+    <ds:schemaRef ds:uri="http://schemas.microsoft.com/sharepoint/v3/contenttype/forms"/>
+  </ds:schemaRefs>
+</ds:datastoreItem>
 </file>
 
-<file path=customXml/itemProps1.xml><?xml version="1.0" encoding="utf-8"?>
+<file path=customXml/itemProps2.xml><?xml version="1.0" encoding="utf-8"?>
 <ds:datastoreItem xmlns:ds="http://schemas.openxmlformats.org/officeDocument/2006/customXml" ds:itemID="{1A94CC53-2CAC-471B-9BA4-2797B3DA82E3}">
   <ds:schemaRefs>
     <ds:schemaRef ds:uri="0c7ed570-c004-4df7-b924-f6f15cff9822"/>
@@ -15197,7 +15283,7 @@
 </ds:datastoreItem>
 </file>
 
-<file path=customXml/itemProps2.xml><?xml version="1.0" encoding="utf-8"?>
+<file path=customXml/itemProps3.xml><?xml version="1.0" encoding="utf-8"?>
 <ds:datastoreItem xmlns:ds="http://schemas.openxmlformats.org/officeDocument/2006/customXml" ds:itemID="{82D84E0E-EA78-4BD7-BB0A-CB2F5B4B4D89}">
   <ds:schemaRefs>
     <ds:schemaRef ds:uri="http://schemas.microsoft.com/office/2006/metadata/contentType"/>
@@ -15214,12 +15300,4 @@
     <ds:schemaRef ds:uri="http://schemas.microsoft.com/internal/obd"/>
   </ds:schemaRefs>
 </ds:datastoreItem>
-</file>
-
-<file path=customXml/itemProps3.xml><?xml version="1.0" encoding="utf-8"?>
-<ds:datastoreItem xmlns:ds="http://schemas.openxmlformats.org/officeDocument/2006/customXml" ds:itemID="{9FA18103-7F7B-4DF6-B5E4-0AF29ECCC122}">
-  <ds:schemaRefs>
-    <ds:schemaRef ds:uri="http://schemas.microsoft.com/sharepoint/v3/contenttype/forms"/>
-  </ds:schemaRefs>
-</ds:datastoreItem>
 </file>
</xml_diff>

<commit_message>
Add new cancer locations to SQL scripts and R code
</commit_message>
<xml_diff>
--- a/results/fig1/flow_chart.pptx
+++ b/results/fig1/flow_chart.pptx
@@ -262,7 +262,7 @@
           <a:p>
             <a:fld id="{3EEE108C-EB67-DA4C-A2B8-5DDAA9AACF1E}" type="datetimeFigureOut">
               <a:rPr lang="de-CH" smtClean="0"/>
-              <a:t>01.12.2023</a:t>
+              <a:t>02.05.24</a:t>
             </a:fld>
             <a:endParaRPr lang="de-CH"/>
           </a:p>
@@ -2377,7 +2377,7 @@
             <a:fld id="{4B6055F8-1D02-4417-9241-55C834FD9970}" type="datetimeFigureOut">
               <a:rPr lang="it-IT" smtClean="0"/>
               <a:pPr/>
-              <a:t>01/12/2023</a:t>
+              <a:t>02/05/24</a:t>
             </a:fld>
             <a:endParaRPr lang="it-IT"/>
           </a:p>
@@ -4898,7 +4898,7 @@
               </a14:hiddenLine>
             </a:ext>
             <a:ext uri="{FAA26D3D-D897-4be2-8F04-BA451C77F1D7}">
-              <ma14:placeholderFlag xmlns:ma14="http://schemas.microsoft.com/office/mac/drawingml/2011/main" xmlns="" val="1"/>
+              <ma14:placeholderFlag xmlns="" xmlns:ma14="http://schemas.microsoft.com/office/mac/drawingml/2011/main" val="1"/>
             </a:ext>
           </a:extLst>
         </p:spPr>
@@ -4954,7 +4954,7 @@
               </a14:hiddenLine>
             </a:ext>
             <a:ext uri="{FAA26D3D-D897-4be2-8F04-BA451C77F1D7}">
-              <ma14:placeholderFlag xmlns:ma14="http://schemas.microsoft.com/office/mac/drawingml/2011/main" xmlns="" val="1"/>
+              <ma14:placeholderFlag xmlns="" xmlns:ma14="http://schemas.microsoft.com/office/mac/drawingml/2011/main" val="1"/>
             </a:ext>
           </a:extLst>
         </p:spPr>
@@ -5699,104 +5699,6 @@
           </a:p>
         </p:txBody>
       </p:sp>
-      <p:sp>
-        <p:nvSpPr>
-          <p:cNvPr id="3" name="Textfeld 10">
-            <a:extLst>
-              <a:ext uri="{FF2B5EF4-FFF2-40B4-BE49-F238E27FC236}">
-                <a16:creationId xmlns:a16="http://schemas.microsoft.com/office/drawing/2014/main" id="{A7BEAE33-66BB-E032-1D40-948B88B3566A}"/>
-              </a:ext>
-            </a:extLst>
-          </p:cNvPr>
-          <p:cNvSpPr txBox="1"/>
-          <p:nvPr/>
-        </p:nvSpPr>
-        <p:spPr>
-          <a:xfrm>
-            <a:off x="8962565" y="5405040"/>
-            <a:ext cx="2736000" cy="461665"/>
-          </a:xfrm>
-          <a:prstGeom prst="rect">
-            <a:avLst/>
-          </a:prstGeom>
-          <a:noFill/>
-          <a:ln>
-            <a:solidFill>
-              <a:schemeClr val="tx1"/>
-            </a:solidFill>
-          </a:ln>
-        </p:spPr>
-        <p:txBody>
-          <a:bodyPr wrap="square" rtlCol="0" anchor="ctr" anchorCtr="0">
-            <a:spAutoFit/>
-          </a:bodyPr>
-          <a:lstStyle/>
-          <a:p>
-            <a:r>
-              <a:rPr lang="en-US" sz="1200" dirty="0">
-                <a:latin typeface="Arial" panose="020B0604020202020204" pitchFamily="34" charset="0"/>
-                <a:cs typeface="Arial" panose="020B0604020202020204" pitchFamily="34" charset="0"/>
-              </a:rPr>
-              <a:t>Admissions excluded:</a:t>
-            </a:r>
-          </a:p>
-          <a:p>
-            <a:pPr marL="171450" indent="-171450">
-              <a:buFont typeface="Arial" panose="020B0604020202020204" pitchFamily="34" charset="0"/>
-              <a:buChar char="•"/>
-            </a:pPr>
-            <a:r>
-              <a:rPr lang="en-US" sz="1200" dirty="0">
-                <a:latin typeface="Arial" panose="020B0604020202020204" pitchFamily="34" charset="0"/>
-                <a:cs typeface="Arial" panose="020B0604020202020204" pitchFamily="34" charset="0"/>
-              </a:rPr>
-              <a:t>Recurrent stays (n=823)</a:t>
-            </a:r>
-          </a:p>
-        </p:txBody>
-      </p:sp>
-      <p:cxnSp>
-        <p:nvCxnSpPr>
-          <p:cNvPr id="4" name="Gerade Verbindung mit Pfeil 12">
-            <a:extLst>
-              <a:ext uri="{FF2B5EF4-FFF2-40B4-BE49-F238E27FC236}">
-                <a16:creationId xmlns:a16="http://schemas.microsoft.com/office/drawing/2014/main" id="{EB79B206-1785-53A2-E92E-D5C4E76899E5}"/>
-              </a:ext>
-            </a:extLst>
-          </p:cNvPr>
-          <p:cNvCxnSpPr>
-            <a:cxnSpLocks/>
-            <a:endCxn id="3" idx="1"/>
-          </p:cNvCxnSpPr>
-          <p:nvPr/>
-        </p:nvCxnSpPr>
-        <p:spPr>
-          <a:xfrm>
-            <a:off x="7729023" y="5635873"/>
-            <a:ext cx="1233542" cy="0"/>
-          </a:xfrm>
-          <a:prstGeom prst="straightConnector1">
-            <a:avLst/>
-          </a:prstGeom>
-          <a:ln>
-            <a:tailEnd type="triangle"/>
-          </a:ln>
-        </p:spPr>
-        <p:style>
-          <a:lnRef idx="1">
-            <a:schemeClr val="dk1"/>
-          </a:lnRef>
-          <a:fillRef idx="0">
-            <a:schemeClr val="dk1"/>
-          </a:fillRef>
-          <a:effectRef idx="0">
-            <a:schemeClr val="dk1"/>
-          </a:effectRef>
-          <a:fontRef idx="minor">
-            <a:schemeClr val="tx1"/>
-          </a:fontRef>
-        </p:style>
-      </p:cxnSp>
       <p:cxnSp>
         <p:nvCxnSpPr>
           <p:cNvPr id="15" name="Gerade Verbindung mit Pfeil 12">
@@ -5901,7 +5803,7 @@
         </p:nvCxnSpPr>
         <p:spPr>
           <a:xfrm>
-            <a:off x="8570770" y="6272026"/>
+            <a:off x="8550327" y="4732962"/>
             <a:ext cx="391795" cy="0"/>
           </a:xfrm>
           <a:prstGeom prst="straightConnector1">
@@ -5940,7 +5842,7 @@
         </p:nvSpPr>
         <p:spPr>
           <a:xfrm>
-            <a:off x="8962563" y="6141495"/>
+            <a:off x="8942120" y="4602431"/>
             <a:ext cx="2736001" cy="276999"/>
           </a:xfrm>
           <a:prstGeom prst="rect">
@@ -6126,10 +6028,10 @@
       </p:cxnSp>
       <p:sp>
         <p:nvSpPr>
-          <p:cNvPr id="36" name="Textfeld 7">
+          <p:cNvPr id="41" name="Textfeld 7">
             <a:extLst>
               <a:ext uri="{FF2B5EF4-FFF2-40B4-BE49-F238E27FC236}">
-                <a16:creationId xmlns:a16="http://schemas.microsoft.com/office/drawing/2014/main" id="{7CD43906-EB9D-A80F-FF6B-D523F95F297F}"/>
+                <a16:creationId xmlns:a16="http://schemas.microsoft.com/office/drawing/2014/main" id="{7A973194-C3C7-4AC9-E195-B05B1C73840B}"/>
               </a:ext>
             </a:extLst>
           </p:cNvPr>
@@ -6138,7 +6040,7 @@
         </p:nvSpPr>
         <p:spPr>
           <a:xfrm>
-            <a:off x="6867374" y="4712502"/>
+            <a:off x="6846931" y="4408075"/>
             <a:ext cx="1723297" cy="649772"/>
           </a:xfrm>
           <a:prstGeom prst="rect">
@@ -6169,99 +6071,11 @@
           <a:p>
             <a:r>
               <a:rPr lang="en-US" dirty="0"/>
-              <a:t>4,888 ICU septic stays with cancer diagnosis</a:t>
+              <a:t>3,875 septic, adult, cancer ICU patients</a:t>
             </a:r>
           </a:p>
         </p:txBody>
       </p:sp>
-      <p:sp>
-        <p:nvSpPr>
-          <p:cNvPr id="41" name="Textfeld 7">
-            <a:extLst>
-              <a:ext uri="{FF2B5EF4-FFF2-40B4-BE49-F238E27FC236}">
-                <a16:creationId xmlns:a16="http://schemas.microsoft.com/office/drawing/2014/main" id="{7A973194-C3C7-4AC9-E195-B05B1C73840B}"/>
-              </a:ext>
-            </a:extLst>
-          </p:cNvPr>
-          <p:cNvSpPr txBox="1"/>
-          <p:nvPr/>
-        </p:nvSpPr>
-        <p:spPr>
-          <a:xfrm>
-            <a:off x="6867374" y="5947139"/>
-            <a:ext cx="1723297" cy="649772"/>
-          </a:xfrm>
-          <a:prstGeom prst="rect">
-            <a:avLst/>
-          </a:prstGeom>
-          <a:noFill/>
-          <a:ln>
-            <a:solidFill>
-              <a:schemeClr val="tx1"/>
-            </a:solidFill>
-          </a:ln>
-        </p:spPr>
-        <p:txBody>
-          <a:bodyPr wrap="square" rtlCol="0" anchor="ctr" anchorCtr="0">
-            <a:noAutofit/>
-          </a:bodyPr>
-          <a:lstStyle>
-            <a:defPPr>
-              <a:defRPr lang="de-DE"/>
-            </a:defPPr>
-            <a:lvl1pPr algn="ctr">
-              <a:defRPr sz="1200">
-                <a:latin typeface="Arial" panose="020B0604020202020204" pitchFamily="34" charset="0"/>
-                <a:cs typeface="Arial" panose="020B0604020202020204" pitchFamily="34" charset="0"/>
-              </a:defRPr>
-            </a:lvl1pPr>
-          </a:lstStyle>
-          <a:p>
-            <a:r>
-              <a:rPr lang="en-US" dirty="0"/>
-              <a:t>4,065 septic, adult, cancer ICU patients</a:t>
-            </a:r>
-          </a:p>
-        </p:txBody>
-      </p:sp>
-      <p:cxnSp>
-        <p:nvCxnSpPr>
-          <p:cNvPr id="43" name="Straight Arrow Connector 42">
-            <a:extLst>
-              <a:ext uri="{FF2B5EF4-FFF2-40B4-BE49-F238E27FC236}">
-                <a16:creationId xmlns:a16="http://schemas.microsoft.com/office/drawing/2014/main" id="{96895EE5-6D8D-4043-9E32-19DE804C9AAE}"/>
-              </a:ext>
-            </a:extLst>
-          </p:cNvPr>
-          <p:cNvCxnSpPr>
-            <a:stCxn id="36" idx="2"/>
-            <a:endCxn id="41" idx="0"/>
-          </p:cNvCxnSpPr>
-          <p:nvPr/>
-        </p:nvCxnSpPr>
-        <p:spPr bwMode="auto">
-          <a:xfrm>
-            <a:off x="7729023" y="5362274"/>
-            <a:ext cx="0" cy="584865"/>
-          </a:xfrm>
-          <a:prstGeom prst="straightConnector1">
-            <a:avLst/>
-          </a:prstGeom>
-          <a:solidFill>
-            <a:schemeClr val="accent1"/>
-          </a:solidFill>
-          <a:ln w="9525" cap="flat" cmpd="sng" algn="ctr">
-            <a:solidFill>
-              <a:schemeClr val="tx1"/>
-            </a:solidFill>
-            <a:prstDash val="solid"/>
-            <a:round/>
-            <a:headEnd type="none" w="med" len="med"/>
-            <a:tailEnd type="triangle"/>
-          </a:ln>
-          <a:effectLst/>
-        </p:spPr>
-      </p:cxnSp>
       <p:sp>
         <p:nvSpPr>
           <p:cNvPr id="45" name="Textfeld 10">
@@ -6276,7 +6090,7 @@
         </p:nvSpPr>
         <p:spPr>
           <a:xfrm>
-            <a:off x="8962565" y="4193387"/>
+            <a:off x="8961481" y="3859412"/>
             <a:ext cx="2736000" cy="461665"/>
           </a:xfrm>
           <a:prstGeom prst="rect">
@@ -6313,52 +6127,11 @@
                 <a:latin typeface="Arial" panose="020B0604020202020204" pitchFamily="34" charset="0"/>
                 <a:cs typeface="Arial" panose="020B0604020202020204" pitchFamily="34" charset="0"/>
               </a:rPr>
-              <a:t>Non-cancer stays (n=24,946)</a:t>
+              <a:t>Non-cancer stays (n=19,744)</a:t>
             </a:r>
           </a:p>
         </p:txBody>
       </p:sp>
-      <p:cxnSp>
-        <p:nvCxnSpPr>
-          <p:cNvPr id="47" name="Connector: Elbow 46">
-            <a:extLst>
-              <a:ext uri="{FF2B5EF4-FFF2-40B4-BE49-F238E27FC236}">
-                <a16:creationId xmlns:a16="http://schemas.microsoft.com/office/drawing/2014/main" id="{65BA1086-5017-BA30-D01E-60DFC78E77CC}"/>
-              </a:ext>
-            </a:extLst>
-          </p:cNvPr>
-          <p:cNvCxnSpPr>
-            <a:stCxn id="16" idx="1"/>
-            <a:endCxn id="36" idx="0"/>
-          </p:cNvCxnSpPr>
-          <p:nvPr/>
-        </p:nvCxnSpPr>
-        <p:spPr bwMode="auto">
-          <a:xfrm rot="10800000" flipH="1" flipV="1">
-            <a:off x="6847473" y="2158728"/>
-            <a:ext cx="881550" cy="2553774"/>
-          </a:xfrm>
-          <a:prstGeom prst="bentConnector4">
-            <a:avLst>
-              <a:gd name="adj1" fmla="val -25932"/>
-              <a:gd name="adj2" fmla="val 79798"/>
-            </a:avLst>
-          </a:prstGeom>
-          <a:solidFill>
-            <a:schemeClr val="accent1"/>
-          </a:solidFill>
-          <a:ln w="9525" cap="flat" cmpd="sng" algn="ctr">
-            <a:solidFill>
-              <a:schemeClr val="tx1"/>
-            </a:solidFill>
-            <a:prstDash val="solid"/>
-            <a:round/>
-            <a:headEnd type="none" w="med" len="med"/>
-            <a:tailEnd type="triangle"/>
-          </a:ln>
-          <a:effectLst/>
-        </p:spPr>
-      </p:cxnSp>
       <p:cxnSp>
         <p:nvCxnSpPr>
           <p:cNvPr id="53" name="Straight Arrow Connector 52">
@@ -6369,13 +6142,14 @@
             </a:extLst>
           </p:cNvPr>
           <p:cNvCxnSpPr>
+            <a:cxnSpLocks/>
             <a:endCxn id="45" idx="1"/>
           </p:cNvCxnSpPr>
           <p:nvPr/>
         </p:nvCxnSpPr>
         <p:spPr bwMode="auto">
           <a:xfrm>
-            <a:off x="7729023" y="4424219"/>
+            <a:off x="7727939" y="4090244"/>
             <a:ext cx="1233542" cy="1"/>
           </a:xfrm>
           <a:prstGeom prst="straightConnector1">
@@ -6737,104 +6511,6 @@
           </a:p>
         </p:txBody>
       </p:sp>
-      <p:sp>
-        <p:nvSpPr>
-          <p:cNvPr id="68" name="Textfeld 10">
-            <a:extLst>
-              <a:ext uri="{FF2B5EF4-FFF2-40B4-BE49-F238E27FC236}">
-                <a16:creationId xmlns:a16="http://schemas.microsoft.com/office/drawing/2014/main" id="{64D67E94-6A06-A8B3-08BE-EE450DF29F42}"/>
-              </a:ext>
-            </a:extLst>
-          </p:cNvPr>
-          <p:cNvSpPr txBox="1"/>
-          <p:nvPr/>
-        </p:nvSpPr>
-        <p:spPr>
-          <a:xfrm>
-            <a:off x="3288382" y="5405040"/>
-            <a:ext cx="2736000" cy="461665"/>
-          </a:xfrm>
-          <a:prstGeom prst="rect">
-            <a:avLst/>
-          </a:prstGeom>
-          <a:noFill/>
-          <a:ln>
-            <a:solidFill>
-              <a:schemeClr val="tx1"/>
-            </a:solidFill>
-          </a:ln>
-        </p:spPr>
-        <p:txBody>
-          <a:bodyPr wrap="square" rtlCol="0" anchor="ctr" anchorCtr="0">
-            <a:spAutoFit/>
-          </a:bodyPr>
-          <a:lstStyle/>
-          <a:p>
-            <a:r>
-              <a:rPr lang="en-US" sz="1200" dirty="0">
-                <a:latin typeface="Arial" panose="020B0604020202020204" pitchFamily="34" charset="0"/>
-                <a:cs typeface="Arial" panose="020B0604020202020204" pitchFamily="34" charset="0"/>
-              </a:rPr>
-              <a:t>Admissions excluded:</a:t>
-            </a:r>
-          </a:p>
-          <a:p>
-            <a:pPr marL="171450" indent="-171450">
-              <a:buFont typeface="Arial" panose="020B0604020202020204" pitchFamily="34" charset="0"/>
-              <a:buChar char="•"/>
-            </a:pPr>
-            <a:r>
-              <a:rPr lang="en-US" sz="1200" dirty="0">
-                <a:latin typeface="Arial" panose="020B0604020202020204" pitchFamily="34" charset="0"/>
-                <a:cs typeface="Arial" panose="020B0604020202020204" pitchFamily="34" charset="0"/>
-              </a:rPr>
-              <a:t>Recurrent stays (n=0)</a:t>
-            </a:r>
-          </a:p>
-        </p:txBody>
-      </p:sp>
-      <p:cxnSp>
-        <p:nvCxnSpPr>
-          <p:cNvPr id="69" name="Gerade Verbindung mit Pfeil 12">
-            <a:extLst>
-              <a:ext uri="{FF2B5EF4-FFF2-40B4-BE49-F238E27FC236}">
-                <a16:creationId xmlns:a16="http://schemas.microsoft.com/office/drawing/2014/main" id="{181F1A30-E55E-0DA1-0C74-1C1D835C92D3}"/>
-              </a:ext>
-            </a:extLst>
-          </p:cNvPr>
-          <p:cNvCxnSpPr>
-            <a:cxnSpLocks/>
-            <a:endCxn id="68" idx="1"/>
-          </p:cNvCxnSpPr>
-          <p:nvPr/>
-        </p:nvCxnSpPr>
-        <p:spPr>
-          <a:xfrm>
-            <a:off x="2054840" y="5635873"/>
-            <a:ext cx="1233542" cy="0"/>
-          </a:xfrm>
-          <a:prstGeom prst="straightConnector1">
-            <a:avLst/>
-          </a:prstGeom>
-          <a:ln>
-            <a:tailEnd type="triangle"/>
-          </a:ln>
-        </p:spPr>
-        <p:style>
-          <a:lnRef idx="1">
-            <a:schemeClr val="dk1"/>
-          </a:lnRef>
-          <a:fillRef idx="0">
-            <a:schemeClr val="dk1"/>
-          </a:fillRef>
-          <a:effectRef idx="0">
-            <a:schemeClr val="dk1"/>
-          </a:effectRef>
-          <a:fontRef idx="minor">
-            <a:schemeClr val="tx1"/>
-          </a:fontRef>
-        </p:style>
-      </p:cxnSp>
       <p:cxnSp>
         <p:nvCxnSpPr>
           <p:cNvPr id="70" name="Gerade Verbindung mit Pfeil 12">
@@ -6934,13 +6610,15 @@
           </p:cNvPr>
           <p:cNvCxnSpPr>
             <a:cxnSpLocks/>
+            <a:stCxn id="78" idx="3"/>
+            <a:endCxn id="73" idx="1"/>
           </p:cNvCxnSpPr>
           <p:nvPr/>
         </p:nvCxnSpPr>
         <p:spPr>
           <a:xfrm>
-            <a:off x="2896587" y="6272026"/>
-            <a:ext cx="391795" cy="0"/>
+            <a:off x="2899105" y="4733627"/>
+            <a:ext cx="389275" cy="7970"/>
           </a:xfrm>
           <a:prstGeom prst="straightConnector1">
             <a:avLst/>
@@ -6978,7 +6656,7 @@
         </p:nvSpPr>
         <p:spPr>
           <a:xfrm>
-            <a:off x="3288380" y="6141495"/>
+            <a:off x="3288380" y="4603097"/>
             <a:ext cx="2736001" cy="276999"/>
           </a:xfrm>
           <a:prstGeom prst="rect">
@@ -7165,10 +6843,10 @@
       </p:cxnSp>
       <p:sp>
         <p:nvSpPr>
-          <p:cNvPr id="77" name="Textfeld 7">
+          <p:cNvPr id="78" name="Textfeld 7">
             <a:extLst>
               <a:ext uri="{FF2B5EF4-FFF2-40B4-BE49-F238E27FC236}">
-                <a16:creationId xmlns:a16="http://schemas.microsoft.com/office/drawing/2014/main" id="{DE1F61B6-90EF-2E3D-4B32-DB88909B1F7E}"/>
+                <a16:creationId xmlns:a16="http://schemas.microsoft.com/office/drawing/2014/main" id="{1A888FFA-FB3D-8F88-6805-5698C957E190}"/>
               </a:ext>
             </a:extLst>
           </p:cNvPr>
@@ -7177,8 +6855,8 @@
         </p:nvSpPr>
         <p:spPr>
           <a:xfrm>
-            <a:off x="1193191" y="4712502"/>
-            <a:ext cx="1723297" cy="649772"/>
+            <a:off x="1146225" y="4408741"/>
+            <a:ext cx="1752880" cy="649772"/>
           </a:xfrm>
           <a:prstGeom prst="rect">
             <a:avLst/>
@@ -7208,100 +6886,11 @@
           <a:p>
             <a:r>
               <a:rPr lang="en-US" dirty="0"/>
-              <a:t>2,270 ICU septic stays with cancer diagnosis</a:t>
+              <a:t>2,270 septic, adult, cancer ICU patients</a:t>
             </a:r>
           </a:p>
         </p:txBody>
       </p:sp>
-      <p:sp>
-        <p:nvSpPr>
-          <p:cNvPr id="78" name="Textfeld 7">
-            <a:extLst>
-              <a:ext uri="{FF2B5EF4-FFF2-40B4-BE49-F238E27FC236}">
-                <a16:creationId xmlns:a16="http://schemas.microsoft.com/office/drawing/2014/main" id="{1A888FFA-FB3D-8F88-6805-5698C957E190}"/>
-              </a:ext>
-            </a:extLst>
-          </p:cNvPr>
-          <p:cNvSpPr txBox="1"/>
-          <p:nvPr/>
-        </p:nvSpPr>
-        <p:spPr>
-          <a:xfrm>
-            <a:off x="1193191" y="5947139"/>
-            <a:ext cx="1723297" cy="649772"/>
-          </a:xfrm>
-          <a:prstGeom prst="rect">
-            <a:avLst/>
-          </a:prstGeom>
-          <a:noFill/>
-          <a:ln>
-            <a:solidFill>
-              <a:schemeClr val="tx1"/>
-            </a:solidFill>
-          </a:ln>
-        </p:spPr>
-        <p:txBody>
-          <a:bodyPr wrap="square" rtlCol="0" anchor="ctr" anchorCtr="0">
-            <a:noAutofit/>
-          </a:bodyPr>
-          <a:lstStyle>
-            <a:defPPr>
-              <a:defRPr lang="de-DE"/>
-            </a:defPPr>
-            <a:lvl1pPr algn="ctr">
-              <a:defRPr sz="1200">
-                <a:latin typeface="Arial" panose="020B0604020202020204" pitchFamily="34" charset="0"/>
-                <a:cs typeface="Arial" panose="020B0604020202020204" pitchFamily="34" charset="0"/>
-              </a:defRPr>
-            </a:lvl1pPr>
-          </a:lstStyle>
-          <a:p>
-            <a:r>
-              <a:rPr lang="en-US" dirty="0"/>
-              <a:t>2,270 septic, adult, cancer ICU patients</a:t>
-            </a:r>
-          </a:p>
-        </p:txBody>
-      </p:sp>
-      <p:cxnSp>
-        <p:nvCxnSpPr>
-          <p:cNvPr id="79" name="Straight Arrow Connector 78">
-            <a:extLst>
-              <a:ext uri="{FF2B5EF4-FFF2-40B4-BE49-F238E27FC236}">
-                <a16:creationId xmlns:a16="http://schemas.microsoft.com/office/drawing/2014/main" id="{192DCE3C-442D-5FDF-54ED-D81379CDEDB3}"/>
-              </a:ext>
-            </a:extLst>
-          </p:cNvPr>
-          <p:cNvCxnSpPr>
-            <a:cxnSpLocks/>
-            <a:stCxn id="77" idx="2"/>
-            <a:endCxn id="78" idx="0"/>
-          </p:cNvCxnSpPr>
-          <p:nvPr/>
-        </p:nvCxnSpPr>
-        <p:spPr bwMode="auto">
-          <a:xfrm>
-            <a:off x="2054840" y="5362274"/>
-            <a:ext cx="0" cy="584865"/>
-          </a:xfrm>
-          <a:prstGeom prst="straightConnector1">
-            <a:avLst/>
-          </a:prstGeom>
-          <a:solidFill>
-            <a:schemeClr val="accent1"/>
-          </a:solidFill>
-          <a:ln w="9525" cap="flat" cmpd="sng" algn="ctr">
-            <a:solidFill>
-              <a:schemeClr val="tx1"/>
-            </a:solidFill>
-            <a:prstDash val="solid"/>
-            <a:round/>
-            <a:headEnd type="none" w="med" len="med"/>
-            <a:tailEnd type="triangle"/>
-          </a:ln>
-          <a:effectLst/>
-        </p:spPr>
-      </p:cxnSp>
       <p:sp>
         <p:nvSpPr>
           <p:cNvPr id="80" name="Textfeld 10">
@@ -7316,7 +6905,7 @@
         </p:nvSpPr>
         <p:spPr>
           <a:xfrm>
-            <a:off x="3288382" y="4193387"/>
+            <a:off x="3288382" y="3881154"/>
             <a:ext cx="2736000" cy="461665"/>
           </a:xfrm>
           <a:prstGeom prst="rect">
@@ -7360,48 +6949,6 @@
       </p:sp>
       <p:cxnSp>
         <p:nvCxnSpPr>
-          <p:cNvPr id="81" name="Connector: Elbow 80">
-            <a:extLst>
-              <a:ext uri="{FF2B5EF4-FFF2-40B4-BE49-F238E27FC236}">
-                <a16:creationId xmlns:a16="http://schemas.microsoft.com/office/drawing/2014/main" id="{1A5A83B1-44D1-8DA0-ECA6-1D8F4F349870}"/>
-              </a:ext>
-            </a:extLst>
-          </p:cNvPr>
-          <p:cNvCxnSpPr>
-            <a:cxnSpLocks/>
-            <a:stCxn id="74" idx="1"/>
-            <a:endCxn id="77" idx="0"/>
-          </p:cNvCxnSpPr>
-          <p:nvPr/>
-        </p:nvCxnSpPr>
-        <p:spPr bwMode="auto">
-          <a:xfrm rot="10800000" flipH="1" flipV="1">
-            <a:off x="1173290" y="2158728"/>
-            <a:ext cx="881550" cy="2553774"/>
-          </a:xfrm>
-          <a:prstGeom prst="bentConnector4">
-            <a:avLst>
-              <a:gd name="adj1" fmla="val -25932"/>
-              <a:gd name="adj2" fmla="val 79798"/>
-            </a:avLst>
-          </a:prstGeom>
-          <a:solidFill>
-            <a:schemeClr val="accent1"/>
-          </a:solidFill>
-          <a:ln w="9525" cap="flat" cmpd="sng" algn="ctr">
-            <a:solidFill>
-              <a:schemeClr val="tx1"/>
-            </a:solidFill>
-            <a:prstDash val="solid"/>
-            <a:round/>
-            <a:headEnd type="none" w="med" len="med"/>
-            <a:tailEnd type="triangle"/>
-          </a:ln>
-          <a:effectLst/>
-        </p:spPr>
-      </p:cxnSp>
-      <p:cxnSp>
-        <p:nvCxnSpPr>
           <p:cNvPr id="82" name="Straight Arrow Connector 81">
             <a:extLst>
               <a:ext uri="{FF2B5EF4-FFF2-40B4-BE49-F238E27FC236}">
@@ -7417,7 +6964,7 @@
         </p:nvCxnSpPr>
         <p:spPr bwMode="auto">
           <a:xfrm>
-            <a:off x="2054840" y="4424219"/>
+            <a:off x="2054840" y="4111986"/>
             <a:ext cx="1233542" cy="1"/>
           </a:xfrm>
           <a:prstGeom prst="straightConnector1">
@@ -7547,18 +7094,11 @@
           <a:lstStyle/>
           <a:p>
             <a:r>
-              <a:rPr lang="en-US" sz="1600" b="1" dirty="0" err="1">
-                <a:latin typeface="Arial" panose="020B0604020202020204" pitchFamily="34" charset="0"/>
-                <a:cs typeface="Arial" panose="020B0604020202020204" pitchFamily="34" charset="0"/>
-              </a:rPr>
-              <a:t>eICU</a:t>
-            </a:r>
-            <a:r>
               <a:rPr lang="en-US" sz="1600" b="1" dirty="0">
                 <a:latin typeface="Arial" panose="020B0604020202020204" pitchFamily="34" charset="0"/>
                 <a:cs typeface="Arial" panose="020B0604020202020204" pitchFamily="34" charset="0"/>
               </a:rPr>
-              <a:t>-CRD</a:t>
+              <a:t>eICU-CRD</a:t>
             </a:r>
             <a:endParaRPr lang="en-US" b="1" dirty="0"/>
           </a:p>
@@ -7656,7 +7196,7 @@
         </p:nvSpPr>
         <p:spPr>
           <a:xfrm>
-            <a:off x="6378997" y="6624527"/>
+            <a:off x="6358554" y="5085463"/>
             <a:ext cx="2736000" cy="261610"/>
           </a:xfrm>
           <a:prstGeom prst="rect">
@@ -7759,7 +7299,83 @@
         </p:nvSpPr>
         <p:spPr>
           <a:xfrm>
-            <a:off x="704814" y="6624527"/>
+            <a:off x="657847" y="5086129"/>
+            <a:ext cx="2782967" cy="261610"/>
+          </a:xfrm>
+          <a:prstGeom prst="rect">
+            <a:avLst/>
+          </a:prstGeom>
+          <a:noFill/>
+        </p:spPr>
+        <p:txBody>
+          <a:bodyPr wrap="square" rtlCol="0">
+            <a:spAutoFit/>
+          </a:bodyPr>
+          <a:lstStyle/>
+          <a:p>
+            <a:pPr algn="ctr"/>
+            <a:r>
+              <a:rPr lang="en-GB" sz="1100" dirty="0">
+                <a:latin typeface="Arial" panose="020B0604020202020204" pitchFamily="34" charset="0"/>
+                <a:cs typeface="Arial" panose="020B0604020202020204" pitchFamily="34" charset="0"/>
+              </a:rPr>
+              <a:t>Male: 57%   White: 78%</a:t>
+            </a:r>
+          </a:p>
+        </p:txBody>
+      </p:sp>
+      <p:cxnSp>
+        <p:nvCxnSpPr>
+          <p:cNvPr id="12" name="Straight Arrow Connector 11">
+            <a:extLst>
+              <a:ext uri="{FF2B5EF4-FFF2-40B4-BE49-F238E27FC236}">
+                <a16:creationId xmlns:a16="http://schemas.microsoft.com/office/drawing/2014/main" id="{791FBC8E-BEB2-B012-718A-63EF12E112A1}"/>
+              </a:ext>
+            </a:extLst>
+          </p:cNvPr>
+          <p:cNvCxnSpPr>
+            <a:cxnSpLocks/>
+          </p:cNvCxnSpPr>
+          <p:nvPr/>
+        </p:nvCxnSpPr>
+        <p:spPr bwMode="auto">
+          <a:xfrm flipH="1">
+            <a:off x="2030282" y="3731637"/>
+            <a:ext cx="542" cy="677437"/>
+          </a:xfrm>
+          <a:prstGeom prst="straightConnector1">
+            <a:avLst/>
+          </a:prstGeom>
+          <a:solidFill>
+            <a:schemeClr val="accent1"/>
+          </a:solidFill>
+          <a:ln w="9525" cap="flat" cmpd="sng" algn="ctr">
+            <a:solidFill>
+              <a:schemeClr val="tx1"/>
+            </a:solidFill>
+            <a:prstDash val="solid"/>
+            <a:round/>
+            <a:headEnd type="none" w="med" len="med"/>
+            <a:tailEnd type="triangle"/>
+          </a:ln>
+          <a:effectLst/>
+        </p:spPr>
+      </p:cxnSp>
+      <p:sp>
+        <p:nvSpPr>
+          <p:cNvPr id="23" name="TextBox 22">
+            <a:extLst>
+              <a:ext uri="{FF2B5EF4-FFF2-40B4-BE49-F238E27FC236}">
+                <a16:creationId xmlns:a16="http://schemas.microsoft.com/office/drawing/2014/main" id="{C5C686BD-5C76-0EA7-04BC-482D4B907E53}"/>
+              </a:ext>
+            </a:extLst>
+          </p:cNvPr>
+          <p:cNvSpPr txBox="1"/>
+          <p:nvPr/>
+        </p:nvSpPr>
+        <p:spPr>
+          <a:xfrm>
+            <a:off x="709872" y="2380523"/>
             <a:ext cx="2736000" cy="261610"/>
           </a:xfrm>
           <a:prstGeom prst="rect">
@@ -7779,7 +7395,81 @@
                 <a:latin typeface="Arial" panose="020B0604020202020204" pitchFamily="34" charset="0"/>
                 <a:cs typeface="Arial" panose="020B0604020202020204" pitchFamily="34" charset="0"/>
               </a:rPr>
-              <a:t>Male: 57%   White: 78%</a:t>
+              <a:t>Male: 52%   White: 77%</a:t>
+            </a:r>
+          </a:p>
+        </p:txBody>
+      </p:sp>
+      <p:cxnSp>
+        <p:nvCxnSpPr>
+          <p:cNvPr id="24" name="Straight Arrow Connector 23">
+            <a:extLst>
+              <a:ext uri="{FF2B5EF4-FFF2-40B4-BE49-F238E27FC236}">
+                <a16:creationId xmlns:a16="http://schemas.microsoft.com/office/drawing/2014/main" id="{D2ED38FB-3F28-6031-77C3-F3143CCC2FCC}"/>
+              </a:ext>
+            </a:extLst>
+          </p:cNvPr>
+          <p:cNvCxnSpPr/>
+          <p:nvPr/>
+        </p:nvCxnSpPr>
+        <p:spPr bwMode="auto">
+          <a:xfrm flipH="1">
+            <a:off x="7703923" y="3731304"/>
+            <a:ext cx="542" cy="677437"/>
+          </a:xfrm>
+          <a:prstGeom prst="straightConnector1">
+            <a:avLst/>
+          </a:prstGeom>
+          <a:solidFill>
+            <a:schemeClr val="accent1"/>
+          </a:solidFill>
+          <a:ln w="9525" cap="flat" cmpd="sng" algn="ctr">
+            <a:solidFill>
+              <a:schemeClr val="tx1"/>
+            </a:solidFill>
+            <a:prstDash val="solid"/>
+            <a:round/>
+            <a:headEnd type="none" w="med" len="med"/>
+            <a:tailEnd type="triangle"/>
+          </a:ln>
+          <a:effectLst/>
+        </p:spPr>
+      </p:cxnSp>
+      <p:sp>
+        <p:nvSpPr>
+          <p:cNvPr id="27" name="TextBox 26">
+            <a:extLst>
+              <a:ext uri="{FF2B5EF4-FFF2-40B4-BE49-F238E27FC236}">
+                <a16:creationId xmlns:a16="http://schemas.microsoft.com/office/drawing/2014/main" id="{EB2F80F7-3848-2945-AF94-11D63AA10D08}"/>
+              </a:ext>
+            </a:extLst>
+          </p:cNvPr>
+          <p:cNvSpPr txBox="1"/>
+          <p:nvPr/>
+        </p:nvSpPr>
+        <p:spPr>
+          <a:xfrm>
+            <a:off x="6378997" y="2369264"/>
+            <a:ext cx="2736000" cy="261610"/>
+          </a:xfrm>
+          <a:prstGeom prst="rect">
+            <a:avLst/>
+          </a:prstGeom>
+          <a:noFill/>
+        </p:spPr>
+        <p:txBody>
+          <a:bodyPr wrap="square" rtlCol="0">
+            <a:spAutoFit/>
+          </a:bodyPr>
+          <a:lstStyle/>
+          <a:p>
+            <a:pPr algn="ctr"/>
+            <a:r>
+              <a:rPr lang="en-GB" sz="1100" dirty="0">
+                <a:latin typeface="Arial" panose="020B0604020202020204" pitchFamily="34" charset="0"/>
+                <a:cs typeface="Arial" panose="020B0604020202020204" pitchFamily="34" charset="0"/>
+              </a:rPr>
+              <a:t>Male: 58%   White: 68%</a:t>
             </a:r>
           </a:p>
         </p:txBody>
@@ -15015,18 +14705,18 @@
 </file>
 
 <file path=customXml/item1.xml><?xml version="1.0" encoding="utf-8"?>
+<p:properties xmlns:p="http://schemas.microsoft.com/office/2006/metadata/properties" xmlns:xsi="http://www.w3.org/2001/XMLSchema-instance" xmlns:pc="http://schemas.microsoft.com/office/infopath/2007/PartnerControls">
+  <documentManagement/>
+</p:properties>
+</file>
+
+<file path=customXml/item2.xml><?xml version="1.0" encoding="utf-8"?>
 <?mso-contentType ?>
 <FormTemplates xmlns="http://schemas.microsoft.com/sharepoint/v3/contenttype/forms">
   <Display>DocumentLibraryForm</Display>
   <Edit>DocumentLibraryForm</Edit>
   <New>DocumentLibraryForm</New>
 </FormTemplates>
-</file>
-
-<file path=customXml/item2.xml><?xml version="1.0" encoding="utf-8"?>
-<p:properties xmlns:p="http://schemas.microsoft.com/office/2006/metadata/properties" xmlns:xsi="http://www.w3.org/2001/XMLSchema-instance" xmlns:pc="http://schemas.microsoft.com/office/infopath/2007/PartnerControls">
-  <documentManagement/>
-</p:properties>
 </file>
 
 <file path=customXml/item3.xml><?xml version="1.0" encoding="utf-8"?>
@@ -15259,14 +14949,6 @@
 </file>
 
 <file path=customXml/itemProps1.xml><?xml version="1.0" encoding="utf-8"?>
-<ds:datastoreItem xmlns:ds="http://schemas.openxmlformats.org/officeDocument/2006/customXml" ds:itemID="{9FA18103-7F7B-4DF6-B5E4-0AF29ECCC122}">
-  <ds:schemaRefs>
-    <ds:schemaRef ds:uri="http://schemas.microsoft.com/sharepoint/v3/contenttype/forms"/>
-  </ds:schemaRefs>
-</ds:datastoreItem>
-</file>
-
-<file path=customXml/itemProps2.xml><?xml version="1.0" encoding="utf-8"?>
 <ds:datastoreItem xmlns:ds="http://schemas.openxmlformats.org/officeDocument/2006/customXml" ds:itemID="{1A94CC53-2CAC-471B-9BA4-2797B3DA82E3}">
   <ds:schemaRefs>
     <ds:schemaRef ds:uri="0c7ed570-c004-4df7-b924-f6f15cff9822"/>
@@ -15279,6 +14961,14 @@
     <ds:schemaRef ds:uri="fd3c8342-50e0-4f70-a5fe-1cf354f99926"/>
     <ds:schemaRef ds:uri="http://schemas.microsoft.com/office/2006/metadata/properties"/>
     <ds:schemaRef ds:uri="http://www.w3.org/XML/1998/namespace"/>
+  </ds:schemaRefs>
+</ds:datastoreItem>
+</file>
+
+<file path=customXml/itemProps2.xml><?xml version="1.0" encoding="utf-8"?>
+<ds:datastoreItem xmlns:ds="http://schemas.openxmlformats.org/officeDocument/2006/customXml" ds:itemID="{9FA18103-7F7B-4DF6-B5E4-0AF29ECCC122}">
+  <ds:schemaRefs>
+    <ds:schemaRef ds:uri="http://schemas.microsoft.com/sharepoint/v3/contenttype/forms"/>
   </ds:schemaRefs>
 </ds:datastoreItem>
 </file>

</xml_diff>